<commit_message>
final draft for Bahir Dar part 1
</commit_message>
<xml_diff>
--- a/Handouts/Lecture 05.pptx
+++ b/Handouts/Lecture 05.pptx
@@ -255,7 +255,7 @@
             <a:fld id="{566E7F20-A29F-4C2A-9ED5-1CAD82BC0F93}" type="datetimeFigureOut">
               <a:rPr lang="en-US" smtClean="0"/>
               <a:pPr/>
-              <a:t>5/5/2022</a:t>
+              <a:t>5/9/2022</a:t>
             </a:fld>
             <a:endParaRPr lang="en-US"/>
           </a:p>
@@ -423,7 +423,7 @@
             <a:fld id="{E77891BB-24A3-4B1B-998B-3ED10EA61CB6}" type="datetimeFigureOut">
               <a:rPr lang="en-US" smtClean="0"/>
               <a:pPr/>
-              <a:t>5/5/2022</a:t>
+              <a:t>5/9/2022</a:t>
             </a:fld>
             <a:endParaRPr lang="en-US"/>
           </a:p>
@@ -936,7 +936,7 @@
           <a:p>
             <a:fld id="{2F031481-8C60-4676-BFB6-B23966059F11}" type="datetime1">
               <a:rPr lang="en-US" smtClean="0"/>
-              <a:t>5/5/2022</a:t>
+              <a:t>5/9/2022</a:t>
             </a:fld>
             <a:endParaRPr lang="en-US"/>
           </a:p>
@@ -1107,7 +1107,7 @@
           <a:p>
             <a:fld id="{D4364CD2-F53A-4464-9CEA-5D48B00C49C8}" type="datetime1">
               <a:rPr lang="en-US" smtClean="0"/>
-              <a:t>5/5/2022</a:t>
+              <a:t>5/9/2022</a:t>
             </a:fld>
             <a:endParaRPr lang="en-US"/>
           </a:p>
@@ -1288,7 +1288,7 @@
           <a:p>
             <a:fld id="{7D3A5C69-BE33-47E4-A662-F9554770F7DD}" type="datetime1">
               <a:rPr lang="en-US" smtClean="0"/>
-              <a:t>5/5/2022</a:t>
+              <a:t>5/9/2022</a:t>
             </a:fld>
             <a:endParaRPr lang="en-US"/>
           </a:p>
@@ -1459,7 +1459,7 @@
           <a:p>
             <a:fld id="{9A3AFF23-F07F-49AC-AAC7-4CCADDAE6366}" type="datetime1">
               <a:rPr lang="en-US" smtClean="0"/>
-              <a:t>5/5/2022</a:t>
+              <a:t>5/9/2022</a:t>
             </a:fld>
             <a:endParaRPr lang="en-US"/>
           </a:p>
@@ -1706,7 +1706,7 @@
           <a:p>
             <a:fld id="{788AA9FE-0FC2-4F34-9345-4414DCDC0914}" type="datetime1">
               <a:rPr lang="en-US" smtClean="0"/>
-              <a:t>5/5/2022</a:t>
+              <a:t>5/9/2022</a:t>
             </a:fld>
             <a:endParaRPr lang="en-US"/>
           </a:p>
@@ -1995,7 +1995,7 @@
           <a:p>
             <a:fld id="{1C1DCDC7-6ED4-483F-B9D8-F6A5061A9863}" type="datetime1">
               <a:rPr lang="en-US" smtClean="0"/>
-              <a:t>5/5/2022</a:t>
+              <a:t>5/9/2022</a:t>
             </a:fld>
             <a:endParaRPr lang="en-US"/>
           </a:p>
@@ -2418,7 +2418,7 @@
           <a:p>
             <a:fld id="{9B595092-9C7B-4815-86B4-AB62F6264E57}" type="datetime1">
               <a:rPr lang="en-US" smtClean="0"/>
-              <a:t>5/5/2022</a:t>
+              <a:t>5/9/2022</a:t>
             </a:fld>
             <a:endParaRPr lang="en-US"/>
           </a:p>
@@ -2537,7 +2537,7 @@
           <a:p>
             <a:fld id="{341EF18E-DCA4-4CE5-9D6F-C32ADDDEC335}" type="datetime1">
               <a:rPr lang="en-US" smtClean="0"/>
-              <a:t>5/5/2022</a:t>
+              <a:t>5/9/2022</a:t>
             </a:fld>
             <a:endParaRPr lang="en-US"/>
           </a:p>
@@ -2633,7 +2633,7 @@
           <a:p>
             <a:fld id="{5F52282A-8C9C-4459-9DBC-17E1B3598444}" type="datetime1">
               <a:rPr lang="en-US" smtClean="0"/>
-              <a:t>5/5/2022</a:t>
+              <a:t>5/9/2022</a:t>
             </a:fld>
             <a:endParaRPr lang="en-US"/>
           </a:p>
@@ -2911,7 +2911,7 @@
           <a:p>
             <a:fld id="{149306F4-04DC-4043-9B95-7DED79F09F2F}" type="datetime1">
               <a:rPr lang="en-US" smtClean="0"/>
-              <a:t>5/5/2022</a:t>
+              <a:t>5/9/2022</a:t>
             </a:fld>
             <a:endParaRPr lang="en-US"/>
           </a:p>
@@ -3165,7 +3165,7 @@
           <a:p>
             <a:fld id="{71ABE74A-8B9F-4BE3-9C7E-17AA9243B237}" type="datetime1">
               <a:rPr lang="en-US" smtClean="0"/>
-              <a:t>5/5/2022</a:t>
+              <a:t>5/9/2022</a:t>
             </a:fld>
             <a:endParaRPr lang="en-US"/>
           </a:p>
@@ -3379,7 +3379,7 @@
           <a:p>
             <a:fld id="{450F7620-9AAA-4928-93D3-A6CCCB2201A0}" type="datetime1">
               <a:rPr lang="en-US" smtClean="0"/>
-              <a:t>5/5/2022</a:t>
+              <a:t>5/9/2022</a:t>
             </a:fld>
             <a:endParaRPr lang="en-US"/>
           </a:p>
@@ -4018,15 +4018,7 @@
                 <a:ea typeface="Open Sans" panose="020B0606030504020204" pitchFamily="34" charset="0"/>
                 <a:cs typeface="Open Sans" panose="020B0606030504020204" pitchFamily="34" charset="0"/>
               </a:rPr>
-              <a:t>The FDE for Figures (a) &amp; (b) </a:t>
-            </a:r>
-            <a:r>
-              <a:rPr lang="en-US" sz="2400" dirty="0" smtClean="0">
-                <a:latin typeface="Open Sans" panose="020B0606030504020204" pitchFamily="34" charset="0"/>
-                <a:ea typeface="Open Sans" panose="020B0606030504020204" pitchFamily="34" charset="0"/>
-                <a:cs typeface="Open Sans" panose="020B0606030504020204" pitchFamily="34" charset="0"/>
-              </a:rPr>
-              <a:t>is:</a:t>
+              <a:t>The FDE for Figures (a) &amp; (b) is:</a:t>
             </a:r>
           </a:p>
           <a:p>
@@ -4045,7 +4037,7 @@
               <a:buFont typeface="Wingdings" panose="05000000000000000000" pitchFamily="2" charset="2"/>
               <a:buChar char="§"/>
             </a:pPr>
-            <a:endParaRPr lang="en-US" sz="2400" dirty="0" smtClean="0">
+            <a:endParaRPr lang="en-US" sz="2400" dirty="0">
               <a:latin typeface="Open Sans" panose="020B0606030504020204" pitchFamily="34" charset="0"/>
               <a:ea typeface="Open Sans" panose="020B0606030504020204" pitchFamily="34" charset="0"/>
               <a:cs typeface="Open Sans" panose="020B0606030504020204" pitchFamily="34" charset="0"/>
@@ -4064,11 +4056,6 @@
               </a:rPr>
               <a:t>The FDE for Figure (c) is:</a:t>
             </a:r>
-            <a:endParaRPr lang="en-US" sz="2400" dirty="0" smtClean="0">
-              <a:latin typeface="Open Sans" panose="020B0606030504020204" pitchFamily="34" charset="0"/>
-              <a:ea typeface="Open Sans" panose="020B0606030504020204" pitchFamily="34" charset="0"/>
-              <a:cs typeface="Open Sans" panose="020B0606030504020204" pitchFamily="34" charset="0"/>
-            </a:endParaRPr>
           </a:p>
           <a:p>
             <a:pPr algn="just">
@@ -4251,7 +4238,7 @@
           <a:graphicData uri="http://schemas.openxmlformats.org/presentationml/2006/ole">
             <mc:AlternateContent xmlns:mc="http://schemas.openxmlformats.org/markup-compatibility/2006">
               <mc:Choice xmlns:v="urn:schemas-microsoft-com:vml" Requires="v">
-                <p:oleObj spid="_x0000_s34880" name="Equation" r:id="rId3" imgW="1244520" imgH="241200" progId="Equation.3">
+                <p:oleObj spid="_x0000_s34888" name="Equation" r:id="rId3" imgW="1244520" imgH="241200" progId="Equation.3">
                   <p:embed/>
                 </p:oleObj>
               </mc:Choice>
@@ -4476,20 +4463,12 @@
           <a:p>
             <a:pPr eaLnBrk="1" hangingPunct="1"/>
             <a:r>
-              <a:rPr kumimoji="1" lang="en-US" altLang="ja-JP" sz="2000" dirty="0" smtClean="0">
-                <a:latin typeface="Open Sans" pitchFamily="2" charset="0"/>
-                <a:ea typeface="Open Sans" pitchFamily="2" charset="0"/>
-                <a:cs typeface="Open Sans" pitchFamily="2" charset="0"/>
-              </a:rPr>
-              <a:t>(5.3</a:t>
-            </a:r>
-            <a:r>
               <a:rPr kumimoji="1" lang="en-US" altLang="ja-JP" sz="2000" dirty="0">
                 <a:latin typeface="Open Sans" pitchFamily="2" charset="0"/>
                 <a:ea typeface="Open Sans" pitchFamily="2" charset="0"/>
                 <a:cs typeface="Open Sans" pitchFamily="2" charset="0"/>
               </a:rPr>
-              <a:t>)</a:t>
+              <a:t>(5.3)</a:t>
             </a:r>
           </a:p>
         </p:txBody>
@@ -4516,7 +4495,7 @@
           <a:graphicData uri="http://schemas.openxmlformats.org/presentationml/2006/ole">
             <mc:AlternateContent xmlns:mc="http://schemas.openxmlformats.org/markup-compatibility/2006">
               <mc:Choice xmlns:v="urn:schemas-microsoft-com:vml" Requires="v">
-                <p:oleObj spid="_x0000_s34881" name="Equation" r:id="rId5" imgW="2654280" imgH="241200" progId="Equation.3">
+                <p:oleObj spid="_x0000_s34889" name="Equation" r:id="rId5" imgW="2654280" imgH="241200" progId="Equation.3">
                   <p:embed/>
                 </p:oleObj>
               </mc:Choice>
@@ -4741,20 +4720,12 @@
           <a:p>
             <a:pPr eaLnBrk="1" hangingPunct="1"/>
             <a:r>
-              <a:rPr kumimoji="1" lang="en-US" altLang="ja-JP" sz="2000" dirty="0" smtClean="0">
-                <a:latin typeface="Open Sans" pitchFamily="2" charset="0"/>
-                <a:ea typeface="Open Sans" pitchFamily="2" charset="0"/>
-                <a:cs typeface="Open Sans" pitchFamily="2" charset="0"/>
-              </a:rPr>
-              <a:t>(5.4</a:t>
-            </a:r>
-            <a:r>
               <a:rPr kumimoji="1" lang="en-US" altLang="ja-JP" sz="2000" dirty="0">
                 <a:latin typeface="Open Sans" pitchFamily="2" charset="0"/>
                 <a:ea typeface="Open Sans" pitchFamily="2" charset="0"/>
                 <a:cs typeface="Open Sans" pitchFamily="2" charset="0"/>
               </a:rPr>
-              <a:t>)</a:t>
+              <a:t>(5.4)</a:t>
             </a:r>
           </a:p>
         </p:txBody>
@@ -4769,13 +4740,6 @@
   <p:clrMapOvr>
     <a:masterClrMapping/>
   </p:clrMapOvr>
-  <p:timing>
-    <p:tnLst>
-      <p:par>
-        <p:cTn id="1" dur="indefinite" restart="never" nodeType="tmRoot"/>
-      </p:par>
-    </p:tnLst>
-  </p:timing>
 </p:sld>
 </file>
 
@@ -4891,20 +4855,12 @@
               <a:buChar char="§"/>
             </a:pPr>
             <a:r>
-              <a:rPr lang="en-US" sz="2400" dirty="0" smtClean="0">
-                <a:latin typeface="Open Sans" panose="020B0606030504020204" pitchFamily="34" charset="0"/>
-                <a:ea typeface="Open Sans" panose="020B0606030504020204" pitchFamily="34" charset="0"/>
-                <a:cs typeface="Open Sans" panose="020B0606030504020204" pitchFamily="34" charset="0"/>
-              </a:rPr>
-              <a:t>Where </a:t>
-            </a:r>
-            <a:r>
               <a:rPr lang="en-US" sz="2400" dirty="0">
                 <a:latin typeface="Open Sans" panose="020B0606030504020204" pitchFamily="34" charset="0"/>
                 <a:ea typeface="Open Sans" panose="020B0606030504020204" pitchFamily="34" charset="0"/>
                 <a:cs typeface="Open Sans" panose="020B0606030504020204" pitchFamily="34" charset="0"/>
               </a:rPr>
-              <a:t>h is total head, </a:t>
+              <a:t>Where h is total head, </a:t>
             </a:r>
             <a:r>
               <a:rPr lang="en-US" sz="2400" dirty="0" err="1">
@@ -4928,15 +4884,7 @@
                 <a:ea typeface="Open Sans" panose="020B0606030504020204" pitchFamily="34" charset="0"/>
                 <a:cs typeface="Open Sans" panose="020B0606030504020204" pitchFamily="34" charset="0"/>
               </a:rPr>
-              <a:t> is pressure head and z is elevation </a:t>
-            </a:r>
-            <a:r>
-              <a:rPr lang="en-US" sz="2400" dirty="0" smtClean="0">
-                <a:latin typeface="Open Sans" panose="020B0606030504020204" pitchFamily="34" charset="0"/>
-                <a:ea typeface="Open Sans" panose="020B0606030504020204" pitchFamily="34" charset="0"/>
-                <a:cs typeface="Open Sans" panose="020B0606030504020204" pitchFamily="34" charset="0"/>
-              </a:rPr>
-              <a:t>head.</a:t>
+              <a:t> is pressure head and z is elevation head.</a:t>
             </a:r>
           </a:p>
           <a:p>
@@ -4944,7 +4892,7 @@
               <a:buFont typeface="Wingdings" panose="05000000000000000000" pitchFamily="2" charset="2"/>
               <a:buChar char="§"/>
             </a:pPr>
-            <a:endParaRPr lang="en-US" sz="2400" dirty="0" smtClean="0">
+            <a:endParaRPr lang="en-US" sz="2400" dirty="0">
               <a:latin typeface="Open Sans" panose="020B0606030504020204" pitchFamily="34" charset="0"/>
               <a:ea typeface="Open Sans" panose="020B0606030504020204" pitchFamily="34" charset="0"/>
               <a:cs typeface="Open Sans" panose="020B0606030504020204" pitchFamily="34" charset="0"/>
@@ -4956,28 +4904,12 @@
               <a:buChar char="§"/>
             </a:pPr>
             <a:r>
-              <a:rPr lang="en-US" sz="2400" dirty="0" smtClean="0">
-                <a:latin typeface="Open Sans" panose="020B0606030504020204" pitchFamily="34" charset="0"/>
-                <a:ea typeface="Open Sans" panose="020B0606030504020204" pitchFamily="34" charset="0"/>
-                <a:cs typeface="Open Sans" panose="020B0606030504020204" pitchFamily="34" charset="0"/>
-              </a:rPr>
-              <a:t>Pore </a:t>
-            </a:r>
-            <a:r>
               <a:rPr lang="en-US" sz="2400" dirty="0">
                 <a:latin typeface="Open Sans" panose="020B0606030504020204" pitchFamily="34" charset="0"/>
                 <a:ea typeface="Open Sans" panose="020B0606030504020204" pitchFamily="34" charset="0"/>
                 <a:cs typeface="Open Sans" panose="020B0606030504020204" pitchFamily="34" charset="0"/>
               </a:rPr>
-              <a:t>water pressure is obtained </a:t>
-            </a:r>
-            <a:r>
-              <a:rPr lang="en-US" sz="2400" dirty="0" smtClean="0">
-                <a:latin typeface="Open Sans" panose="020B0606030504020204" pitchFamily="34" charset="0"/>
-                <a:ea typeface="Open Sans" panose="020B0606030504020204" pitchFamily="34" charset="0"/>
-                <a:cs typeface="Open Sans" panose="020B0606030504020204" pitchFamily="34" charset="0"/>
-              </a:rPr>
-              <a:t>by:</a:t>
+              <a:t>Pore water pressure is obtained by:</a:t>
             </a:r>
           </a:p>
           <a:p>
@@ -5161,7 +5093,7 @@
           <a:graphicData uri="http://schemas.openxmlformats.org/presentationml/2006/ole">
             <mc:AlternateContent xmlns:mc="http://schemas.openxmlformats.org/markup-compatibility/2006">
               <mc:Choice xmlns:v="urn:schemas-microsoft-com:vml" Requires="v">
-                <p:oleObj spid="_x0000_s35902" name="Equation" r:id="rId3" imgW="634680" imgH="241200" progId="Equation.3">
+                <p:oleObj spid="_x0000_s35910" name="Equation" r:id="rId3" imgW="634680" imgH="241200" progId="Equation.3">
                   <p:embed/>
                 </p:oleObj>
               </mc:Choice>
@@ -5231,7 +5163,7 @@
           <a:graphicData uri="http://schemas.openxmlformats.org/presentationml/2006/ole">
             <mc:AlternateContent xmlns:mc="http://schemas.openxmlformats.org/markup-compatibility/2006">
               <mc:Choice xmlns:v="urn:schemas-microsoft-com:vml" Requires="v">
-                <p:oleObj spid="_x0000_s35903" name="Equation" r:id="rId5" imgW="1269720" imgH="241200" progId="Equation.3">
+                <p:oleObj spid="_x0000_s35911" name="Equation" r:id="rId5" imgW="1269720" imgH="241200" progId="Equation.3">
                   <p:embed/>
                 </p:oleObj>
               </mc:Choice>
@@ -5289,13 +5221,6 @@
   <p:clrMapOvr>
     <a:masterClrMapping/>
   </p:clrMapOvr>
-  <p:timing>
-    <p:tnLst>
-      <p:par>
-        <p:cTn id="1" dur="indefinite" restart="never" nodeType="tmRoot"/>
-      </p:par>
-    </p:tnLst>
-  </p:timing>
 </p:sld>
 </file>
 
@@ -5400,7 +5325,7 @@
               <a:buChar char="§"/>
             </a:pPr>
             <a:r>
-              <a:rPr lang="en-US" sz="2400" dirty="0" smtClean="0">
+              <a:rPr lang="en-US" sz="2400" dirty="0">
                 <a:latin typeface="Open Sans" panose="020B0606030504020204" pitchFamily="34" charset="0"/>
                 <a:ea typeface="Open Sans" panose="020B0606030504020204" pitchFamily="34" charset="0"/>
                 <a:cs typeface="Open Sans" panose="020B0606030504020204" pitchFamily="34" charset="0"/>
@@ -5413,7 +5338,7 @@
               <a:buFont typeface="Wingdings" panose="05000000000000000000" pitchFamily="2" charset="2"/>
               <a:buChar char="§"/>
             </a:pPr>
-            <a:endParaRPr lang="en-US" sz="2400" dirty="0" smtClean="0">
+            <a:endParaRPr lang="en-US" sz="2400" dirty="0">
               <a:latin typeface="Open Sans" panose="020B0606030504020204" pitchFamily="34" charset="0"/>
               <a:ea typeface="Open Sans" panose="020B0606030504020204" pitchFamily="34" charset="0"/>
               <a:cs typeface="Open Sans" panose="020B0606030504020204" pitchFamily="34" charset="0"/>
@@ -5424,7 +5349,7 @@
               <a:buFont typeface="Wingdings" panose="05000000000000000000" pitchFamily="2" charset="2"/>
               <a:buChar char="§"/>
             </a:pPr>
-            <a:endParaRPr lang="en-US" sz="2400" dirty="0" smtClean="0">
+            <a:endParaRPr lang="en-US" sz="2400" dirty="0">
               <a:latin typeface="Open Sans" panose="020B0606030504020204" pitchFamily="34" charset="0"/>
               <a:ea typeface="Open Sans" panose="020B0606030504020204" pitchFamily="34" charset="0"/>
               <a:cs typeface="Open Sans" panose="020B0606030504020204" pitchFamily="34" charset="0"/>
@@ -5435,7 +5360,7 @@
               <a:buFont typeface="Wingdings" panose="05000000000000000000" pitchFamily="2" charset="2"/>
               <a:buChar char="§"/>
             </a:pPr>
-            <a:endParaRPr lang="en-US" sz="2400" dirty="0" smtClean="0">
+            <a:endParaRPr lang="en-US" sz="2400" dirty="0">
               <a:latin typeface="Open Sans" panose="020B0606030504020204" pitchFamily="34" charset="0"/>
               <a:ea typeface="Open Sans" panose="020B0606030504020204" pitchFamily="34" charset="0"/>
               <a:cs typeface="Open Sans" panose="020B0606030504020204" pitchFamily="34" charset="0"/>
@@ -5455,7 +5380,7 @@
               <a:t>Contours of potential heads can be drawn from the discrete values of </a:t>
             </a:r>
             <a:r>
-              <a:rPr lang="en-US" sz="2400" dirty="0" err="1" smtClean="0">
+              <a:rPr lang="en-US" sz="2400" dirty="0" err="1">
                 <a:latin typeface="Open Sans" panose="020B0606030504020204" pitchFamily="34" charset="0"/>
                 <a:ea typeface="Open Sans" panose="020B0606030504020204" pitchFamily="34" charset="0"/>
                 <a:cs typeface="Open Sans" panose="020B0606030504020204" pitchFamily="34" charset="0"/>
@@ -5463,7 +5388,7 @@
               <a:t>h</a:t>
             </a:r>
             <a:r>
-              <a:rPr lang="en-US" sz="2400" baseline="-25000" dirty="0" err="1" smtClean="0">
+              <a:rPr lang="en-US" sz="2400" baseline="-25000" dirty="0" err="1">
                 <a:latin typeface="Open Sans" panose="020B0606030504020204" pitchFamily="34" charset="0"/>
                 <a:ea typeface="Open Sans" panose="020B0606030504020204" pitchFamily="34" charset="0"/>
                 <a:cs typeface="Open Sans" panose="020B0606030504020204" pitchFamily="34" charset="0"/>
@@ -5471,7 +5396,7 @@
               <a:t>i,j</a:t>
             </a:r>
             <a:r>
-              <a:rPr lang="en-US" sz="2400" dirty="0" smtClean="0">
+              <a:rPr lang="en-US" sz="2400" dirty="0">
                 <a:latin typeface="Open Sans" panose="020B0606030504020204" pitchFamily="34" charset="0"/>
                 <a:ea typeface="Open Sans" panose="020B0606030504020204" pitchFamily="34" charset="0"/>
                 <a:cs typeface="Open Sans" panose="020B0606030504020204" pitchFamily="34" charset="0"/>
@@ -5660,7 +5585,7 @@
           <a:graphicData uri="http://schemas.openxmlformats.org/presentationml/2006/ole">
             <mc:AlternateContent xmlns:mc="http://schemas.openxmlformats.org/markup-compatibility/2006">
               <mc:Choice xmlns:v="urn:schemas-microsoft-com:vml" Requires="v">
-                <p:oleObj spid="_x0000_s36898" name="Equation" r:id="rId3" imgW="1143000" imgH="241200" progId="Equation.3">
+                <p:oleObj spid="_x0000_s36902" name="Equation" r:id="rId3" imgW="1143000" imgH="241200" progId="Equation.3">
                   <p:embed/>
                 </p:oleObj>
               </mc:Choice>
@@ -5866,20 +5791,12 @@
               </a:spcBef>
             </a:pPr>
             <a:r>
-              <a:rPr kumimoji="1" lang="en-US" altLang="ja-JP" sz="2000" dirty="0" smtClean="0">
-                <a:latin typeface="Open Sans" pitchFamily="2" charset="0"/>
-                <a:ea typeface="Open Sans" pitchFamily="2" charset="0"/>
-                <a:cs typeface="Open Sans" pitchFamily="2" charset="0"/>
-              </a:rPr>
-              <a:t>(5.5</a:t>
-            </a:r>
-            <a:r>
               <a:rPr kumimoji="1" lang="en-US" altLang="ja-JP" sz="2000" dirty="0">
                 <a:latin typeface="Open Sans" pitchFamily="2" charset="0"/>
                 <a:ea typeface="Open Sans" pitchFamily="2" charset="0"/>
                 <a:cs typeface="Open Sans" pitchFamily="2" charset="0"/>
               </a:rPr>
-              <a:t>)</a:t>
+              <a:t>(5.5)</a:t>
             </a:r>
           </a:p>
         </p:txBody>
@@ -5894,13 +5811,6 @@
   <p:clrMapOvr>
     <a:masterClrMapping/>
   </p:clrMapOvr>
-  <p:timing>
-    <p:tnLst>
-      <p:par>
-        <p:cTn id="1" dur="indefinite" restart="never" nodeType="tmRoot"/>
-      </p:par>
-    </p:tnLst>
-  </p:timing>
 </p:sld>
 </file>
 
@@ -6018,7 +5928,7 @@
               <a:buFont typeface="Wingdings" panose="05000000000000000000" pitchFamily="2" charset="2"/>
               <a:buChar char="§"/>
             </a:pPr>
-            <a:endParaRPr lang="en-US" sz="2400" dirty="0" smtClean="0">
+            <a:endParaRPr lang="en-US" sz="2400" dirty="0">
               <a:latin typeface="Open Sans" panose="020B0606030504020204" pitchFamily="34" charset="0"/>
               <a:ea typeface="Open Sans" panose="020B0606030504020204" pitchFamily="34" charset="0"/>
               <a:cs typeface="Open Sans" panose="020B0606030504020204" pitchFamily="34" charset="0"/>
@@ -6029,7 +5939,7 @@
               <a:buFont typeface="Wingdings" panose="05000000000000000000" pitchFamily="2" charset="2"/>
               <a:buChar char="§"/>
             </a:pPr>
-            <a:endParaRPr lang="en-US" sz="2400" dirty="0" smtClean="0">
+            <a:endParaRPr lang="en-US" sz="2400" dirty="0">
               <a:latin typeface="Open Sans" panose="020B0606030504020204" pitchFamily="34" charset="0"/>
               <a:ea typeface="Open Sans" panose="020B0606030504020204" pitchFamily="34" charset="0"/>
               <a:cs typeface="Open Sans" panose="020B0606030504020204" pitchFamily="34" charset="0"/>
@@ -6041,7 +5951,7 @@
               <a:buChar char="§"/>
             </a:pPr>
             <a:r>
-              <a:rPr lang="en-US" sz="2400" dirty="0" smtClean="0">
+              <a:rPr lang="en-US" sz="2400" dirty="0">
                 <a:latin typeface="Open Sans" panose="020B0606030504020204" pitchFamily="34" charset="0"/>
                 <a:ea typeface="Open Sans" panose="020B0606030504020204" pitchFamily="34" charset="0"/>
                 <a:cs typeface="Open Sans" panose="020B0606030504020204" pitchFamily="34" charset="0"/>
@@ -6070,23 +5980,7 @@
                 <a:ea typeface="Open Sans" panose="020B0606030504020204" pitchFamily="34" charset="0"/>
                 <a:cs typeface="Open Sans" panose="020B0606030504020204" pitchFamily="34" charset="0"/>
               </a:rPr>
-              <a:t> is the hydraulic gradient expressed </a:t>
-            </a:r>
-            <a:r>
-              <a:rPr lang="en-US" sz="2400" dirty="0" smtClean="0">
-                <a:latin typeface="Open Sans" panose="020B0606030504020204" pitchFamily="34" charset="0"/>
-                <a:ea typeface="Open Sans" panose="020B0606030504020204" pitchFamily="34" charset="0"/>
-                <a:cs typeface="Open Sans" panose="020B0606030504020204" pitchFamily="34" charset="0"/>
-              </a:rPr>
-              <a:t>as</a:t>
-            </a:r>
-            <a:r>
-              <a:rPr lang="en-US" sz="2400" dirty="0">
-                <a:latin typeface="Open Sans" panose="020B0606030504020204" pitchFamily="34" charset="0"/>
-                <a:ea typeface="Open Sans" panose="020B0606030504020204" pitchFamily="34" charset="0"/>
-                <a:cs typeface="Open Sans" panose="020B0606030504020204" pitchFamily="34" charset="0"/>
-              </a:rPr>
-              <a:t>:</a:t>
+              <a:t> is the hydraulic gradient expressed as:</a:t>
             </a:r>
           </a:p>
         </p:txBody>
@@ -6259,7 +6153,7 @@
           <a:graphicData uri="http://schemas.openxmlformats.org/presentationml/2006/ole">
             <mc:AlternateContent xmlns:mc="http://schemas.openxmlformats.org/markup-compatibility/2006">
               <mc:Choice xmlns:v="urn:schemas-microsoft-com:vml" Requires="v">
-                <p:oleObj spid="_x0000_s37950" name="Equation" r:id="rId3" imgW="647640" imgH="241200" progId="Equation.3">
+                <p:oleObj spid="_x0000_s37958" name="Equation" r:id="rId3" imgW="647640" imgH="241200" progId="Equation.3">
                   <p:embed/>
                 </p:oleObj>
               </mc:Choice>
@@ -6329,7 +6223,7 @@
           <a:graphicData uri="http://schemas.openxmlformats.org/presentationml/2006/ole">
             <mc:AlternateContent xmlns:mc="http://schemas.openxmlformats.org/markup-compatibility/2006">
               <mc:Choice xmlns:v="urn:schemas-microsoft-com:vml" Requires="v">
-                <p:oleObj spid="_x0000_s37951" name="Equation" r:id="rId5" imgW="1168200" imgH="419040" progId="Equation.3">
+                <p:oleObj spid="_x0000_s37959" name="Equation" r:id="rId5" imgW="1168200" imgH="419040" progId="Equation.3">
                   <p:embed/>
                 </p:oleObj>
               </mc:Choice>
@@ -6387,13 +6281,6 @@
   <p:clrMapOvr>
     <a:masterClrMapping/>
   </p:clrMapOvr>
-  <p:timing>
-    <p:tnLst>
-      <p:par>
-        <p:cTn id="1" dur="indefinite" restart="never" nodeType="tmRoot"/>
-      </p:par>
-    </p:tnLst>
-  </p:timing>
 </p:sld>
 </file>
 
@@ -6511,7 +6398,7 @@
               <a:buFont typeface="Wingdings" panose="05000000000000000000" pitchFamily="2" charset="2"/>
               <a:buChar char="§"/>
             </a:pPr>
-            <a:endParaRPr lang="en-US" sz="2400" dirty="0" smtClean="0">
+            <a:endParaRPr lang="en-US" sz="2400" dirty="0">
               <a:latin typeface="Open Sans" panose="020B0606030504020204" pitchFamily="34" charset="0"/>
               <a:ea typeface="Open Sans" panose="020B0606030504020204" pitchFamily="34" charset="0"/>
               <a:cs typeface="Open Sans" panose="020B0606030504020204" pitchFamily="34" charset="0"/>
@@ -6522,7 +6409,7 @@
               <a:buFont typeface="Wingdings" panose="05000000000000000000" pitchFamily="2" charset="2"/>
               <a:buChar char="§"/>
             </a:pPr>
-            <a:endParaRPr lang="en-US" sz="2400" dirty="0" smtClean="0">
+            <a:endParaRPr lang="en-US" sz="2400" dirty="0">
               <a:latin typeface="Open Sans" panose="020B0606030504020204" pitchFamily="34" charset="0"/>
               <a:ea typeface="Open Sans" panose="020B0606030504020204" pitchFamily="34" charset="0"/>
               <a:cs typeface="Open Sans" panose="020B0606030504020204" pitchFamily="34" charset="0"/>
@@ -6698,7 +6585,7 @@
           <a:graphicData uri="http://schemas.openxmlformats.org/presentationml/2006/ole">
             <mc:AlternateContent xmlns:mc="http://schemas.openxmlformats.org/markup-compatibility/2006">
               <mc:Choice xmlns:v="urn:schemas-microsoft-com:vml" Requires="v">
-                <p:oleObj spid="_x0000_s38943" name="Equation" r:id="rId3" imgW="1333440" imgH="419040" progId="Equation.3">
+                <p:oleObj spid="_x0000_s38947" name="Equation" r:id="rId3" imgW="1333440" imgH="419040" progId="Equation.3">
                   <p:embed/>
                 </p:oleObj>
               </mc:Choice>
@@ -6756,13 +6643,6 @@
   <p:clrMapOvr>
     <a:masterClrMapping/>
   </p:clrMapOvr>
-  <p:timing>
-    <p:tnLst>
-      <p:par>
-        <p:cTn id="1" dur="indefinite" restart="never" nodeType="tmRoot"/>
-      </p:par>
-    </p:tnLst>
-  </p:timing>
 </p:sld>
 </file>
 
@@ -6872,15 +6752,7 @@
                 <a:ea typeface="Open Sans" panose="020B0606030504020204" pitchFamily="34" charset="0"/>
                 <a:cs typeface="Open Sans" panose="020B0606030504020204" pitchFamily="34" charset="0"/>
               </a:rPr>
-              <a:t>The flow rate, q, is obtained by considering a vertical plane across the flow </a:t>
-            </a:r>
-            <a:r>
-              <a:rPr lang="en-US" sz="2400" dirty="0" smtClean="0">
-                <a:latin typeface="Open Sans" panose="020B0606030504020204" pitchFamily="34" charset="0"/>
-                <a:ea typeface="Open Sans" panose="020B0606030504020204" pitchFamily="34" charset="0"/>
-                <a:cs typeface="Open Sans" panose="020B0606030504020204" pitchFamily="34" charset="0"/>
-              </a:rPr>
-              <a:t>domain.</a:t>
+              <a:t>The flow rate, q, is obtained by considering a vertical plane across the flow domain.</a:t>
             </a:r>
           </a:p>
           <a:p>
@@ -6910,23 +6782,7 @@
                 <a:ea typeface="Open Sans" panose="020B0606030504020204" pitchFamily="34" charset="0"/>
                 <a:cs typeface="Open Sans" panose="020B0606030504020204" pitchFamily="34" charset="0"/>
               </a:rPr>
-              <a:t> (Fig. </a:t>
-            </a:r>
-            <a:r>
-              <a:rPr lang="en-US" sz="2400" dirty="0" smtClean="0">
-                <a:latin typeface="Open Sans" panose="020B0606030504020204" pitchFamily="34" charset="0"/>
-                <a:ea typeface="Open Sans" panose="020B0606030504020204" pitchFamily="34" charset="0"/>
-                <a:cs typeface="Open Sans" panose="020B0606030504020204" pitchFamily="34" charset="0"/>
-              </a:rPr>
-              <a:t>5.1). </a:t>
-            </a:r>
-            <a:r>
-              <a:rPr lang="en-US" sz="2400" dirty="0">
-                <a:latin typeface="Open Sans" panose="020B0606030504020204" pitchFamily="34" charset="0"/>
-                <a:ea typeface="Open Sans" panose="020B0606030504020204" pitchFamily="34" charset="0"/>
-                <a:cs typeface="Open Sans" panose="020B0606030504020204" pitchFamily="34" charset="0"/>
-              </a:rPr>
-              <a:t>Then the expression for q is:</a:t>
+              <a:t> (Fig. 5.1). Then the expression for q is:</a:t>
             </a:r>
           </a:p>
           <a:p>
@@ -6934,7 +6790,7 @@
               <a:buFont typeface="Wingdings" panose="05000000000000000000" pitchFamily="2" charset="2"/>
               <a:buChar char="§"/>
             </a:pPr>
-            <a:endParaRPr lang="en-US" sz="2400" dirty="0" smtClean="0">
+            <a:endParaRPr lang="en-US" sz="2400" dirty="0">
               <a:latin typeface="Open Sans" panose="020B0606030504020204" pitchFamily="34" charset="0"/>
               <a:ea typeface="Open Sans" panose="020B0606030504020204" pitchFamily="34" charset="0"/>
               <a:cs typeface="Open Sans" panose="020B0606030504020204" pitchFamily="34" charset="0"/>
@@ -6945,7 +6801,7 @@
               <a:buFont typeface="Wingdings" panose="05000000000000000000" pitchFamily="2" charset="2"/>
               <a:buChar char="§"/>
             </a:pPr>
-            <a:endParaRPr lang="en-US" sz="2400" dirty="0" smtClean="0">
+            <a:endParaRPr lang="en-US" sz="2400" dirty="0">
               <a:latin typeface="Open Sans" panose="020B0606030504020204" pitchFamily="34" charset="0"/>
               <a:ea typeface="Open Sans" panose="020B0606030504020204" pitchFamily="34" charset="0"/>
               <a:cs typeface="Open Sans" panose="020B0606030504020204" pitchFamily="34" charset="0"/>
@@ -7121,7 +6977,7 @@
           <a:graphicData uri="http://schemas.openxmlformats.org/presentationml/2006/ole">
             <mc:AlternateContent xmlns:mc="http://schemas.openxmlformats.org/markup-compatibility/2006">
               <mc:Choice xmlns:v="urn:schemas-microsoft-com:vml" Requires="v">
-                <p:oleObj spid="_x0000_s39967" name="Equation" r:id="rId3" imgW="3454200" imgH="482400" progId="Equation.3">
+                <p:oleObj spid="_x0000_s39971" name="Equation" r:id="rId3" imgW="3454200" imgH="482400" progId="Equation.3">
                   <p:embed/>
                 </p:oleObj>
               </mc:Choice>
@@ -7327,20 +7183,12 @@
               </a:spcBef>
             </a:pPr>
             <a:r>
-              <a:rPr kumimoji="1" lang="en-US" altLang="ja-JP" sz="2000" dirty="0" smtClean="0">
-                <a:latin typeface="Open Sans" pitchFamily="2" charset="0"/>
-                <a:ea typeface="Open Sans" pitchFamily="2" charset="0"/>
-                <a:cs typeface="Open Sans" pitchFamily="2" charset="0"/>
-              </a:rPr>
-              <a:t>(5.6</a:t>
-            </a:r>
-            <a:r>
               <a:rPr kumimoji="1" lang="en-US" altLang="ja-JP" sz="2000" dirty="0">
                 <a:latin typeface="Open Sans" pitchFamily="2" charset="0"/>
                 <a:ea typeface="Open Sans" pitchFamily="2" charset="0"/>
                 <a:cs typeface="Open Sans" pitchFamily="2" charset="0"/>
               </a:rPr>
-              <a:t>)</a:t>
+              <a:t>(5.6)</a:t>
             </a:r>
           </a:p>
         </p:txBody>
@@ -7355,13 +7203,6 @@
   <p:clrMapOvr>
     <a:masterClrMapping/>
   </p:clrMapOvr>
-  <p:timing>
-    <p:tnLst>
-      <p:par>
-        <p:cTn id="1" dur="indefinite" restart="never" nodeType="tmRoot"/>
-      </p:par>
-    </p:tnLst>
-  </p:timing>
 </p:sld>
 </file>
 
@@ -7475,45 +7316,7 @@
                 <a:ea typeface="Open Sans" panose="020B0606030504020204" pitchFamily="34" charset="0"/>
                 <a:cs typeface="Open Sans" panose="020B0606030504020204" pitchFamily="34" charset="0"/>
               </a:rPr>
-              <a:t>Step 1</a:t>
-            </a:r>
-            <a:r>
-              <a:rPr lang="en-US" sz="2400" b="1" dirty="0" smtClean="0">
-                <a:latin typeface="Open Sans" panose="020B0606030504020204" pitchFamily="34" charset="0"/>
-                <a:ea typeface="Open Sans" panose="020B0606030504020204" pitchFamily="34" charset="0"/>
-                <a:cs typeface="Open Sans" panose="020B0606030504020204" pitchFamily="34" charset="0"/>
-              </a:rPr>
-              <a:t>:</a:t>
-            </a:r>
-          </a:p>
-          <a:p>
-            <a:pPr algn="just">
-              <a:buFont typeface="Wingdings" panose="05000000000000000000" pitchFamily="2" charset="2"/>
-              <a:buChar char="§"/>
-            </a:pPr>
-            <a:r>
-              <a:rPr lang="en-US" sz="2400" dirty="0" smtClean="0">
-                <a:latin typeface="Open Sans" panose="020B0606030504020204" pitchFamily="34" charset="0"/>
-                <a:ea typeface="Open Sans" panose="020B0606030504020204" pitchFamily="34" charset="0"/>
-                <a:cs typeface="Open Sans" panose="020B0606030504020204" pitchFamily="34" charset="0"/>
-              </a:rPr>
-              <a:t>Divide </a:t>
-            </a:r>
-            <a:r>
-              <a:rPr lang="en-US" sz="2400" dirty="0">
-                <a:latin typeface="Open Sans" panose="020B0606030504020204" pitchFamily="34" charset="0"/>
-                <a:ea typeface="Open Sans" panose="020B0606030504020204" pitchFamily="34" charset="0"/>
-                <a:cs typeface="Open Sans" panose="020B0606030504020204" pitchFamily="34" charset="0"/>
-              </a:rPr>
-              <a:t>the flow domain into a square </a:t>
-            </a:r>
-            <a:r>
-              <a:rPr lang="en-US" sz="2400" dirty="0" smtClean="0">
-                <a:latin typeface="Open Sans" panose="020B0606030504020204" pitchFamily="34" charset="0"/>
-                <a:ea typeface="Open Sans" panose="020B0606030504020204" pitchFamily="34" charset="0"/>
-                <a:cs typeface="Open Sans" panose="020B0606030504020204" pitchFamily="34" charset="0"/>
-              </a:rPr>
-              <a:t>grid.</a:t>
+              <a:t>Step 1:</a:t>
             </a:r>
           </a:p>
           <a:p>
@@ -7527,15 +7330,21 @@
                 <a:ea typeface="Open Sans" panose="020B0606030504020204" pitchFamily="34" charset="0"/>
                 <a:cs typeface="Open Sans" panose="020B0606030504020204" pitchFamily="34" charset="0"/>
               </a:rPr>
-              <a:t>Generally, finer grids give more accurate solution than coarser </a:t>
+              <a:t>Divide the flow domain into a square grid.</a:t>
             </a:r>
+          </a:p>
+          <a:p>
+            <a:pPr algn="just">
+              <a:buFont typeface="Wingdings" panose="05000000000000000000" pitchFamily="2" charset="2"/>
+              <a:buChar char="§"/>
+            </a:pPr>
             <a:r>
-              <a:rPr lang="en-US" sz="2400" dirty="0" smtClean="0">
+              <a:rPr lang="en-US" sz="2400" dirty="0">
                 <a:latin typeface="Open Sans" panose="020B0606030504020204" pitchFamily="34" charset="0"/>
                 <a:ea typeface="Open Sans" panose="020B0606030504020204" pitchFamily="34" charset="0"/>
                 <a:cs typeface="Open Sans" panose="020B0606030504020204" pitchFamily="34" charset="0"/>
               </a:rPr>
-              <a:t>grids.</a:t>
+              <a:t>Generally, finer grids give more accurate solution than coarser grids.</a:t>
             </a:r>
           </a:p>
           <a:p>
@@ -7557,7 +7366,7 @@
               <a:buFont typeface="Wingdings" panose="05000000000000000000" pitchFamily="2" charset="2"/>
               <a:buChar char="§"/>
             </a:pPr>
-            <a:endParaRPr lang="en-US" sz="2400" dirty="0" smtClean="0">
+            <a:endParaRPr lang="en-US" sz="2400" dirty="0">
               <a:latin typeface="Open Sans" panose="020B0606030504020204" pitchFamily="34" charset="0"/>
               <a:ea typeface="Open Sans" panose="020B0606030504020204" pitchFamily="34" charset="0"/>
               <a:cs typeface="Open Sans" panose="020B0606030504020204" pitchFamily="34" charset="0"/>
@@ -7568,7 +7377,7 @@
               <a:buFont typeface="Wingdings" panose="05000000000000000000" pitchFamily="2" charset="2"/>
               <a:buChar char="§"/>
             </a:pPr>
-            <a:endParaRPr lang="en-US" sz="2400" dirty="0" smtClean="0">
+            <a:endParaRPr lang="en-US" sz="2400" dirty="0">
               <a:latin typeface="Open Sans" panose="020B0606030504020204" pitchFamily="34" charset="0"/>
               <a:ea typeface="Open Sans" panose="020B0606030504020204" pitchFamily="34" charset="0"/>
               <a:cs typeface="Open Sans" panose="020B0606030504020204" pitchFamily="34" charset="0"/>
@@ -7732,13 +7541,6 @@
   <p:clrMapOvr>
     <a:masterClrMapping/>
   </p:clrMapOvr>
-  <p:timing>
-    <p:tnLst>
-      <p:par>
-        <p:cTn id="1" dur="indefinite" restart="never" nodeType="tmRoot"/>
-      </p:par>
-    </p:tnLst>
-  </p:timing>
 </p:sld>
 </file>
 
@@ -7810,15 +7612,7 @@
                 <a:ea typeface="Open Sans" panose="020B0606030504020204" pitchFamily="34" charset="0"/>
                 <a:cs typeface="Open Sans" panose="020B0606030504020204" pitchFamily="34" charset="0"/>
               </a:rPr>
-              <a:t>Procedure </a:t>
-            </a:r>
-            <a:r>
-              <a:rPr lang="en-US" b="1" dirty="0" smtClean="0">
-                <a:latin typeface="Open Sans" panose="020B0606030504020204" pitchFamily="34" charset="0"/>
-                <a:ea typeface="Open Sans" panose="020B0606030504020204" pitchFamily="34" charset="0"/>
-                <a:cs typeface="Open Sans" panose="020B0606030504020204" pitchFamily="34" charset="0"/>
-              </a:rPr>
-              <a:t>…</a:t>
+              <a:t>Procedure …</a:t>
             </a:r>
             <a:endParaRPr lang="en-GB" b="1" dirty="0">
               <a:latin typeface="Open Sans" panose="020B0606030504020204" pitchFamily="34" charset="0"/>
@@ -7860,15 +7654,7 @@
                 <a:ea typeface="Open Sans" panose="020B0606030504020204" pitchFamily="34" charset="0"/>
                 <a:cs typeface="Open Sans" panose="020B0606030504020204" pitchFamily="34" charset="0"/>
               </a:rPr>
-              <a:t>Step </a:t>
-            </a:r>
-            <a:r>
-              <a:rPr lang="en-US" sz="2400" b="1" dirty="0" smtClean="0">
-                <a:latin typeface="Open Sans" panose="020B0606030504020204" pitchFamily="34" charset="0"/>
-                <a:ea typeface="Open Sans" panose="020B0606030504020204" pitchFamily="34" charset="0"/>
-                <a:cs typeface="Open Sans" panose="020B0606030504020204" pitchFamily="34" charset="0"/>
-              </a:rPr>
-              <a:t>2:</a:t>
+              <a:t>Step 2:</a:t>
             </a:r>
           </a:p>
           <a:p>
@@ -7877,22 +7663,20 @@
               <a:buChar char="§"/>
             </a:pPr>
             <a:r>
-              <a:rPr lang="en-US" sz="2400" dirty="0" smtClean="0">
-                <a:latin typeface="Open Sans" panose="020B0606030504020204" pitchFamily="34" charset="0"/>
-                <a:ea typeface="Open Sans" panose="020B0606030504020204" pitchFamily="34" charset="0"/>
-                <a:cs typeface="Open Sans" panose="020B0606030504020204" pitchFamily="34" charset="0"/>
-              </a:rPr>
-              <a:t>Identify </a:t>
-            </a:r>
-            <a:r>
               <a:rPr lang="en-US" sz="2400" dirty="0">
                 <a:latin typeface="Open Sans" panose="020B0606030504020204" pitchFamily="34" charset="0"/>
                 <a:ea typeface="Open Sans" panose="020B0606030504020204" pitchFamily="34" charset="0"/>
                 <a:cs typeface="Open Sans" panose="020B0606030504020204" pitchFamily="34" charset="0"/>
               </a:rPr>
-              <a:t>boundary conditions, example, impermeable boundaries (flow lines) and permeable boundaries (equipotential lines).</a:t>
+              <a:t>Identify boundary conditions, example, impermeable boundaries (flow lines) and permeable boundaries (equipotential lines).</a:t>
             </a:r>
-            <a:endParaRPr lang="en-US" sz="2400" dirty="0" smtClean="0">
+          </a:p>
+          <a:p>
+            <a:pPr algn="just">
+              <a:buFont typeface="Wingdings" panose="05000000000000000000" pitchFamily="2" charset="2"/>
+              <a:buChar char="§"/>
+            </a:pPr>
+            <a:endParaRPr lang="en-US" sz="2400" dirty="0">
               <a:latin typeface="Open Sans" panose="020B0606030504020204" pitchFamily="34" charset="0"/>
               <a:ea typeface="Open Sans" panose="020B0606030504020204" pitchFamily="34" charset="0"/>
               <a:cs typeface="Open Sans" panose="020B0606030504020204" pitchFamily="34" charset="0"/>
@@ -7903,18 +7687,7 @@
               <a:buFont typeface="Wingdings" panose="05000000000000000000" pitchFamily="2" charset="2"/>
               <a:buChar char="§"/>
             </a:pPr>
-            <a:endParaRPr lang="en-US" sz="2400" dirty="0" smtClean="0">
-              <a:latin typeface="Open Sans" panose="020B0606030504020204" pitchFamily="34" charset="0"/>
-              <a:ea typeface="Open Sans" panose="020B0606030504020204" pitchFamily="34" charset="0"/>
-              <a:cs typeface="Open Sans" panose="020B0606030504020204" pitchFamily="34" charset="0"/>
-            </a:endParaRPr>
-          </a:p>
-          <a:p>
-            <a:pPr algn="just">
-              <a:buFont typeface="Wingdings" panose="05000000000000000000" pitchFamily="2" charset="2"/>
-              <a:buChar char="§"/>
-            </a:pPr>
-            <a:endParaRPr lang="en-US" sz="2400" dirty="0" smtClean="0">
+            <a:endParaRPr lang="en-US" sz="2400" dirty="0">
               <a:latin typeface="Open Sans" panose="020B0606030504020204" pitchFamily="34" charset="0"/>
               <a:ea typeface="Open Sans" panose="020B0606030504020204" pitchFamily="34" charset="0"/>
               <a:cs typeface="Open Sans" panose="020B0606030504020204" pitchFamily="34" charset="0"/>
@@ -12283,15 +12056,7 @@
                 <a:ea typeface="Open Sans" panose="020B0606030504020204" pitchFamily="34" charset="0"/>
                 <a:cs typeface="Open Sans" panose="020B0606030504020204" pitchFamily="34" charset="0"/>
               </a:rPr>
-              <a:t>Procedure </a:t>
-            </a:r>
-            <a:r>
-              <a:rPr lang="en-US" b="1" dirty="0" smtClean="0">
-                <a:latin typeface="Open Sans" panose="020B0606030504020204" pitchFamily="34" charset="0"/>
-                <a:ea typeface="Open Sans" panose="020B0606030504020204" pitchFamily="34" charset="0"/>
-                <a:cs typeface="Open Sans" panose="020B0606030504020204" pitchFamily="34" charset="0"/>
-              </a:rPr>
-              <a:t>…</a:t>
+              <a:t>Procedure …</a:t>
             </a:r>
             <a:endParaRPr lang="en-GB" b="1" dirty="0">
               <a:latin typeface="Open Sans" panose="020B0606030504020204" pitchFamily="34" charset="0"/>
@@ -12333,15 +12098,7 @@
                 <a:ea typeface="Open Sans" panose="020B0606030504020204" pitchFamily="34" charset="0"/>
                 <a:cs typeface="Open Sans" panose="020B0606030504020204" pitchFamily="34" charset="0"/>
               </a:rPr>
-              <a:t>Step </a:t>
-            </a:r>
-            <a:r>
-              <a:rPr lang="en-US" sz="2400" b="1" dirty="0" smtClean="0">
-                <a:latin typeface="Open Sans" panose="020B0606030504020204" pitchFamily="34" charset="0"/>
-                <a:ea typeface="Open Sans" panose="020B0606030504020204" pitchFamily="34" charset="0"/>
-                <a:cs typeface="Open Sans" panose="020B0606030504020204" pitchFamily="34" charset="0"/>
-              </a:rPr>
-              <a:t>3:</a:t>
+              <a:t>Step 3:</a:t>
             </a:r>
           </a:p>
           <a:p>
@@ -12355,18 +12112,10 @@
                 <a:ea typeface="Open Sans" panose="020B0606030504020204" pitchFamily="34" charset="0"/>
                 <a:cs typeface="Open Sans" panose="020B0606030504020204" pitchFamily="34" charset="0"/>
               </a:rPr>
-              <a:t>Determine the heads at the permeable or equipotential boundaries. For example, the heads along the equipotential boundary AB </a:t>
+              <a:t>Determine the heads at the permeable or equipotential boundaries. For example, the heads along the equipotential boundary AB (figure above) is </a:t>
             </a:r>
             <a:r>
-              <a:rPr lang="en-US" sz="2400" dirty="0" smtClean="0">
-                <a:latin typeface="Open Sans" panose="020B0606030504020204" pitchFamily="34" charset="0"/>
-                <a:ea typeface="Open Sans" panose="020B0606030504020204" pitchFamily="34" charset="0"/>
-                <a:cs typeface="Open Sans" panose="020B0606030504020204" pitchFamily="34" charset="0"/>
-              </a:rPr>
-              <a:t>(figure above) is </a:t>
-            </a:r>
-            <a:r>
-              <a:rPr lang="el-GR" sz="2400" dirty="0" smtClean="0">
+              <a:rPr lang="el-GR" sz="2400" dirty="0">
                 <a:latin typeface="Open Sans" panose="020B0606030504020204" pitchFamily="34" charset="0"/>
                 <a:ea typeface="Open Sans" panose="020B0606030504020204" pitchFamily="34" charset="0"/>
                 <a:cs typeface="Open Sans" panose="020B0606030504020204" pitchFamily="34" charset="0"/>
@@ -12374,7 +12123,7 @@
               <a:t>Δ</a:t>
             </a:r>
             <a:r>
-              <a:rPr lang="en-US" sz="2400" dirty="0" smtClean="0">
+              <a:rPr lang="en-US" sz="2400" dirty="0">
                 <a:latin typeface="Open Sans" panose="020B0606030504020204" pitchFamily="34" charset="0"/>
                 <a:ea typeface="Open Sans" panose="020B0606030504020204" pitchFamily="34" charset="0"/>
                 <a:cs typeface="Open Sans" panose="020B0606030504020204" pitchFamily="34" charset="0"/>
@@ -12396,7 +12145,7 @@
               <a:t>Therefore, all the nodes along this boundary will have a constant head of </a:t>
             </a:r>
             <a:r>
-              <a:rPr lang="el-GR" sz="2400" dirty="0" smtClean="0">
+              <a:rPr lang="el-GR" sz="2400" dirty="0">
                 <a:latin typeface="Open Sans" panose="020B0606030504020204" pitchFamily="34" charset="0"/>
                 <a:ea typeface="Open Sans" panose="020B0606030504020204" pitchFamily="34" charset="0"/>
                 <a:cs typeface="Open Sans" panose="020B0606030504020204" pitchFamily="34" charset="0"/>
@@ -12404,7 +12153,7 @@
               <a:t>Δ</a:t>
             </a:r>
             <a:r>
-              <a:rPr lang="en-US" sz="2400" dirty="0" smtClean="0">
+              <a:rPr lang="en-US" sz="2400" dirty="0">
                 <a:latin typeface="Open Sans" panose="020B0606030504020204" pitchFamily="34" charset="0"/>
                 <a:ea typeface="Open Sans" panose="020B0606030504020204" pitchFamily="34" charset="0"/>
                 <a:cs typeface="Open Sans" panose="020B0606030504020204" pitchFamily="34" charset="0"/>
@@ -12426,7 +12175,7 @@
               <a:t>Because of symmetry, the head along nodes directly under the sheet pile wall (EF) is </a:t>
             </a:r>
             <a:r>
-              <a:rPr lang="el-GR" sz="2400" dirty="0" smtClean="0">
+              <a:rPr lang="el-GR" sz="2400" dirty="0">
                 <a:latin typeface="Open Sans" panose="020B0606030504020204" pitchFamily="34" charset="0"/>
                 <a:ea typeface="Open Sans" panose="020B0606030504020204" pitchFamily="34" charset="0"/>
                 <a:cs typeface="Open Sans" panose="020B0606030504020204" pitchFamily="34" charset="0"/>
@@ -12434,7 +12183,7 @@
               <a:t>Δ</a:t>
             </a:r>
             <a:r>
-              <a:rPr lang="en-US" sz="2400" dirty="0" smtClean="0">
+              <a:rPr lang="en-US" sz="2400" dirty="0">
                 <a:latin typeface="Open Sans" panose="020B0606030504020204" pitchFamily="34" charset="0"/>
                 <a:ea typeface="Open Sans" panose="020B0606030504020204" pitchFamily="34" charset="0"/>
                 <a:cs typeface="Open Sans" panose="020B0606030504020204" pitchFamily="34" charset="0"/>
@@ -12600,13 +12349,6 @@
   <p:clrMapOvr>
     <a:masterClrMapping/>
   </p:clrMapOvr>
-  <p:timing>
-    <p:tnLst>
-      <p:par>
-        <p:cTn id="1" dur="indefinite" restart="never" nodeType="tmRoot"/>
-      </p:par>
-    </p:tnLst>
-  </p:timing>
 </p:sld>
 </file>
 
@@ -12678,15 +12420,7 @@
                 <a:ea typeface="Open Sans" panose="020B0606030504020204" pitchFamily="34" charset="0"/>
                 <a:cs typeface="Open Sans" panose="020B0606030504020204" pitchFamily="34" charset="0"/>
               </a:rPr>
-              <a:t>Procedure </a:t>
-            </a:r>
-            <a:r>
-              <a:rPr lang="en-US" b="1" dirty="0" smtClean="0">
-                <a:latin typeface="Open Sans" panose="020B0606030504020204" pitchFamily="34" charset="0"/>
-                <a:ea typeface="Open Sans" panose="020B0606030504020204" pitchFamily="34" charset="0"/>
-                <a:cs typeface="Open Sans" panose="020B0606030504020204" pitchFamily="34" charset="0"/>
-              </a:rPr>
-              <a:t>…</a:t>
+              <a:t>Procedure …</a:t>
             </a:r>
             <a:endParaRPr lang="en-GB" b="1" dirty="0">
               <a:latin typeface="Open Sans" panose="020B0606030504020204" pitchFamily="34" charset="0"/>
@@ -12728,15 +12462,7 @@
                 <a:ea typeface="Open Sans" panose="020B0606030504020204" pitchFamily="34" charset="0"/>
                 <a:cs typeface="Open Sans" panose="020B0606030504020204" pitchFamily="34" charset="0"/>
               </a:rPr>
-              <a:t>Step 4</a:t>
-            </a:r>
-            <a:r>
-              <a:rPr lang="en-US" sz="2400" b="1" dirty="0" smtClean="0">
-                <a:latin typeface="Open Sans" panose="020B0606030504020204" pitchFamily="34" charset="0"/>
-                <a:ea typeface="Open Sans" panose="020B0606030504020204" pitchFamily="34" charset="0"/>
-                <a:cs typeface="Open Sans" panose="020B0606030504020204" pitchFamily="34" charset="0"/>
-              </a:rPr>
-              <a:t>:</a:t>
+              <a:t>Step 4:</a:t>
             </a:r>
           </a:p>
           <a:p>
@@ -12750,15 +12476,7 @@
                 <a:ea typeface="Open Sans" panose="020B0606030504020204" pitchFamily="34" charset="0"/>
                 <a:cs typeface="Open Sans" panose="020B0606030504020204" pitchFamily="34" charset="0"/>
               </a:rPr>
-              <a:t>Apply the known heads to the corresponding nodes and assume reasonable initial values for the interior nodes</a:t>
-            </a:r>
-            <a:r>
-              <a:rPr lang="en-US" sz="2400" dirty="0" smtClean="0">
-                <a:latin typeface="Open Sans" panose="020B0606030504020204" pitchFamily="34" charset="0"/>
-                <a:ea typeface="Open Sans" panose="020B0606030504020204" pitchFamily="34" charset="0"/>
-                <a:cs typeface="Open Sans" panose="020B0606030504020204" pitchFamily="34" charset="0"/>
-              </a:rPr>
-              <a:t>.</a:t>
+              <a:t>Apply the known heads to the corresponding nodes and assume reasonable initial values for the interior nodes.</a:t>
             </a:r>
           </a:p>
           <a:p>
@@ -12785,68 +12503,7 @@
                 <a:ea typeface="Open Sans" panose="020B0606030504020204" pitchFamily="34" charset="0"/>
                 <a:cs typeface="Open Sans" panose="020B0606030504020204" pitchFamily="34" charset="0"/>
               </a:rPr>
-              <a:t>Apply Eqn. </a:t>
-            </a:r>
-            <a:r>
-              <a:rPr lang="en-US" sz="2400" dirty="0" smtClean="0">
-                <a:latin typeface="Open Sans" panose="020B0606030504020204" pitchFamily="34" charset="0"/>
-                <a:ea typeface="Open Sans" panose="020B0606030504020204" pitchFamily="34" charset="0"/>
-                <a:cs typeface="Open Sans" panose="020B0606030504020204" pitchFamily="34" charset="0"/>
-              </a:rPr>
-              <a:t>(5.1</a:t>
-            </a:r>
-            <a:r>
-              <a:rPr lang="en-US" sz="2400" dirty="0">
-                <a:latin typeface="Open Sans" panose="020B0606030504020204" pitchFamily="34" charset="0"/>
-                <a:ea typeface="Open Sans" panose="020B0606030504020204" pitchFamily="34" charset="0"/>
-                <a:cs typeface="Open Sans" panose="020B0606030504020204" pitchFamily="34" charset="0"/>
-              </a:rPr>
-              <a:t>) if the soil is </a:t>
-            </a:r>
-            <a:r>
-              <a:rPr lang="en-US" sz="2400" dirty="0" smtClean="0">
-                <a:latin typeface="Open Sans" panose="020B0606030504020204" pitchFamily="34" charset="0"/>
-                <a:ea typeface="Open Sans" panose="020B0606030504020204" pitchFamily="34" charset="0"/>
-                <a:cs typeface="Open Sans" panose="020B0606030504020204" pitchFamily="34" charset="0"/>
-              </a:rPr>
-              <a:t>isotropic </a:t>
-            </a:r>
-            <a:r>
-              <a:rPr lang="en-US" sz="2400" dirty="0">
-                <a:latin typeface="Open Sans" panose="020B0606030504020204" pitchFamily="34" charset="0"/>
-                <a:ea typeface="Open Sans" panose="020B0606030504020204" pitchFamily="34" charset="0"/>
-                <a:cs typeface="Open Sans" panose="020B0606030504020204" pitchFamily="34" charset="0"/>
-              </a:rPr>
-              <a:t>to each node except:</a:t>
-            </a:r>
-          </a:p>
-          <a:p>
-            <a:pPr marL="857250" lvl="1" indent="-457200" algn="just">
-              <a:buAutoNum type="alphaLcParenR"/>
-            </a:pPr>
-            <a:r>
-              <a:rPr lang="en-US" sz="2000" dirty="0" smtClean="0">
-                <a:latin typeface="Open Sans" panose="020B0606030504020204" pitchFamily="34" charset="0"/>
-                <a:ea typeface="Open Sans" panose="020B0606030504020204" pitchFamily="34" charset="0"/>
-                <a:cs typeface="Open Sans" panose="020B0606030504020204" pitchFamily="34" charset="0"/>
-              </a:rPr>
-              <a:t>at </a:t>
-            </a:r>
-            <a:r>
-              <a:rPr lang="en-US" sz="2000" dirty="0">
-                <a:latin typeface="Open Sans" panose="020B0606030504020204" pitchFamily="34" charset="0"/>
-                <a:ea typeface="Open Sans" panose="020B0606030504020204" pitchFamily="34" charset="0"/>
-                <a:cs typeface="Open Sans" panose="020B0606030504020204" pitchFamily="34" charset="0"/>
-              </a:rPr>
-              <a:t>impermeable boundaries – eqn. </a:t>
-            </a:r>
-            <a:r>
-              <a:rPr lang="en-US" sz="2000" dirty="0" smtClean="0">
-                <a:latin typeface="Open Sans" panose="020B0606030504020204" pitchFamily="34" charset="0"/>
-                <a:ea typeface="Open Sans" panose="020B0606030504020204" pitchFamily="34" charset="0"/>
-                <a:cs typeface="Open Sans" panose="020B0606030504020204" pitchFamily="34" charset="0"/>
-              </a:rPr>
-              <a:t>(5.2)</a:t>
+              <a:t>Apply Eqn. (5.1) if the soil is isotropic to each node except:</a:t>
             </a:r>
           </a:p>
           <a:p>
@@ -12859,31 +12516,20 @@
                 <a:ea typeface="Open Sans" panose="020B0606030504020204" pitchFamily="34" charset="0"/>
                 <a:cs typeface="Open Sans" panose="020B0606030504020204" pitchFamily="34" charset="0"/>
               </a:rPr>
-              <a:t>at corners – eqn. </a:t>
+              <a:t>at impermeable boundaries – eqn. (5.2)</a:t>
             </a:r>
-            <a:r>
-              <a:rPr lang="en-US" sz="2000" dirty="0" smtClean="0">
-                <a:latin typeface="Open Sans" panose="020B0606030504020204" pitchFamily="34" charset="0"/>
-                <a:ea typeface="Open Sans" panose="020B0606030504020204" pitchFamily="34" charset="0"/>
-                <a:cs typeface="Open Sans" panose="020B0606030504020204" pitchFamily="34" charset="0"/>
-              </a:rPr>
-              <a:t>(5.3</a:t>
-            </a:r>
+          </a:p>
+          <a:p>
+            <a:pPr marL="857250" lvl="1" indent="-457200" algn="just">
+              <a:buAutoNum type="alphaLcParenR"/>
+            </a:pPr>
             <a:r>
               <a:rPr lang="en-US" sz="2000" dirty="0">
                 <a:latin typeface="Open Sans" panose="020B0606030504020204" pitchFamily="34" charset="0"/>
                 <a:ea typeface="Open Sans" panose="020B0606030504020204" pitchFamily="34" charset="0"/>
                 <a:cs typeface="Open Sans" panose="020B0606030504020204" pitchFamily="34" charset="0"/>
               </a:rPr>
-              <a:t>) &amp; </a:t>
-            </a:r>
-            <a:r>
-              <a:rPr lang="en-US" sz="2000" dirty="0" smtClean="0">
-                <a:latin typeface="Open Sans" panose="020B0606030504020204" pitchFamily="34" charset="0"/>
-                <a:ea typeface="Open Sans" panose="020B0606030504020204" pitchFamily="34" charset="0"/>
-                <a:cs typeface="Open Sans" panose="020B0606030504020204" pitchFamily="34" charset="0"/>
-              </a:rPr>
-              <a:t>(5.4)</a:t>
+              <a:t>at corners – eqn. (5.3) &amp; (5.4)</a:t>
             </a:r>
           </a:p>
           <a:p>
@@ -12898,11 +12544,6 @@
               </a:rPr>
               <a:t>at nodes where the heads are known</a:t>
             </a:r>
-            <a:endParaRPr lang="en-US" sz="2000" dirty="0" smtClean="0">
-              <a:latin typeface="Open Sans" panose="020B0606030504020204" pitchFamily="34" charset="0"/>
-              <a:ea typeface="Open Sans" panose="020B0606030504020204" pitchFamily="34" charset="0"/>
-              <a:cs typeface="Open Sans" panose="020B0606030504020204" pitchFamily="34" charset="0"/>
-            </a:endParaRPr>
           </a:p>
         </p:txBody>
       </p:sp>
@@ -13062,13 +12703,6 @@
   <p:clrMapOvr>
     <a:masterClrMapping/>
   </p:clrMapOvr>
-  <p:timing>
-    <p:tnLst>
-      <p:par>
-        <p:cTn id="1" dur="indefinite" restart="never" nodeType="tmRoot"/>
-      </p:par>
-    </p:tnLst>
-  </p:timing>
 </p:sld>
 </file>
 
@@ -13140,23 +12774,7 @@
                 <a:ea typeface="Open Sans" panose="020B0606030504020204" pitchFamily="34" charset="0"/>
                 <a:cs typeface="Open Sans" panose="020B0606030504020204" pitchFamily="34" charset="0"/>
               </a:rPr>
-              <a:t>FD Solution for </a:t>
-            </a:r>
-            <a:r>
-              <a:rPr lang="en-US" b="1" dirty="0" smtClean="0">
-                <a:latin typeface="Open Sans" panose="020B0606030504020204" pitchFamily="34" charset="0"/>
-                <a:ea typeface="Open Sans" panose="020B0606030504020204" pitchFamily="34" charset="0"/>
-                <a:cs typeface="Open Sans" panose="020B0606030504020204" pitchFamily="34" charset="0"/>
-              </a:rPr>
-              <a:t>2D </a:t>
-            </a:r>
-            <a:r>
-              <a:rPr lang="en-US" b="1" dirty="0">
-                <a:latin typeface="Open Sans" panose="020B0606030504020204" pitchFamily="34" charset="0"/>
-                <a:ea typeface="Open Sans" panose="020B0606030504020204" pitchFamily="34" charset="0"/>
-                <a:cs typeface="Open Sans" panose="020B0606030504020204" pitchFamily="34" charset="0"/>
-              </a:rPr>
-              <a:t>Flow</a:t>
+              <a:t>FD Solution for 2D Flow</a:t>
             </a:r>
             <a:endParaRPr lang="en-GB" b="1" dirty="0">
               <a:latin typeface="Open Sans" panose="020B0606030504020204" pitchFamily="34" charset="0"/>
@@ -13199,15 +12817,7 @@
                 <a:ea typeface="Open Sans" panose="020B0606030504020204" pitchFamily="34" charset="0"/>
                 <a:cs typeface="Open Sans" panose="020B0606030504020204" pitchFamily="34" charset="0"/>
               </a:rPr>
-              <a:t>Flow of Water through soils is governed by Laplace’s </a:t>
-            </a:r>
-            <a:r>
-              <a:rPr lang="en-US" sz="2400" dirty="0" smtClean="0">
-                <a:latin typeface="Open Sans" panose="020B0606030504020204" pitchFamily="34" charset="0"/>
-                <a:ea typeface="Open Sans" panose="020B0606030504020204" pitchFamily="34" charset="0"/>
-                <a:cs typeface="Open Sans" panose="020B0606030504020204" pitchFamily="34" charset="0"/>
-              </a:rPr>
-              <a:t>equation:</a:t>
+              <a:t>Flow of Water through soils is governed by Laplace’s equation:</a:t>
             </a:r>
           </a:p>
           <a:p>
@@ -13226,7 +12836,7 @@
               <a:buFont typeface="Wingdings" panose="05000000000000000000" pitchFamily="2" charset="2"/>
               <a:buChar char="§"/>
             </a:pPr>
-            <a:endParaRPr lang="en-US" sz="2400" dirty="0" smtClean="0">
+            <a:endParaRPr lang="en-US" sz="2400" dirty="0">
               <a:latin typeface="Open Sans" panose="020B0606030504020204" pitchFamily="34" charset="0"/>
               <a:ea typeface="Open Sans" panose="020B0606030504020204" pitchFamily="34" charset="0"/>
               <a:cs typeface="Open Sans" panose="020B0606030504020204" pitchFamily="34" charset="0"/>
@@ -13237,7 +12847,7 @@
               <a:buFont typeface="Wingdings" panose="05000000000000000000" pitchFamily="2" charset="2"/>
               <a:buChar char="§"/>
             </a:pPr>
-            <a:endParaRPr lang="en-US" sz="1050" dirty="0" smtClean="0">
+            <a:endParaRPr lang="en-US" sz="1050" dirty="0">
               <a:latin typeface="Open Sans" panose="020B0606030504020204" pitchFamily="34" charset="0"/>
               <a:ea typeface="Open Sans" panose="020B0606030504020204" pitchFamily="34" charset="0"/>
               <a:cs typeface="Open Sans" panose="020B0606030504020204" pitchFamily="34" charset="0"/>
@@ -13249,20 +12859,12 @@
               <a:buChar char="§"/>
             </a:pPr>
             <a:r>
-              <a:rPr lang="en-US" sz="2400" dirty="0" smtClean="0">
-                <a:latin typeface="Open Sans" panose="020B0606030504020204" pitchFamily="34" charset="0"/>
-                <a:ea typeface="Open Sans" panose="020B0606030504020204" pitchFamily="34" charset="0"/>
-                <a:cs typeface="Open Sans" panose="020B0606030504020204" pitchFamily="34" charset="0"/>
-              </a:rPr>
-              <a:t>where </a:t>
-            </a:r>
-            <a:r>
               <a:rPr lang="en-US" sz="2400" dirty="0">
                 <a:latin typeface="Open Sans" panose="020B0606030504020204" pitchFamily="34" charset="0"/>
                 <a:ea typeface="Open Sans" panose="020B0606030504020204" pitchFamily="34" charset="0"/>
                 <a:cs typeface="Open Sans" panose="020B0606030504020204" pitchFamily="34" charset="0"/>
               </a:rPr>
-              <a:t>h is total head, </a:t>
+              <a:t>where h is total head, </a:t>
             </a:r>
             <a:r>
               <a:rPr lang="en-US" sz="2400" dirty="0" err="1">
@@ -13294,31 +12896,7 @@
                 <a:ea typeface="Open Sans" panose="020B0606030504020204" pitchFamily="34" charset="0"/>
                 <a:cs typeface="Open Sans" panose="020B0606030504020204" pitchFamily="34" charset="0"/>
               </a:rPr>
-              <a:t> coefficients of permeability </a:t>
-            </a:r>
-            <a:r>
-              <a:rPr lang="en-US" sz="2400" dirty="0" smtClean="0">
-                <a:latin typeface="Open Sans" panose="020B0606030504020204" pitchFamily="34" charset="0"/>
-                <a:ea typeface="Open Sans" panose="020B0606030504020204" pitchFamily="34" charset="0"/>
-                <a:cs typeface="Open Sans" panose="020B0606030504020204" pitchFamily="34" charset="0"/>
-              </a:rPr>
-              <a:t>in </a:t>
-            </a:r>
-            <a:r>
-              <a:rPr lang="en-US" sz="2400" dirty="0">
-                <a:latin typeface="Open Sans" panose="020B0606030504020204" pitchFamily="34" charset="0"/>
-                <a:ea typeface="Open Sans" panose="020B0606030504020204" pitchFamily="34" charset="0"/>
-                <a:cs typeface="Open Sans" panose="020B0606030504020204" pitchFamily="34" charset="0"/>
-              </a:rPr>
-              <a:t>x &amp; z directions</a:t>
-            </a:r>
-            <a:r>
-              <a:rPr lang="en-US" sz="2400" dirty="0" smtClean="0">
-                <a:latin typeface="Open Sans" panose="020B0606030504020204" pitchFamily="34" charset="0"/>
-                <a:ea typeface="Open Sans" panose="020B0606030504020204" pitchFamily="34" charset="0"/>
-                <a:cs typeface="Open Sans" panose="020B0606030504020204" pitchFamily="34" charset="0"/>
-              </a:rPr>
-              <a:t>.</a:t>
+              <a:t> coefficients of permeability in x &amp; z directions.</a:t>
             </a:r>
           </a:p>
           <a:p>
@@ -13548,7 +13126,7 @@
           <a:graphicData uri="http://schemas.openxmlformats.org/presentationml/2006/ole">
             <mc:AlternateContent xmlns:mc="http://schemas.openxmlformats.org/markup-compatibility/2006">
               <mc:Choice xmlns:v="urn:schemas-microsoft-com:vml" Requires="v">
-                <p:oleObj spid="_x0000_s1152" name="Equation" r:id="rId3" imgW="1193760" imgH="419040" progId="Equation.3">
+                <p:oleObj spid="_x0000_s1160" name="Equation" r:id="rId3" imgW="1193760" imgH="419040" progId="Equation.3">
                   <p:embed/>
                 </p:oleObj>
               </mc:Choice>
@@ -13618,7 +13196,7 @@
           <a:graphicData uri="http://schemas.openxmlformats.org/presentationml/2006/ole">
             <mc:AlternateContent xmlns:mc="http://schemas.openxmlformats.org/markup-compatibility/2006">
               <mc:Choice xmlns:v="urn:schemas-microsoft-com:vml" Requires="v">
-                <p:oleObj spid="_x0000_s1153" name="Equation" r:id="rId5" imgW="888840" imgH="419040" progId="Equation.3">
+                <p:oleObj spid="_x0000_s1161" name="Equation" r:id="rId5" imgW="888840" imgH="419040" progId="Equation.3">
                   <p:embed/>
                 </p:oleObj>
               </mc:Choice>
@@ -13747,15 +13325,7 @@
                 <a:ea typeface="Open Sans" panose="020B0606030504020204" pitchFamily="34" charset="0"/>
                 <a:cs typeface="Open Sans" panose="020B0606030504020204" pitchFamily="34" charset="0"/>
               </a:rPr>
-              <a:t>Procedure </a:t>
-            </a:r>
-            <a:r>
-              <a:rPr lang="en-US" b="1" dirty="0" smtClean="0">
-                <a:latin typeface="Open Sans" panose="020B0606030504020204" pitchFamily="34" charset="0"/>
-                <a:ea typeface="Open Sans" panose="020B0606030504020204" pitchFamily="34" charset="0"/>
-                <a:cs typeface="Open Sans" panose="020B0606030504020204" pitchFamily="34" charset="0"/>
-              </a:rPr>
-              <a:t>…</a:t>
+              <a:t>Procedure …</a:t>
             </a:r>
             <a:endParaRPr lang="en-GB" b="1" dirty="0">
               <a:latin typeface="Open Sans" panose="020B0606030504020204" pitchFamily="34" charset="0"/>
@@ -13797,15 +13367,7 @@
                 <a:ea typeface="Open Sans" panose="020B0606030504020204" pitchFamily="34" charset="0"/>
                 <a:cs typeface="Open Sans" panose="020B0606030504020204" pitchFamily="34" charset="0"/>
               </a:rPr>
-              <a:t>Step </a:t>
-            </a:r>
-            <a:r>
-              <a:rPr lang="en-US" sz="2400" b="1" dirty="0" smtClean="0">
-                <a:latin typeface="Open Sans" panose="020B0606030504020204" pitchFamily="34" charset="0"/>
-                <a:ea typeface="Open Sans" panose="020B0606030504020204" pitchFamily="34" charset="0"/>
-                <a:cs typeface="Open Sans" panose="020B0606030504020204" pitchFamily="34" charset="0"/>
-              </a:rPr>
-              <a:t>6:</a:t>
+              <a:t>Step 6:</a:t>
             </a:r>
           </a:p>
           <a:p>
@@ -13819,15 +13381,7 @@
                 <a:ea typeface="Open Sans" panose="020B0606030504020204" pitchFamily="34" charset="0"/>
                 <a:cs typeface="Open Sans" panose="020B0606030504020204" pitchFamily="34" charset="0"/>
               </a:rPr>
-              <a:t>Repeat item 5 until the new value at the node differs from the old value by a small numerical tolerance for example 0.001 </a:t>
-            </a:r>
-            <a:r>
-              <a:rPr lang="en-US" sz="2400" dirty="0" smtClean="0">
-                <a:latin typeface="Open Sans" panose="020B0606030504020204" pitchFamily="34" charset="0"/>
-                <a:ea typeface="Open Sans" panose="020B0606030504020204" pitchFamily="34" charset="0"/>
-                <a:cs typeface="Open Sans" panose="020B0606030504020204" pitchFamily="34" charset="0"/>
-              </a:rPr>
-              <a:t>m.</a:t>
+              <a:t>Repeat item 5 until the new value at the node differs from the old value by a small numerical tolerance for example 0.001 m.</a:t>
             </a:r>
           </a:p>
           <a:p>
@@ -13854,29 +13408,8 @@
                 <a:ea typeface="Open Sans" panose="020B0606030504020204" pitchFamily="34" charset="0"/>
                 <a:cs typeface="Open Sans" panose="020B0606030504020204" pitchFamily="34" charset="0"/>
               </a:rPr>
-              <a:t>Arbitrarily select a sequential set of nodes along a column of nodes and calculate the flow, q, using eqn. </a:t>
+              <a:t>Arbitrarily select a sequential set of nodes along a column of nodes and calculate the flow, q, using eqn. (5.6). It is best to calculate q’ = q for a unit permeability value to avoid too many decimal points in the calculations.</a:t>
             </a:r>
-            <a:r>
-              <a:rPr lang="en-US" sz="2400" dirty="0" smtClean="0">
-                <a:latin typeface="Open Sans" panose="020B0606030504020204" pitchFamily="34" charset="0"/>
-                <a:ea typeface="Open Sans" panose="020B0606030504020204" pitchFamily="34" charset="0"/>
-                <a:cs typeface="Open Sans" panose="020B0606030504020204" pitchFamily="34" charset="0"/>
-              </a:rPr>
-              <a:t>(5.6). </a:t>
-            </a:r>
-            <a:r>
-              <a:rPr lang="en-US" sz="2400" dirty="0">
-                <a:latin typeface="Open Sans" panose="020B0606030504020204" pitchFamily="34" charset="0"/>
-                <a:ea typeface="Open Sans" panose="020B0606030504020204" pitchFamily="34" charset="0"/>
-                <a:cs typeface="Open Sans" panose="020B0606030504020204" pitchFamily="34" charset="0"/>
-              </a:rPr>
-              <a:t>It is best to calculate q’ = q for a unit permeability value to avoid too many decimal points in the calculations.</a:t>
-            </a:r>
-            <a:endParaRPr lang="en-US" sz="2400" dirty="0" smtClean="0">
-              <a:latin typeface="Open Sans" panose="020B0606030504020204" pitchFamily="34" charset="0"/>
-              <a:ea typeface="Open Sans" panose="020B0606030504020204" pitchFamily="34" charset="0"/>
-              <a:cs typeface="Open Sans" panose="020B0606030504020204" pitchFamily="34" charset="0"/>
-            </a:endParaRPr>
           </a:p>
         </p:txBody>
       </p:sp>
@@ -14036,13 +13569,6 @@
   <p:clrMapOvr>
     <a:masterClrMapping/>
   </p:clrMapOvr>
-  <p:timing>
-    <p:tnLst>
-      <p:par>
-        <p:cTn id="1" dur="indefinite" restart="never" nodeType="tmRoot"/>
-      </p:par>
-    </p:tnLst>
-  </p:timing>
 </p:sld>
 </file>
 
@@ -14114,15 +13640,7 @@
                 <a:ea typeface="Open Sans" panose="020B0606030504020204" pitchFamily="34" charset="0"/>
                 <a:cs typeface="Open Sans" panose="020B0606030504020204" pitchFamily="34" charset="0"/>
               </a:rPr>
-              <a:t>Procedure </a:t>
-            </a:r>
-            <a:r>
-              <a:rPr lang="en-US" b="1" dirty="0" smtClean="0">
-                <a:latin typeface="Open Sans" panose="020B0606030504020204" pitchFamily="34" charset="0"/>
-                <a:ea typeface="Open Sans" panose="020B0606030504020204" pitchFamily="34" charset="0"/>
-                <a:cs typeface="Open Sans" panose="020B0606030504020204" pitchFamily="34" charset="0"/>
-              </a:rPr>
-              <a:t>…</a:t>
+              <a:t>Procedure …</a:t>
             </a:r>
             <a:endParaRPr lang="en-GB" b="1" dirty="0">
               <a:latin typeface="Open Sans" panose="020B0606030504020204" pitchFamily="34" charset="0"/>
@@ -14164,15 +13682,7 @@
                 <a:ea typeface="Open Sans" panose="020B0606030504020204" pitchFamily="34" charset="0"/>
                 <a:cs typeface="Open Sans" panose="020B0606030504020204" pitchFamily="34" charset="0"/>
               </a:rPr>
-              <a:t>Step </a:t>
-            </a:r>
-            <a:r>
-              <a:rPr lang="en-US" sz="2400" b="1" dirty="0" smtClean="0">
-                <a:latin typeface="Open Sans" panose="020B0606030504020204" pitchFamily="34" charset="0"/>
-                <a:ea typeface="Open Sans" panose="020B0606030504020204" pitchFamily="34" charset="0"/>
-                <a:cs typeface="Open Sans" panose="020B0606030504020204" pitchFamily="34" charset="0"/>
-              </a:rPr>
-              <a:t>8:</a:t>
+              <a:t>Step 8:</a:t>
             </a:r>
           </a:p>
           <a:p>
@@ -14186,15 +13696,7 @@
                 <a:ea typeface="Open Sans" panose="020B0606030504020204" pitchFamily="34" charset="0"/>
                 <a:cs typeface="Open Sans" panose="020B0606030504020204" pitchFamily="34" charset="0"/>
               </a:rPr>
-              <a:t>Repeat items 1 to 6, to find the flow distribution by replacing heads by flow q’. For example, the flow rate, calculated in item 7 is applied to all nodes along AC and </a:t>
-            </a:r>
-            <a:r>
-              <a:rPr lang="en-US" sz="2400" dirty="0" smtClean="0">
-                <a:latin typeface="Open Sans" panose="020B0606030504020204" pitchFamily="34" charset="0"/>
-                <a:ea typeface="Open Sans" panose="020B0606030504020204" pitchFamily="34" charset="0"/>
-                <a:cs typeface="Open Sans" panose="020B0606030504020204" pitchFamily="34" charset="0"/>
-              </a:rPr>
-              <a:t>CF.</a:t>
+              <a:t>Repeat items 1 to 6, to find the flow distribution by replacing heads by flow q’. For example, the flow rate, calculated in item 7 is applied to all nodes along AC and CF.</a:t>
             </a:r>
           </a:p>
           <a:p>
@@ -14207,21 +13709,8 @@
                 <a:ea typeface="Open Sans" panose="020B0606030504020204" pitchFamily="34" charset="0"/>
                 <a:cs typeface="Open Sans" panose="020B0606030504020204" pitchFamily="34" charset="0"/>
               </a:rPr>
-              <a:t>Step </a:t>
+              <a:t>Step 9:</a:t>
             </a:r>
-            <a:r>
-              <a:rPr lang="en-US" sz="2400" b="1" dirty="0" smtClean="0">
-                <a:latin typeface="Open Sans" panose="020B0606030504020204" pitchFamily="34" charset="0"/>
-                <a:ea typeface="Open Sans" panose="020B0606030504020204" pitchFamily="34" charset="0"/>
-                <a:cs typeface="Open Sans" panose="020B0606030504020204" pitchFamily="34" charset="0"/>
-              </a:rPr>
-              <a:t>9:</a:t>
-            </a:r>
-            <a:endParaRPr lang="en-US" sz="2400" b="1" dirty="0">
-              <a:latin typeface="Open Sans" panose="020B0606030504020204" pitchFamily="34" charset="0"/>
-              <a:ea typeface="Open Sans" panose="020B0606030504020204" pitchFamily="34" charset="0"/>
-              <a:cs typeface="Open Sans" panose="020B0606030504020204" pitchFamily="34" charset="0"/>
-            </a:endParaRPr>
           </a:p>
           <a:p>
             <a:pPr algn="just">
@@ -14234,15 +13723,7 @@
                 <a:ea typeface="Open Sans" panose="020B0606030504020204" pitchFamily="34" charset="0"/>
                 <a:cs typeface="Open Sans" panose="020B0606030504020204" pitchFamily="34" charset="0"/>
               </a:rPr>
-              <a:t>Calculate the pore water pressure distribution using eqn. </a:t>
-            </a:r>
-            <a:r>
-              <a:rPr lang="en-US" sz="2400" dirty="0" smtClean="0">
-                <a:latin typeface="Open Sans" panose="020B0606030504020204" pitchFamily="34" charset="0"/>
-                <a:ea typeface="Open Sans" panose="020B0606030504020204" pitchFamily="34" charset="0"/>
-                <a:cs typeface="Open Sans" panose="020B0606030504020204" pitchFamily="34" charset="0"/>
-              </a:rPr>
-              <a:t>(5.5).</a:t>
+              <a:t>Calculate the pore water pressure distribution using eqn. (5.5).</a:t>
             </a:r>
           </a:p>
         </p:txBody>
@@ -14403,13 +13884,6 @@
   <p:clrMapOvr>
     <a:masterClrMapping/>
   </p:clrMapOvr>
-  <p:timing>
-    <p:tnLst>
-      <p:par>
-        <p:cTn id="1" dur="indefinite" restart="never" nodeType="tmRoot"/>
-      </p:par>
-    </p:tnLst>
-  </p:timing>
 </p:sld>
 </file>
 
@@ -14519,37 +13993,8 @@
                 <a:ea typeface="Open Sans" panose="020B0606030504020204" pitchFamily="34" charset="0"/>
                 <a:cs typeface="Open Sans" panose="020B0606030504020204" pitchFamily="34" charset="0"/>
               </a:rPr>
-              <a:t>Determine the flow under the sheet pile wall </a:t>
+              <a:t>Determine the flow under the sheet pile wall below and the pore water pressure distribution using FD. </a:t>
             </a:r>
-            <a:r>
-              <a:rPr lang="en-US" sz="2400" dirty="0" smtClean="0">
-                <a:latin typeface="Open Sans" panose="020B0606030504020204" pitchFamily="34" charset="0"/>
-                <a:ea typeface="Open Sans" panose="020B0606030504020204" pitchFamily="34" charset="0"/>
-                <a:cs typeface="Open Sans" panose="020B0606030504020204" pitchFamily="34" charset="0"/>
-              </a:rPr>
-              <a:t>below </a:t>
-            </a:r>
-            <a:r>
-              <a:rPr lang="en-US" sz="2400" dirty="0">
-                <a:latin typeface="Open Sans" panose="020B0606030504020204" pitchFamily="34" charset="0"/>
-                <a:ea typeface="Open Sans" panose="020B0606030504020204" pitchFamily="34" charset="0"/>
-                <a:cs typeface="Open Sans" panose="020B0606030504020204" pitchFamily="34" charset="0"/>
-              </a:rPr>
-              <a:t>and the pore water pressure distribution using </a:t>
-            </a:r>
-            <a:r>
-              <a:rPr lang="en-US" sz="2400" dirty="0" smtClean="0">
-                <a:latin typeface="Open Sans" panose="020B0606030504020204" pitchFamily="34" charset="0"/>
-                <a:ea typeface="Open Sans" panose="020B0606030504020204" pitchFamily="34" charset="0"/>
-                <a:cs typeface="Open Sans" panose="020B0606030504020204" pitchFamily="34" charset="0"/>
-              </a:rPr>
-              <a:t>FD. </a:t>
-            </a:r>
-            <a:endParaRPr lang="en-US" sz="2400" dirty="0">
-              <a:latin typeface="Open Sans" panose="020B0606030504020204" pitchFamily="34" charset="0"/>
-              <a:ea typeface="Open Sans" panose="020B0606030504020204" pitchFamily="34" charset="0"/>
-              <a:cs typeface="Open Sans" panose="020B0606030504020204" pitchFamily="34" charset="0"/>
-            </a:endParaRPr>
           </a:p>
           <a:p>
             <a:pPr marL="0" indent="0" algn="just">
@@ -14809,18 +14254,13 @@
           <a:p>
             <a:pPr algn="l"/>
             <a:r>
-              <a:rPr lang="en-GB" b="1" dirty="0" smtClean="0">
+              <a:rPr lang="en-GB" b="1" dirty="0">
                 <a:latin typeface="Open Sans" panose="020B0606030504020204" pitchFamily="34" charset="0"/>
                 <a:ea typeface="Open Sans" panose="020B0606030504020204" pitchFamily="34" charset="0"/>
                 <a:cs typeface="Open Sans" panose="020B0606030504020204" pitchFamily="34" charset="0"/>
               </a:rPr>
               <a:t>Excel Solution</a:t>
             </a:r>
-            <a:endParaRPr lang="en-GB" b="1" dirty="0">
-              <a:latin typeface="Open Sans" panose="020B0606030504020204" pitchFamily="34" charset="0"/>
-              <a:ea typeface="Open Sans" panose="020B0606030504020204" pitchFamily="34" charset="0"/>
-              <a:cs typeface="Open Sans" panose="020B0606030504020204" pitchFamily="34" charset="0"/>
-            </a:endParaRPr>
           </a:p>
         </p:txBody>
       </p:sp>
@@ -14862,21 +14302,7 @@
                 <a:ea typeface="Open Sans" panose="020B0606030504020204" pitchFamily="34" charset="0"/>
                 <a:cs typeface="Open Sans" panose="020B0606030504020204" pitchFamily="34" charset="0"/>
               </a:rPr>
-              <a:t>Step 1</a:t>
-            </a:r>
-            <a:r>
-              <a:rPr lang="en-US" sz="2400" b="1" dirty="0" smtClean="0">
-                <a:solidFill>
-                  <a:schemeClr val="tx2">
-                    <a:lumMod val="60000"/>
-                    <a:lumOff val="40000"/>
-                  </a:schemeClr>
-                </a:solidFill>
-                <a:latin typeface="Open Sans" panose="020B0606030504020204" pitchFamily="34" charset="0"/>
-                <a:ea typeface="Open Sans" panose="020B0606030504020204" pitchFamily="34" charset="0"/>
-                <a:cs typeface="Open Sans" panose="020B0606030504020204" pitchFamily="34" charset="0"/>
-              </a:rPr>
-              <a:t>:</a:t>
+              <a:t>Step 1:</a:t>
             </a:r>
           </a:p>
           <a:p>
@@ -17497,13 +16923,6 @@
   <p:clrMapOvr>
     <a:masterClrMapping/>
   </p:clrMapOvr>
-  <p:timing>
-    <p:tnLst>
-      <p:par>
-        <p:cTn id="1" dur="indefinite" restart="never" nodeType="tmRoot"/>
-      </p:par>
-    </p:tnLst>
-  </p:timing>
 </p:sld>
 </file>
 
@@ -17575,21 +16994,8 @@
                 <a:ea typeface="Open Sans" panose="020B0606030504020204" pitchFamily="34" charset="0"/>
                 <a:cs typeface="Open Sans" panose="020B0606030504020204" pitchFamily="34" charset="0"/>
               </a:rPr>
-              <a:t>Excel </a:t>
+              <a:t>Excel Solution</a:t>
             </a:r>
-            <a:r>
-              <a:rPr lang="en-GB" b="1" dirty="0" smtClean="0">
-                <a:latin typeface="Open Sans" panose="020B0606030504020204" pitchFamily="34" charset="0"/>
-                <a:ea typeface="Open Sans" panose="020B0606030504020204" pitchFamily="34" charset="0"/>
-                <a:cs typeface="Open Sans" panose="020B0606030504020204" pitchFamily="34" charset="0"/>
-              </a:rPr>
-              <a:t>Solution</a:t>
-            </a:r>
-            <a:endParaRPr lang="en-GB" b="1" dirty="0">
-              <a:latin typeface="Open Sans" panose="020B0606030504020204" pitchFamily="34" charset="0"/>
-              <a:ea typeface="Open Sans" panose="020B0606030504020204" pitchFamily="34" charset="0"/>
-              <a:cs typeface="Open Sans" panose="020B0606030504020204" pitchFamily="34" charset="0"/>
-            </a:endParaRPr>
           </a:p>
         </p:txBody>
       </p:sp>
@@ -17631,21 +17037,7 @@
                 <a:ea typeface="Open Sans" panose="020B0606030504020204" pitchFamily="34" charset="0"/>
                 <a:cs typeface="Open Sans" panose="020B0606030504020204" pitchFamily="34" charset="0"/>
               </a:rPr>
-              <a:t>Step </a:t>
-            </a:r>
-            <a:r>
-              <a:rPr lang="en-US" sz="2400" b="1" dirty="0" smtClean="0">
-                <a:solidFill>
-                  <a:schemeClr val="tx2">
-                    <a:lumMod val="60000"/>
-                    <a:lumOff val="40000"/>
-                  </a:schemeClr>
-                </a:solidFill>
-                <a:latin typeface="Open Sans" panose="020B0606030504020204" pitchFamily="34" charset="0"/>
-                <a:ea typeface="Open Sans" panose="020B0606030504020204" pitchFamily="34" charset="0"/>
-                <a:cs typeface="Open Sans" panose="020B0606030504020204" pitchFamily="34" charset="0"/>
-              </a:rPr>
-              <a:t>2:</a:t>
+              <a:t>Step 2:</a:t>
             </a:r>
           </a:p>
           <a:p>
@@ -17659,15 +17051,7 @@
                 <a:ea typeface="Open Sans" panose="020B0606030504020204" pitchFamily="34" charset="0"/>
                 <a:cs typeface="Open Sans" panose="020B0606030504020204" pitchFamily="34" charset="0"/>
               </a:rPr>
-              <a:t>Identify the boundary conditions</a:t>
-            </a:r>
-            <a:r>
-              <a:rPr lang="en-US" sz="2400" dirty="0" smtClean="0">
-                <a:latin typeface="Open Sans" panose="020B0606030504020204" pitchFamily="34" charset="0"/>
-                <a:ea typeface="Open Sans" panose="020B0606030504020204" pitchFamily="34" charset="0"/>
-                <a:cs typeface="Open Sans" panose="020B0606030504020204" pitchFamily="34" charset="0"/>
-              </a:rPr>
-              <a:t>.</a:t>
+              <a:t>Identify the boundary conditions.</a:t>
             </a:r>
           </a:p>
           <a:p>
@@ -17689,15 +17073,7 @@
                 <a:ea typeface="Open Sans" panose="020B0606030504020204" pitchFamily="34" charset="0"/>
                 <a:cs typeface="Open Sans" panose="020B0606030504020204" pitchFamily="34" charset="0"/>
               </a:rPr>
-              <a:t> AB and CD are equipotential </a:t>
-            </a:r>
-            <a:r>
-              <a:rPr lang="en-US" sz="2000" dirty="0" smtClean="0">
-                <a:latin typeface="Open Sans" panose="020B0606030504020204" pitchFamily="34" charset="0"/>
-                <a:ea typeface="Open Sans" panose="020B0606030504020204" pitchFamily="34" charset="0"/>
-                <a:cs typeface="Open Sans" panose="020B0606030504020204" pitchFamily="34" charset="0"/>
-              </a:rPr>
-              <a:t>lines.</a:t>
+              <a:t> AB and CD are equipotential lines.</a:t>
             </a:r>
           </a:p>
           <a:p>
@@ -17752,15 +17128,7 @@
                 <a:ea typeface="Open Sans" panose="020B0606030504020204" pitchFamily="34" charset="0"/>
                 <a:cs typeface="Open Sans" panose="020B0606030504020204" pitchFamily="34" charset="0"/>
               </a:rPr>
-              <a:t>Determine the heads at equipotential </a:t>
-            </a:r>
-            <a:r>
-              <a:rPr lang="en-US" sz="2400" dirty="0" smtClean="0">
-                <a:latin typeface="Open Sans" panose="020B0606030504020204" pitchFamily="34" charset="0"/>
-                <a:ea typeface="Open Sans" panose="020B0606030504020204" pitchFamily="34" charset="0"/>
-                <a:cs typeface="Open Sans" panose="020B0606030504020204" pitchFamily="34" charset="0"/>
-              </a:rPr>
-              <a:t>boundaries.</a:t>
+              <a:t>Determine the heads at equipotential boundaries.</a:t>
             </a:r>
           </a:p>
           <a:p>
@@ -17774,39 +17142,7 @@
                 <a:ea typeface="Open Sans" panose="020B0606030504020204" pitchFamily="34" charset="0"/>
                 <a:cs typeface="Open Sans" panose="020B0606030504020204" pitchFamily="34" charset="0"/>
               </a:rPr>
-              <a:t>Along AB the head difference is </a:t>
-            </a:r>
-            <a:r>
-              <a:rPr lang="en-US" sz="2000" dirty="0" smtClean="0">
-                <a:latin typeface="Open Sans" panose="020B0606030504020204" pitchFamily="34" charset="0"/>
-                <a:ea typeface="Open Sans" panose="020B0606030504020204" pitchFamily="34" charset="0"/>
-                <a:cs typeface="Open Sans" panose="020B0606030504020204" pitchFamily="34" charset="0"/>
-              </a:rPr>
-              <a:t>4 </a:t>
-            </a:r>
-            <a:r>
-              <a:rPr lang="en-US" sz="2000" dirty="0">
-                <a:latin typeface="Open Sans" panose="020B0606030504020204" pitchFamily="34" charset="0"/>
-                <a:ea typeface="Open Sans" panose="020B0606030504020204" pitchFamily="34" charset="0"/>
-                <a:cs typeface="Open Sans" panose="020B0606030504020204" pitchFamily="34" charset="0"/>
-              </a:rPr>
-              <a:t>- </a:t>
-            </a:r>
-            <a:r>
-              <a:rPr lang="en-US" sz="2000" dirty="0" smtClean="0">
-                <a:latin typeface="Open Sans" panose="020B0606030504020204" pitchFamily="34" charset="0"/>
-                <a:ea typeface="Open Sans" panose="020B0606030504020204" pitchFamily="34" charset="0"/>
-                <a:cs typeface="Open Sans" panose="020B0606030504020204" pitchFamily="34" charset="0"/>
-              </a:rPr>
-              <a:t>1 </a:t>
-            </a:r>
-            <a:r>
-              <a:rPr lang="en-US" sz="2000" dirty="0">
-                <a:latin typeface="Open Sans" panose="020B0606030504020204" pitchFamily="34" charset="0"/>
-                <a:ea typeface="Open Sans" panose="020B0606030504020204" pitchFamily="34" charset="0"/>
-                <a:cs typeface="Open Sans" panose="020B0606030504020204" pitchFamily="34" charset="0"/>
-              </a:rPr>
-              <a:t>= 3 m.</a:t>
+              <a:t>Along AB the head difference is 4 - 1 = 3 m.</a:t>
             </a:r>
           </a:p>
           <a:p>
@@ -17820,15 +17156,7 @@
                 <a:ea typeface="Open Sans" panose="020B0606030504020204" pitchFamily="34" charset="0"/>
                 <a:cs typeface="Open Sans" panose="020B0606030504020204" pitchFamily="34" charset="0"/>
               </a:rPr>
-              <a:t>Along CD the head difference is 3/2 = 1.5 m</a:t>
-            </a:r>
-            <a:r>
-              <a:rPr lang="en-US" sz="2000" dirty="0" smtClean="0">
-                <a:latin typeface="Open Sans" panose="020B0606030504020204" pitchFamily="34" charset="0"/>
-                <a:ea typeface="Open Sans" panose="020B0606030504020204" pitchFamily="34" charset="0"/>
-                <a:cs typeface="Open Sans" panose="020B0606030504020204" pitchFamily="34" charset="0"/>
-              </a:rPr>
-              <a:t>.</a:t>
+              <a:t>Along CD the head difference is 3/2 = 1.5 m.</a:t>
             </a:r>
             <a:endParaRPr lang="en-US" sz="2400" dirty="0">
               <a:latin typeface="Open Sans" panose="020B0606030504020204" pitchFamily="34" charset="0"/>
@@ -18016,13 +17344,6 @@
   <p:clrMapOvr>
     <a:masterClrMapping/>
   </p:clrMapOvr>
-  <p:timing>
-    <p:tnLst>
-      <p:par>
-        <p:cTn id="1" dur="indefinite" restart="never" nodeType="tmRoot"/>
-      </p:par>
-    </p:tnLst>
-  </p:timing>
 </p:sld>
 </file>
 
@@ -18094,21 +17415,8 @@
                 <a:ea typeface="Open Sans" panose="020B0606030504020204" pitchFamily="34" charset="0"/>
                 <a:cs typeface="Open Sans" panose="020B0606030504020204" pitchFamily="34" charset="0"/>
               </a:rPr>
-              <a:t>Excel </a:t>
+              <a:t>Excel Solution</a:t>
             </a:r>
-            <a:r>
-              <a:rPr lang="en-GB" b="1" dirty="0" smtClean="0">
-                <a:latin typeface="Open Sans" panose="020B0606030504020204" pitchFamily="34" charset="0"/>
-                <a:ea typeface="Open Sans" panose="020B0606030504020204" pitchFamily="34" charset="0"/>
-                <a:cs typeface="Open Sans" panose="020B0606030504020204" pitchFamily="34" charset="0"/>
-              </a:rPr>
-              <a:t>Solution</a:t>
-            </a:r>
-            <a:endParaRPr lang="en-GB" b="1" dirty="0">
-              <a:latin typeface="Open Sans" panose="020B0606030504020204" pitchFamily="34" charset="0"/>
-              <a:ea typeface="Open Sans" panose="020B0606030504020204" pitchFamily="34" charset="0"/>
-              <a:cs typeface="Open Sans" panose="020B0606030504020204" pitchFamily="34" charset="0"/>
-            </a:endParaRPr>
           </a:p>
         </p:txBody>
       </p:sp>
@@ -18139,7 +17447,7 @@
               <a:buNone/>
             </a:pPr>
             <a:r>
-              <a:rPr lang="en-US" sz="2400" b="1" dirty="0" smtClean="0">
+              <a:rPr lang="en-US" sz="2400" b="1" dirty="0">
                 <a:solidFill>
                   <a:schemeClr val="tx2">
                     <a:lumMod val="60000"/>
@@ -18166,11 +17474,6 @@
               </a:rPr>
               <a:t>Insert the heads at the nodes.</a:t>
             </a:r>
-            <a:endParaRPr lang="en-US" sz="2400" dirty="0" smtClean="0">
-              <a:latin typeface="Open Sans" panose="020B0606030504020204" pitchFamily="34" charset="0"/>
-              <a:ea typeface="Open Sans" panose="020B0606030504020204" pitchFamily="34" charset="0"/>
-              <a:cs typeface="Open Sans" panose="020B0606030504020204" pitchFamily="34" charset="0"/>
-            </a:endParaRPr>
           </a:p>
           <a:p>
             <a:pPr lvl="1" algn="just">
@@ -18183,37 +17486,8 @@
                 <a:ea typeface="Open Sans" panose="020B0606030504020204" pitchFamily="34" charset="0"/>
                 <a:cs typeface="Open Sans" panose="020B0606030504020204" pitchFamily="34" charset="0"/>
               </a:rPr>
-              <a:t>Set up the initial parameters in cells </a:t>
+              <a:t>Set up the initial parameters in cells up to row 10.</a:t>
             </a:r>
-            <a:r>
-              <a:rPr lang="en-US" sz="2000" dirty="0" smtClean="0">
-                <a:latin typeface="Open Sans" panose="020B0606030504020204" pitchFamily="34" charset="0"/>
-                <a:ea typeface="Open Sans" panose="020B0606030504020204" pitchFamily="34" charset="0"/>
-                <a:cs typeface="Open Sans" panose="020B0606030504020204" pitchFamily="34" charset="0"/>
-              </a:rPr>
-              <a:t>up to </a:t>
-            </a:r>
-            <a:r>
-              <a:rPr lang="en-US" sz="2000" dirty="0">
-                <a:latin typeface="Open Sans" panose="020B0606030504020204" pitchFamily="34" charset="0"/>
-                <a:ea typeface="Open Sans" panose="020B0606030504020204" pitchFamily="34" charset="0"/>
-                <a:cs typeface="Open Sans" panose="020B0606030504020204" pitchFamily="34" charset="0"/>
-              </a:rPr>
-              <a:t>row </a:t>
-            </a:r>
-            <a:r>
-              <a:rPr lang="en-US" sz="2000" dirty="0" smtClean="0">
-                <a:latin typeface="Open Sans" panose="020B0606030504020204" pitchFamily="34" charset="0"/>
-                <a:ea typeface="Open Sans" panose="020B0606030504020204" pitchFamily="34" charset="0"/>
-                <a:cs typeface="Open Sans" panose="020B0606030504020204" pitchFamily="34" charset="0"/>
-              </a:rPr>
-              <a:t>10.</a:t>
-            </a:r>
-            <a:endParaRPr lang="en-US" sz="2000" dirty="0" smtClean="0">
-              <a:latin typeface="Open Sans" panose="020B0606030504020204" pitchFamily="34" charset="0"/>
-              <a:ea typeface="Open Sans" panose="020B0606030504020204" pitchFamily="34" charset="0"/>
-              <a:cs typeface="Open Sans" panose="020B0606030504020204" pitchFamily="34" charset="0"/>
-            </a:endParaRPr>
           </a:p>
           <a:p>
             <a:pPr lvl="1" algn="just">
@@ -18226,29 +17500,8 @@
                 <a:ea typeface="Open Sans" panose="020B0606030504020204" pitchFamily="34" charset="0"/>
                 <a:cs typeface="Open Sans" panose="020B0606030504020204" pitchFamily="34" charset="0"/>
               </a:rPr>
-              <a:t>In cells B12 to N12 </a:t>
+              <a:t>In cells B12 to N12 enter head value of 3.</a:t>
             </a:r>
-            <a:r>
-              <a:rPr lang="en-US" sz="2000" dirty="0">
-                <a:latin typeface="Open Sans" panose="020B0606030504020204" pitchFamily="34" charset="0"/>
-                <a:ea typeface="Open Sans" panose="020B0606030504020204" pitchFamily="34" charset="0"/>
-                <a:cs typeface="Open Sans" panose="020B0606030504020204" pitchFamily="34" charset="0"/>
-              </a:rPr>
-              <a:t>enter head value of </a:t>
-            </a:r>
-            <a:r>
-              <a:rPr lang="en-US" sz="2000" dirty="0" smtClean="0">
-                <a:latin typeface="Open Sans" panose="020B0606030504020204" pitchFamily="34" charset="0"/>
-                <a:ea typeface="Open Sans" panose="020B0606030504020204" pitchFamily="34" charset="0"/>
-                <a:cs typeface="Open Sans" panose="020B0606030504020204" pitchFamily="34" charset="0"/>
-              </a:rPr>
-              <a:t>3.</a:t>
-            </a:r>
-            <a:endParaRPr lang="en-US" sz="2000" dirty="0" smtClean="0">
-              <a:latin typeface="Open Sans" panose="020B0606030504020204" pitchFamily="34" charset="0"/>
-              <a:ea typeface="Open Sans" panose="020B0606030504020204" pitchFamily="34" charset="0"/>
-              <a:cs typeface="Open Sans" panose="020B0606030504020204" pitchFamily="34" charset="0"/>
-            </a:endParaRPr>
           </a:p>
           <a:p>
             <a:pPr lvl="1" algn="just">
@@ -18261,23 +17514,7 @@
                 <a:ea typeface="Open Sans" panose="020B0606030504020204" pitchFamily="34" charset="0"/>
                 <a:cs typeface="Open Sans" panose="020B0606030504020204" pitchFamily="34" charset="0"/>
               </a:rPr>
-              <a:t>In cells N15 to N18 </a:t>
-            </a:r>
-            <a:r>
-              <a:rPr lang="en-US" sz="2000" dirty="0">
-                <a:latin typeface="Open Sans" panose="020B0606030504020204" pitchFamily="34" charset="0"/>
-                <a:ea typeface="Open Sans" panose="020B0606030504020204" pitchFamily="34" charset="0"/>
-                <a:cs typeface="Open Sans" panose="020B0606030504020204" pitchFamily="34" charset="0"/>
-              </a:rPr>
-              <a:t>enter head value of 1.5</a:t>
-            </a:r>
-            <a:r>
-              <a:rPr lang="en-US" sz="2000" dirty="0" smtClean="0">
-                <a:latin typeface="Open Sans" panose="020B0606030504020204" pitchFamily="34" charset="0"/>
-                <a:ea typeface="Open Sans" panose="020B0606030504020204" pitchFamily="34" charset="0"/>
-                <a:cs typeface="Open Sans" panose="020B0606030504020204" pitchFamily="34" charset="0"/>
-              </a:rPr>
-              <a:t>.</a:t>
+              <a:t>In cells N15 to N18 enter head value of 1.5.</a:t>
             </a:r>
           </a:p>
           <a:p>
@@ -18286,28 +17523,12 @@
               <a:buChar char="o"/>
             </a:pPr>
             <a:r>
-              <a:rPr lang="en-US" sz="2000" dirty="0" smtClean="0">
-                <a:latin typeface="Open Sans" panose="020B0606030504020204" pitchFamily="34" charset="0"/>
-                <a:ea typeface="Open Sans" panose="020B0606030504020204" pitchFamily="34" charset="0"/>
-                <a:cs typeface="Open Sans" panose="020B0606030504020204" pitchFamily="34" charset="0"/>
-              </a:rPr>
-              <a:t>Arbitrarily </a:t>
-            </a:r>
-            <a:r>
               <a:rPr lang="en-US" sz="2000" dirty="0">
                 <a:latin typeface="Open Sans" panose="020B0606030504020204" pitchFamily="34" charset="0"/>
                 <a:ea typeface="Open Sans" panose="020B0606030504020204" pitchFamily="34" charset="0"/>
                 <a:cs typeface="Open Sans" panose="020B0606030504020204" pitchFamily="34" charset="0"/>
               </a:rPr>
-              <a:t>insert values in all other cells from B13 to M18, N13 &amp; </a:t>
-            </a:r>
-            <a:r>
-              <a:rPr lang="en-US" sz="2000" dirty="0" smtClean="0">
-                <a:latin typeface="Open Sans" panose="020B0606030504020204" pitchFamily="34" charset="0"/>
-                <a:ea typeface="Open Sans" panose="020B0606030504020204" pitchFamily="34" charset="0"/>
-                <a:cs typeface="Open Sans" panose="020B0606030504020204" pitchFamily="34" charset="0"/>
-              </a:rPr>
-              <a:t>N14.</a:t>
+              <a:t>Arbitrarily insert values in all other cells from B13 to M18, N13 &amp; N14.</a:t>
             </a:r>
             <a:endParaRPr lang="en-US" sz="2400" dirty="0">
               <a:latin typeface="Open Sans" panose="020B0606030504020204" pitchFamily="34" charset="0"/>
@@ -18484,13 +17705,6 @@
   <p:clrMapOvr>
     <a:masterClrMapping/>
   </p:clrMapOvr>
-  <p:timing>
-    <p:tnLst>
-      <p:par>
-        <p:cTn id="1" dur="indefinite" restart="never" nodeType="tmRoot"/>
-      </p:par>
-    </p:tnLst>
-  </p:timing>
 </p:sld>
 </file>
 
@@ -18562,21 +17776,8 @@
                 <a:ea typeface="Open Sans" panose="020B0606030504020204" pitchFamily="34" charset="0"/>
                 <a:cs typeface="Open Sans" panose="020B0606030504020204" pitchFamily="34" charset="0"/>
               </a:rPr>
-              <a:t>Excel </a:t>
+              <a:t>Excel Solution</a:t>
             </a:r>
-            <a:r>
-              <a:rPr lang="en-GB" b="1" dirty="0" smtClean="0">
-                <a:latin typeface="Open Sans" panose="020B0606030504020204" pitchFamily="34" charset="0"/>
-                <a:ea typeface="Open Sans" panose="020B0606030504020204" pitchFamily="34" charset="0"/>
-                <a:cs typeface="Open Sans" panose="020B0606030504020204" pitchFamily="34" charset="0"/>
-              </a:rPr>
-              <a:t>Solution</a:t>
-            </a:r>
-            <a:endParaRPr lang="en-GB" b="1" dirty="0">
-              <a:latin typeface="Open Sans" panose="020B0606030504020204" pitchFamily="34" charset="0"/>
-              <a:ea typeface="Open Sans" panose="020B0606030504020204" pitchFamily="34" charset="0"/>
-              <a:cs typeface="Open Sans" panose="020B0606030504020204" pitchFamily="34" charset="0"/>
-            </a:endParaRPr>
           </a:p>
         </p:txBody>
       </p:sp>
@@ -18618,21 +17819,7 @@
                 <a:ea typeface="Open Sans" panose="020B0606030504020204" pitchFamily="34" charset="0"/>
                 <a:cs typeface="Open Sans" panose="020B0606030504020204" pitchFamily="34" charset="0"/>
               </a:rPr>
-              <a:t>Step 5</a:t>
-            </a:r>
-            <a:r>
-              <a:rPr lang="en-US" sz="2400" b="1" dirty="0" smtClean="0">
-                <a:solidFill>
-                  <a:schemeClr val="tx2">
-                    <a:lumMod val="60000"/>
-                    <a:lumOff val="40000"/>
-                  </a:schemeClr>
-                </a:solidFill>
-                <a:latin typeface="Open Sans" panose="020B0606030504020204" pitchFamily="34" charset="0"/>
-                <a:ea typeface="Open Sans" panose="020B0606030504020204" pitchFamily="34" charset="0"/>
-                <a:cs typeface="Open Sans" panose="020B0606030504020204" pitchFamily="34" charset="0"/>
-              </a:rPr>
-              <a:t>:</a:t>
+              <a:t>Step 5:</a:t>
             </a:r>
           </a:p>
           <a:p>
@@ -18646,15 +17833,7 @@
                 <a:ea typeface="Open Sans" panose="020B0606030504020204" pitchFamily="34" charset="0"/>
                 <a:cs typeface="Open Sans" panose="020B0606030504020204" pitchFamily="34" charset="0"/>
               </a:rPr>
-              <a:t>Apply the appropriate </a:t>
-            </a:r>
-            <a:r>
-              <a:rPr lang="en-US" sz="2400" dirty="0" smtClean="0">
-                <a:latin typeface="Open Sans" panose="020B0606030504020204" pitchFamily="34" charset="0"/>
-                <a:ea typeface="Open Sans" panose="020B0606030504020204" pitchFamily="34" charset="0"/>
-                <a:cs typeface="Open Sans" panose="020B0606030504020204" pitchFamily="34" charset="0"/>
-              </a:rPr>
-              <a:t>equations.</a:t>
+              <a:t>Apply the appropriate equations.</a:t>
             </a:r>
           </a:p>
           <a:p>
@@ -18668,21 +17847,8 @@
                 <a:ea typeface="Open Sans" panose="020B0606030504020204" pitchFamily="34" charset="0"/>
                 <a:cs typeface="Open Sans" panose="020B0606030504020204" pitchFamily="34" charset="0"/>
               </a:rPr>
-              <a:t>On the impermeable boundaries – cells B13 to B18, C18 to M18, and N13 to N14, apply eqn. (5.2), (5.3) or (5.4), </a:t>
+              <a:t>On the impermeable boundaries – cells B13 to B18, C18 to M18, and N13 to N14, apply eqn. (5.2), (5.3) or (5.4), appropriately.</a:t>
             </a:r>
-            <a:r>
-              <a:rPr lang="en-US" sz="2000" dirty="0" smtClean="0">
-                <a:latin typeface="Open Sans" panose="020B0606030504020204" pitchFamily="34" charset="0"/>
-                <a:ea typeface="Open Sans" panose="020B0606030504020204" pitchFamily="34" charset="0"/>
-                <a:cs typeface="Open Sans" panose="020B0606030504020204" pitchFamily="34" charset="0"/>
-              </a:rPr>
-              <a:t>appropriately.</a:t>
-            </a:r>
-            <a:endParaRPr lang="en-US" sz="2000" dirty="0" smtClean="0">
-              <a:latin typeface="Open Sans" panose="020B0606030504020204" pitchFamily="34" charset="0"/>
-              <a:ea typeface="Open Sans" panose="020B0606030504020204" pitchFamily="34" charset="0"/>
-              <a:cs typeface="Open Sans" panose="020B0606030504020204" pitchFamily="34" charset="0"/>
-            </a:endParaRPr>
           </a:p>
           <a:p>
             <a:pPr lvl="1" algn="just">
@@ -18695,47 +17861,7 @@
                 <a:ea typeface="Open Sans" panose="020B0606030504020204" pitchFamily="34" charset="0"/>
                 <a:cs typeface="Open Sans" panose="020B0606030504020204" pitchFamily="34" charset="0"/>
               </a:rPr>
-              <a:t>Apply eqn. </a:t>
-            </a:r>
-            <a:r>
-              <a:rPr lang="en-US" sz="2000" dirty="0" smtClean="0">
-                <a:latin typeface="Open Sans" panose="020B0606030504020204" pitchFamily="34" charset="0"/>
-                <a:ea typeface="Open Sans" panose="020B0606030504020204" pitchFamily="34" charset="0"/>
-                <a:cs typeface="Open Sans" panose="020B0606030504020204" pitchFamily="34" charset="0"/>
-              </a:rPr>
-              <a:t>(5.1</a:t>
-            </a:r>
-            <a:r>
-              <a:rPr lang="en-US" sz="2000" dirty="0">
-                <a:latin typeface="Open Sans" panose="020B0606030504020204" pitchFamily="34" charset="0"/>
-                <a:ea typeface="Open Sans" panose="020B0606030504020204" pitchFamily="34" charset="0"/>
-                <a:cs typeface="Open Sans" panose="020B0606030504020204" pitchFamily="34" charset="0"/>
-              </a:rPr>
-              <a:t>) </a:t>
-            </a:r>
-            <a:r>
-              <a:rPr lang="en-US" sz="2000" dirty="0" smtClean="0">
-                <a:latin typeface="Open Sans" panose="020B0606030504020204" pitchFamily="34" charset="0"/>
-                <a:ea typeface="Open Sans" panose="020B0606030504020204" pitchFamily="34" charset="0"/>
-                <a:cs typeface="Open Sans" panose="020B0606030504020204" pitchFamily="34" charset="0"/>
-              </a:rPr>
-              <a:t>to </a:t>
-            </a:r>
-            <a:r>
-              <a:rPr lang="en-US" sz="2000" dirty="0">
-                <a:latin typeface="Open Sans" panose="020B0606030504020204" pitchFamily="34" charset="0"/>
-                <a:ea typeface="Open Sans" panose="020B0606030504020204" pitchFamily="34" charset="0"/>
-                <a:cs typeface="Open Sans" panose="020B0606030504020204" pitchFamily="34" charset="0"/>
-              </a:rPr>
-              <a:t>all other cells except cells with known heads</a:t>
-            </a:r>
-            <a:r>
-              <a:rPr lang="en-US" sz="2000" dirty="0" smtClean="0">
-                <a:latin typeface="Open Sans" panose="020B0606030504020204" pitchFamily="34" charset="0"/>
-                <a:ea typeface="Open Sans" panose="020B0606030504020204" pitchFamily="34" charset="0"/>
-                <a:cs typeface="Open Sans" panose="020B0606030504020204" pitchFamily="34" charset="0"/>
-              </a:rPr>
-              <a:t>.</a:t>
+              <a:t>Apply eqn. (5.1) to all other cells except cells with known heads.</a:t>
             </a:r>
           </a:p>
         </p:txBody>
@@ -18896,13 +18022,6 @@
   <p:clrMapOvr>
     <a:masterClrMapping/>
   </p:clrMapOvr>
-  <p:timing>
-    <p:tnLst>
-      <p:par>
-        <p:cTn id="1" dur="indefinite" restart="never" nodeType="tmRoot"/>
-      </p:par>
-    </p:tnLst>
-  </p:timing>
 </p:sld>
 </file>
 
@@ -18974,21 +18093,8 @@
                 <a:ea typeface="Open Sans" panose="020B0606030504020204" pitchFamily="34" charset="0"/>
                 <a:cs typeface="Open Sans" panose="020B0606030504020204" pitchFamily="34" charset="0"/>
               </a:rPr>
-              <a:t>Excel </a:t>
+              <a:t>Excel Solution</a:t>
             </a:r>
-            <a:r>
-              <a:rPr lang="en-GB" b="1" dirty="0" smtClean="0">
-                <a:latin typeface="Open Sans" panose="020B0606030504020204" pitchFamily="34" charset="0"/>
-                <a:ea typeface="Open Sans" panose="020B0606030504020204" pitchFamily="34" charset="0"/>
-                <a:cs typeface="Open Sans" panose="020B0606030504020204" pitchFamily="34" charset="0"/>
-              </a:rPr>
-              <a:t>Solution</a:t>
-            </a:r>
-            <a:endParaRPr lang="en-GB" b="1" dirty="0">
-              <a:latin typeface="Open Sans" panose="020B0606030504020204" pitchFamily="34" charset="0"/>
-              <a:ea typeface="Open Sans" panose="020B0606030504020204" pitchFamily="34" charset="0"/>
-              <a:cs typeface="Open Sans" panose="020B0606030504020204" pitchFamily="34" charset="0"/>
-            </a:endParaRPr>
           </a:p>
         </p:txBody>
       </p:sp>
@@ -19030,21 +18136,7 @@
                 <a:ea typeface="Open Sans" panose="020B0606030504020204" pitchFamily="34" charset="0"/>
                 <a:cs typeface="Open Sans" panose="020B0606030504020204" pitchFamily="34" charset="0"/>
               </a:rPr>
-              <a:t>Step </a:t>
-            </a:r>
-            <a:r>
-              <a:rPr lang="en-US" sz="2400" b="1" dirty="0" smtClean="0">
-                <a:solidFill>
-                  <a:schemeClr val="tx2">
-                    <a:lumMod val="60000"/>
-                    <a:lumOff val="40000"/>
-                  </a:schemeClr>
-                </a:solidFill>
-                <a:latin typeface="Open Sans" panose="020B0606030504020204" pitchFamily="34" charset="0"/>
-                <a:ea typeface="Open Sans" panose="020B0606030504020204" pitchFamily="34" charset="0"/>
-                <a:cs typeface="Open Sans" panose="020B0606030504020204" pitchFamily="34" charset="0"/>
-              </a:rPr>
-              <a:t>6:</a:t>
+              <a:t>Step 6:</a:t>
             </a:r>
           </a:p>
           <a:p>
@@ -19060,11 +18152,6 @@
               </a:rPr>
               <a:t>Carry out the iterations.</a:t>
             </a:r>
-            <a:endParaRPr lang="en-US" sz="2400" dirty="0" smtClean="0">
-              <a:latin typeface="Open Sans" panose="020B0606030504020204" pitchFamily="34" charset="0"/>
-              <a:ea typeface="Open Sans" panose="020B0606030504020204" pitchFamily="34" charset="0"/>
-              <a:cs typeface="Open Sans" panose="020B0606030504020204" pitchFamily="34" charset="0"/>
-            </a:endParaRPr>
           </a:p>
           <a:p>
             <a:pPr lvl="1" algn="just">
@@ -19079,11 +18166,6 @@
               </a:rPr>
               <a:t>In excel, go to File -&gt; Options -&gt; Formulas and check the 'Enable iterative calculation' checkbox. Set the maximum number of iterations and the required level of accuracy. Then click OK. </a:t>
             </a:r>
-            <a:endParaRPr lang="en-US" sz="2000" dirty="0" smtClean="0">
-              <a:latin typeface="Open Sans" panose="020B0606030504020204" pitchFamily="34" charset="0"/>
-              <a:ea typeface="Open Sans" panose="020B0606030504020204" pitchFamily="34" charset="0"/>
-              <a:cs typeface="Open Sans" panose="020B0606030504020204" pitchFamily="34" charset="0"/>
-            </a:endParaRPr>
           </a:p>
           <a:p>
             <a:pPr lvl="1" algn="just">
@@ -19091,50 +18173,13 @@
               <a:buChar char="o"/>
             </a:pPr>
             <a:r>
-              <a:rPr lang="en-US" sz="2000" dirty="0" smtClean="0">
-                <a:latin typeface="Open Sans" panose="020B0606030504020204" pitchFamily="34" charset="0"/>
-                <a:ea typeface="Open Sans" panose="020B0606030504020204" pitchFamily="34" charset="0"/>
-                <a:cs typeface="Open Sans" panose="020B0606030504020204" pitchFamily="34" charset="0"/>
-              </a:rPr>
-              <a:t>The </a:t>
-            </a:r>
-            <a:r>
               <a:rPr lang="en-US" sz="2000" dirty="0">
                 <a:latin typeface="Open Sans" panose="020B0606030504020204" pitchFamily="34" charset="0"/>
                 <a:ea typeface="Open Sans" panose="020B0606030504020204" pitchFamily="34" charset="0"/>
                 <a:cs typeface="Open Sans" panose="020B0606030504020204" pitchFamily="34" charset="0"/>
               </a:rPr>
-              <a:t>calculation will be done automatically</a:t>
+              <a:t>The calculation will be done automatically, if ‘Automatic’ option is selected. If ‘Manual’ option is selected, go to Formulas in the main menu and click the 'Calculate Now' button, located in the Calculation group.</a:t>
             </a:r>
-            <a:r>
-              <a:rPr lang="en-US" sz="2000" dirty="0" smtClean="0">
-                <a:latin typeface="Open Sans" panose="020B0606030504020204" pitchFamily="34" charset="0"/>
-                <a:ea typeface="Open Sans" panose="020B0606030504020204" pitchFamily="34" charset="0"/>
-                <a:cs typeface="Open Sans" panose="020B0606030504020204" pitchFamily="34" charset="0"/>
-              </a:rPr>
-              <a:t>, if ‘Automatic’ option is selected. If ‘Manual’ option is selected, </a:t>
-            </a:r>
-            <a:r>
-              <a:rPr lang="en-US" sz="2000" dirty="0">
-                <a:latin typeface="Open Sans" panose="020B0606030504020204" pitchFamily="34" charset="0"/>
-                <a:ea typeface="Open Sans" panose="020B0606030504020204" pitchFamily="34" charset="0"/>
-                <a:cs typeface="Open Sans" panose="020B0606030504020204" pitchFamily="34" charset="0"/>
-              </a:rPr>
-              <a:t>go to Formulas in the main menu and click the 'Calculate Now' button, located in the Calculation group</a:t>
-            </a:r>
-            <a:r>
-              <a:rPr lang="en-US" sz="2000" dirty="0" smtClean="0">
-                <a:latin typeface="Open Sans" panose="020B0606030504020204" pitchFamily="34" charset="0"/>
-                <a:ea typeface="Open Sans" panose="020B0606030504020204" pitchFamily="34" charset="0"/>
-                <a:cs typeface="Open Sans" panose="020B0606030504020204" pitchFamily="34" charset="0"/>
-              </a:rPr>
-              <a:t>.</a:t>
-            </a:r>
-            <a:endParaRPr lang="en-US" sz="2000" dirty="0" smtClean="0">
-              <a:latin typeface="Open Sans" panose="020B0606030504020204" pitchFamily="34" charset="0"/>
-              <a:ea typeface="Open Sans" panose="020B0606030504020204" pitchFamily="34" charset="0"/>
-              <a:cs typeface="Open Sans" panose="020B0606030504020204" pitchFamily="34" charset="0"/>
-            </a:endParaRPr>
           </a:p>
         </p:txBody>
       </p:sp>
@@ -19294,13 +18339,6 @@
   <p:clrMapOvr>
     <a:masterClrMapping/>
   </p:clrMapOvr>
-  <p:timing>
-    <p:tnLst>
-      <p:par>
-        <p:cTn id="1" dur="indefinite" restart="never" nodeType="tmRoot"/>
-      </p:par>
-    </p:tnLst>
-  </p:timing>
 </p:sld>
 </file>
 
@@ -19372,21 +18410,8 @@
                 <a:ea typeface="Open Sans" panose="020B0606030504020204" pitchFamily="34" charset="0"/>
                 <a:cs typeface="Open Sans" panose="020B0606030504020204" pitchFamily="34" charset="0"/>
               </a:rPr>
-              <a:t>Excel </a:t>
+              <a:t>Excel Solution</a:t>
             </a:r>
-            <a:r>
-              <a:rPr lang="en-GB" b="1" dirty="0" smtClean="0">
-                <a:latin typeface="Open Sans" panose="020B0606030504020204" pitchFamily="34" charset="0"/>
-                <a:ea typeface="Open Sans" panose="020B0606030504020204" pitchFamily="34" charset="0"/>
-                <a:cs typeface="Open Sans" panose="020B0606030504020204" pitchFamily="34" charset="0"/>
-              </a:rPr>
-              <a:t>Solution</a:t>
-            </a:r>
-            <a:endParaRPr lang="en-GB" b="1" dirty="0">
-              <a:latin typeface="Open Sans" panose="020B0606030504020204" pitchFamily="34" charset="0"/>
-              <a:ea typeface="Open Sans" panose="020B0606030504020204" pitchFamily="34" charset="0"/>
-              <a:cs typeface="Open Sans" panose="020B0606030504020204" pitchFamily="34" charset="0"/>
-            </a:endParaRPr>
           </a:p>
         </p:txBody>
       </p:sp>
@@ -19428,21 +18453,7 @@
                 <a:ea typeface="Open Sans" panose="020B0606030504020204" pitchFamily="34" charset="0"/>
                 <a:cs typeface="Open Sans" panose="020B0606030504020204" pitchFamily="34" charset="0"/>
               </a:rPr>
-              <a:t>Step 7</a:t>
-            </a:r>
-            <a:r>
-              <a:rPr lang="en-US" sz="2400" b="1" dirty="0" smtClean="0">
-                <a:solidFill>
-                  <a:schemeClr val="tx2">
-                    <a:lumMod val="60000"/>
-                    <a:lumOff val="40000"/>
-                  </a:schemeClr>
-                </a:solidFill>
-                <a:latin typeface="Open Sans" panose="020B0606030504020204" pitchFamily="34" charset="0"/>
-                <a:ea typeface="Open Sans" panose="020B0606030504020204" pitchFamily="34" charset="0"/>
-                <a:cs typeface="Open Sans" panose="020B0606030504020204" pitchFamily="34" charset="0"/>
-              </a:rPr>
-              <a:t>:</a:t>
+              <a:t>Step 7:</a:t>
             </a:r>
           </a:p>
           <a:p>
@@ -19458,11 +18469,6 @@
               </a:rPr>
               <a:t>Calculate q.</a:t>
             </a:r>
-            <a:endParaRPr lang="en-US" sz="2400" dirty="0" smtClean="0">
-              <a:latin typeface="Open Sans" panose="020B0606030504020204" pitchFamily="34" charset="0"/>
-              <a:ea typeface="Open Sans" panose="020B0606030504020204" pitchFamily="34" charset="0"/>
-              <a:cs typeface="Open Sans" panose="020B0606030504020204" pitchFamily="34" charset="0"/>
-            </a:endParaRPr>
           </a:p>
           <a:p>
             <a:pPr lvl="1" algn="just">
@@ -19475,47 +18481,7 @@
                 <a:ea typeface="Open Sans" panose="020B0606030504020204" pitchFamily="34" charset="0"/>
                 <a:cs typeface="Open Sans" panose="020B0606030504020204" pitchFamily="34" charset="0"/>
               </a:rPr>
-              <a:t>Use eqn. </a:t>
-            </a:r>
-            <a:r>
-              <a:rPr lang="en-US" sz="2000" dirty="0" smtClean="0">
-                <a:latin typeface="Open Sans" panose="020B0606030504020204" pitchFamily="34" charset="0"/>
-                <a:ea typeface="Open Sans" panose="020B0606030504020204" pitchFamily="34" charset="0"/>
-                <a:cs typeface="Open Sans" panose="020B0606030504020204" pitchFamily="34" charset="0"/>
-              </a:rPr>
-              <a:t>(5.6</a:t>
-            </a:r>
-            <a:r>
-              <a:rPr lang="en-US" sz="2000" dirty="0">
-                <a:latin typeface="Open Sans" panose="020B0606030504020204" pitchFamily="34" charset="0"/>
-                <a:ea typeface="Open Sans" panose="020B0606030504020204" pitchFamily="34" charset="0"/>
-                <a:cs typeface="Open Sans" panose="020B0606030504020204" pitchFamily="34" charset="0"/>
-              </a:rPr>
-              <a:t>) </a:t>
-            </a:r>
-            <a:r>
-              <a:rPr lang="en-US" sz="2000" dirty="0" smtClean="0">
-                <a:latin typeface="Open Sans" panose="020B0606030504020204" pitchFamily="34" charset="0"/>
-                <a:ea typeface="Open Sans" panose="020B0606030504020204" pitchFamily="34" charset="0"/>
-                <a:cs typeface="Open Sans" panose="020B0606030504020204" pitchFamily="34" charset="0"/>
-              </a:rPr>
-              <a:t>to </a:t>
-            </a:r>
-            <a:r>
-              <a:rPr lang="en-US" sz="2000" dirty="0">
-                <a:latin typeface="Open Sans" panose="020B0606030504020204" pitchFamily="34" charset="0"/>
-                <a:ea typeface="Open Sans" panose="020B0606030504020204" pitchFamily="34" charset="0"/>
-                <a:cs typeface="Open Sans" panose="020B0606030504020204" pitchFamily="34" charset="0"/>
-              </a:rPr>
-              <a:t>calculate q’ for a unit value of permeability. In the spreadsheet for this example q’ is calculated in cell C 20 </a:t>
-            </a:r>
-            <a:r>
-              <a:rPr lang="en-US" sz="2000" dirty="0" smtClean="0">
-                <a:latin typeface="Open Sans" panose="020B0606030504020204" pitchFamily="34" charset="0"/>
-                <a:ea typeface="Open Sans" panose="020B0606030504020204" pitchFamily="34" charset="0"/>
-                <a:cs typeface="Open Sans" panose="020B0606030504020204" pitchFamily="34" charset="0"/>
-              </a:rPr>
-              <a:t>as:</a:t>
+              <a:t>Use eqn. (5.6) to calculate q’ for a unit value of permeability. In the spreadsheet for this example q’ is calculated in cell C 20 as:</a:t>
             </a:r>
           </a:p>
           <a:p>
@@ -19534,7 +18500,7 @@
               <a:buFont typeface="Courier New" panose="02070309020205020404" pitchFamily="49" charset="0"/>
               <a:buChar char="o"/>
             </a:pPr>
-            <a:endParaRPr lang="en-US" sz="2000" dirty="0" smtClean="0">
+            <a:endParaRPr lang="en-US" sz="2000" dirty="0">
               <a:latin typeface="Open Sans" panose="020B0606030504020204" pitchFamily="34" charset="0"/>
               <a:ea typeface="Open Sans" panose="020B0606030504020204" pitchFamily="34" charset="0"/>
               <a:cs typeface="Open Sans" panose="020B0606030504020204" pitchFamily="34" charset="0"/>
@@ -19551,15 +18517,7 @@
                 <a:ea typeface="Open Sans" panose="020B0606030504020204" pitchFamily="34" charset="0"/>
                 <a:cs typeface="Open Sans" panose="020B0606030504020204" pitchFamily="34" charset="0"/>
               </a:rPr>
-              <a:t>The actual value of q </a:t>
-            </a:r>
-            <a:r>
-              <a:rPr lang="en-US" sz="2000" dirty="0" smtClean="0">
-                <a:latin typeface="Open Sans" panose="020B0606030504020204" pitchFamily="34" charset="0"/>
-                <a:ea typeface="Open Sans" panose="020B0606030504020204" pitchFamily="34" charset="0"/>
-                <a:cs typeface="Open Sans" panose="020B0606030504020204" pitchFamily="34" charset="0"/>
-              </a:rPr>
-              <a:t>is:</a:t>
+              <a:t>The actual value of q is:</a:t>
             </a:r>
           </a:p>
         </p:txBody>
@@ -19732,7 +18690,7 @@
           <a:graphicData uri="http://schemas.openxmlformats.org/presentationml/2006/ole">
             <mc:AlternateContent xmlns:mc="http://schemas.openxmlformats.org/markup-compatibility/2006">
               <mc:Choice xmlns:v="urn:schemas-microsoft-com:vml" Requires="v">
-                <p:oleObj spid="_x0000_s40994" name="Equation" r:id="rId3" imgW="4991040" imgH="215640" progId="Equation.3">
+                <p:oleObj spid="_x0000_s41002" name="Equation" r:id="rId3" imgW="4991040" imgH="215640" progId="Equation.3">
                   <p:embed/>
                 </p:oleObj>
               </mc:Choice>
@@ -19825,7 +18783,7 @@
           <a:graphicData uri="http://schemas.openxmlformats.org/presentationml/2006/ole">
             <mc:AlternateContent xmlns:mc="http://schemas.openxmlformats.org/markup-compatibility/2006">
               <mc:Choice xmlns:v="urn:schemas-microsoft-com:vml" Requires="v">
-                <p:oleObj spid="_x0000_s40995" name="Equation" r:id="rId5" imgW="2755800" imgH="228600" progId="Equation.3">
+                <p:oleObj spid="_x0000_s41003" name="Equation" r:id="rId5" imgW="2755800" imgH="228600" progId="Equation.3">
                   <p:embed/>
                 </p:oleObj>
               </mc:Choice>
@@ -19912,13 +18870,6 @@
   <p:clrMapOvr>
     <a:masterClrMapping/>
   </p:clrMapOvr>
-  <p:timing>
-    <p:tnLst>
-      <p:par>
-        <p:cTn id="1" dur="indefinite" restart="never" nodeType="tmRoot"/>
-      </p:par>
-    </p:tnLst>
-  </p:timing>
 </p:sld>
 </file>
 
@@ -19990,21 +18941,8 @@
                 <a:ea typeface="Open Sans" panose="020B0606030504020204" pitchFamily="34" charset="0"/>
                 <a:cs typeface="Open Sans" panose="020B0606030504020204" pitchFamily="34" charset="0"/>
               </a:rPr>
-              <a:t>Excel </a:t>
+              <a:t>Excel Solution</a:t>
             </a:r>
-            <a:r>
-              <a:rPr lang="en-GB" b="1" dirty="0" smtClean="0">
-                <a:latin typeface="Open Sans" panose="020B0606030504020204" pitchFamily="34" charset="0"/>
-                <a:ea typeface="Open Sans" panose="020B0606030504020204" pitchFamily="34" charset="0"/>
-                <a:cs typeface="Open Sans" panose="020B0606030504020204" pitchFamily="34" charset="0"/>
-              </a:rPr>
-              <a:t>Solution</a:t>
-            </a:r>
-            <a:endParaRPr lang="en-GB" b="1" dirty="0">
-              <a:latin typeface="Open Sans" panose="020B0606030504020204" pitchFamily="34" charset="0"/>
-              <a:ea typeface="Open Sans" panose="020B0606030504020204" pitchFamily="34" charset="0"/>
-              <a:cs typeface="Open Sans" panose="020B0606030504020204" pitchFamily="34" charset="0"/>
-            </a:endParaRPr>
           </a:p>
         </p:txBody>
       </p:sp>
@@ -20046,21 +18984,7 @@
                 <a:ea typeface="Open Sans" panose="020B0606030504020204" pitchFamily="34" charset="0"/>
                 <a:cs typeface="Open Sans" panose="020B0606030504020204" pitchFamily="34" charset="0"/>
               </a:rPr>
-              <a:t>Step 8</a:t>
-            </a:r>
-            <a:r>
-              <a:rPr lang="en-US" sz="2400" b="1" dirty="0" smtClean="0">
-                <a:solidFill>
-                  <a:schemeClr val="tx2">
-                    <a:lumMod val="60000"/>
-                    <a:lumOff val="40000"/>
-                  </a:schemeClr>
-                </a:solidFill>
-                <a:latin typeface="Open Sans" panose="020B0606030504020204" pitchFamily="34" charset="0"/>
-                <a:ea typeface="Open Sans" panose="020B0606030504020204" pitchFamily="34" charset="0"/>
-                <a:cs typeface="Open Sans" panose="020B0606030504020204" pitchFamily="34" charset="0"/>
-              </a:rPr>
-              <a:t>:</a:t>
+              <a:t>Step 8:</a:t>
             </a:r>
           </a:p>
           <a:p>
@@ -20076,11 +19000,6 @@
               </a:rPr>
               <a:t>Calculate the flow for each cell.</a:t>
             </a:r>
-            <a:endParaRPr lang="en-US" sz="2400" dirty="0" smtClean="0">
-              <a:latin typeface="Open Sans" panose="020B0606030504020204" pitchFamily="34" charset="0"/>
-              <a:ea typeface="Open Sans" panose="020B0606030504020204" pitchFamily="34" charset="0"/>
-              <a:cs typeface="Open Sans" panose="020B0606030504020204" pitchFamily="34" charset="0"/>
-            </a:endParaRPr>
           </a:p>
           <a:p>
             <a:pPr lvl="1" algn="just">
@@ -20093,31 +19012,7 @@
                 <a:ea typeface="Open Sans" panose="020B0606030504020204" pitchFamily="34" charset="0"/>
                 <a:cs typeface="Open Sans" panose="020B0606030504020204" pitchFamily="34" charset="0"/>
               </a:rPr>
-              <a:t>In cells B36 to B42, and C42 to </a:t>
-            </a:r>
-            <a:r>
-              <a:rPr lang="en-US" sz="2000" dirty="0" smtClean="0">
-                <a:latin typeface="Open Sans" panose="020B0606030504020204" pitchFamily="34" charset="0"/>
-                <a:ea typeface="Open Sans" panose="020B0606030504020204" pitchFamily="34" charset="0"/>
-                <a:cs typeface="Open Sans" panose="020B0606030504020204" pitchFamily="34" charset="0"/>
-              </a:rPr>
-              <a:t>N42</a:t>
-            </a:r>
-            <a:r>
-              <a:rPr lang="en-US" sz="2000" dirty="0">
-                <a:latin typeface="Open Sans" panose="020B0606030504020204" pitchFamily="34" charset="0"/>
-                <a:ea typeface="Open Sans" panose="020B0606030504020204" pitchFamily="34" charset="0"/>
-                <a:cs typeface="Open Sans" panose="020B0606030504020204" pitchFamily="34" charset="0"/>
-              </a:rPr>
-              <a:t>, copy q’. The flow at the downstream end (cells N36 to N39) is </a:t>
-            </a:r>
-            <a:r>
-              <a:rPr lang="en-US" sz="2000" dirty="0" smtClean="0">
-                <a:latin typeface="Open Sans" panose="020B0606030504020204" pitchFamily="34" charset="0"/>
-                <a:ea typeface="Open Sans" panose="020B0606030504020204" pitchFamily="34" charset="0"/>
-                <a:cs typeface="Open Sans" panose="020B0606030504020204" pitchFamily="34" charset="0"/>
-              </a:rPr>
-              <a:t>zero.</a:t>
+              <a:t>In cells B36 to B42, and C42 to N42, copy q’. The flow at the downstream end (cells N36 to N39) is zero.</a:t>
             </a:r>
           </a:p>
           <a:p>
@@ -20131,31 +19026,7 @@
                 <a:ea typeface="Open Sans" panose="020B0606030504020204" pitchFamily="34" charset="0"/>
                 <a:cs typeface="Open Sans" panose="020B0606030504020204" pitchFamily="34" charset="0"/>
               </a:rPr>
-              <a:t>Apply eqn. </a:t>
-            </a:r>
-            <a:r>
-              <a:rPr lang="en-US" sz="2000" dirty="0" smtClean="0">
-                <a:latin typeface="Open Sans" panose="020B0606030504020204" pitchFamily="34" charset="0"/>
-                <a:ea typeface="Open Sans" panose="020B0606030504020204" pitchFamily="34" charset="0"/>
-                <a:cs typeface="Open Sans" panose="020B0606030504020204" pitchFamily="34" charset="0"/>
-              </a:rPr>
-              <a:t>(5.2) </a:t>
-            </a:r>
-            <a:r>
-              <a:rPr lang="en-US" sz="2000" dirty="0">
-                <a:latin typeface="Open Sans" panose="020B0606030504020204" pitchFamily="34" charset="0"/>
-                <a:ea typeface="Open Sans" panose="020B0606030504020204" pitchFamily="34" charset="0"/>
-                <a:cs typeface="Open Sans" panose="020B0606030504020204" pitchFamily="34" charset="0"/>
-              </a:rPr>
-              <a:t>to cells C36 to M41 and N40 to </a:t>
-            </a:r>
-            <a:r>
-              <a:rPr lang="en-US" sz="2000" dirty="0" smtClean="0">
-                <a:latin typeface="Open Sans" panose="020B0606030504020204" pitchFamily="34" charset="0"/>
-                <a:ea typeface="Open Sans" panose="020B0606030504020204" pitchFamily="34" charset="0"/>
-                <a:cs typeface="Open Sans" panose="020B0606030504020204" pitchFamily="34" charset="0"/>
-              </a:rPr>
-              <a:t>N41.</a:t>
+              <a:t>Apply eqn. (5.2) to cells C36 to M41 and N40 to N41.</a:t>
             </a:r>
           </a:p>
           <a:p>
@@ -20169,39 +19040,7 @@
                 <a:ea typeface="Open Sans" panose="020B0606030504020204" pitchFamily="34" charset="0"/>
                 <a:cs typeface="Open Sans" panose="020B0606030504020204" pitchFamily="34" charset="0"/>
               </a:rPr>
-              <a:t>Apply eqn. </a:t>
-            </a:r>
-            <a:r>
-              <a:rPr lang="en-US" sz="2000" dirty="0" smtClean="0">
-                <a:latin typeface="Open Sans" panose="020B0606030504020204" pitchFamily="34" charset="0"/>
-                <a:ea typeface="Open Sans" panose="020B0606030504020204" pitchFamily="34" charset="0"/>
-                <a:cs typeface="Open Sans" panose="020B0606030504020204" pitchFamily="34" charset="0"/>
-              </a:rPr>
-              <a:t>(5.1) </a:t>
-            </a:r>
-            <a:r>
-              <a:rPr lang="en-US" sz="2000" dirty="0">
-                <a:latin typeface="Open Sans" panose="020B0606030504020204" pitchFamily="34" charset="0"/>
-                <a:ea typeface="Open Sans" panose="020B0606030504020204" pitchFamily="34" charset="0"/>
-                <a:cs typeface="Open Sans" panose="020B0606030504020204" pitchFamily="34" charset="0"/>
-              </a:rPr>
-              <a:t>to all other cells except the cells with known values of q’. Carry out the </a:t>
-            </a:r>
-            <a:r>
-              <a:rPr lang="en-US" sz="2000" dirty="0" smtClean="0">
-                <a:latin typeface="Open Sans" panose="020B0606030504020204" pitchFamily="34" charset="0"/>
-                <a:ea typeface="Open Sans" panose="020B0606030504020204" pitchFamily="34" charset="0"/>
-                <a:cs typeface="Open Sans" panose="020B0606030504020204" pitchFamily="34" charset="0"/>
-              </a:rPr>
-              <a:t>iterations</a:t>
-            </a:r>
-            <a:r>
-              <a:rPr lang="en-US" sz="2000" dirty="0">
-                <a:latin typeface="Open Sans" panose="020B0606030504020204" pitchFamily="34" charset="0"/>
-                <a:ea typeface="Open Sans" panose="020B0606030504020204" pitchFamily="34" charset="0"/>
-                <a:cs typeface="Open Sans" panose="020B0606030504020204" pitchFamily="34" charset="0"/>
-              </a:rPr>
-              <a:t>.</a:t>
+              <a:t>Apply eqn. (5.1) to all other cells except the cells with known values of q’. Carry out the iterations.</a:t>
             </a:r>
           </a:p>
         </p:txBody>
@@ -20362,13 +19201,6 @@
   <p:clrMapOvr>
     <a:masterClrMapping/>
   </p:clrMapOvr>
-  <p:timing>
-    <p:tnLst>
-      <p:par>
-        <p:cTn id="1" dur="indefinite" restart="never" nodeType="tmRoot"/>
-      </p:par>
-    </p:tnLst>
-  </p:timing>
 </p:sld>
 </file>
 
@@ -22170,7 +21002,7 @@
             <a:graphicData uri="http://schemas.openxmlformats.org/presentationml/2006/ole">
               <mc:AlternateContent xmlns:mc="http://schemas.openxmlformats.org/markup-compatibility/2006">
                 <mc:Choice xmlns:v="urn:schemas-microsoft-com:vml" Requires="v">
-                  <p:oleObj spid="_x0000_s2872" name="Equation" r:id="rId3" imgW="266400" imgH="177480" progId="Equation.3">
+                  <p:oleObj spid="_x0000_s2948" name="Equation" r:id="rId3" imgW="266400" imgH="177480" progId="Equation.3">
                     <p:embed/>
                   </p:oleObj>
                 </mc:Choice>
@@ -22263,7 +21095,7 @@
             <a:graphicData uri="http://schemas.openxmlformats.org/presentationml/2006/ole">
               <mc:AlternateContent xmlns:mc="http://schemas.openxmlformats.org/markup-compatibility/2006">
                 <mc:Choice xmlns:v="urn:schemas-microsoft-com:vml" Requires="v">
-                  <p:oleObj spid="_x0000_s2873" name="Equation" r:id="rId5" imgW="88560" imgH="164880" progId="Equation.3">
+                  <p:oleObj spid="_x0000_s2949" name="Equation" r:id="rId5" imgW="88560" imgH="164880" progId="Equation.3">
                     <p:embed/>
                   </p:oleObj>
                 </mc:Choice>
@@ -22356,7 +21188,7 @@
             <a:graphicData uri="http://schemas.openxmlformats.org/presentationml/2006/ole">
               <mc:AlternateContent xmlns:mc="http://schemas.openxmlformats.org/markup-compatibility/2006">
                 <mc:Choice xmlns:v="urn:schemas-microsoft-com:vml" Requires="v">
-                  <p:oleObj spid="_x0000_s2874" name="Equation" r:id="rId7" imgW="279360" imgH="177480" progId="Equation.3">
+                  <p:oleObj spid="_x0000_s2950" name="Equation" r:id="rId7" imgW="279360" imgH="177480" progId="Equation.3">
                     <p:embed/>
                   </p:oleObj>
                 </mc:Choice>
@@ -22449,7 +21281,7 @@
             <a:graphicData uri="http://schemas.openxmlformats.org/presentationml/2006/ole">
               <mc:AlternateContent xmlns:mc="http://schemas.openxmlformats.org/markup-compatibility/2006">
                 <mc:Choice xmlns:v="urn:schemas-microsoft-com:vml" Requires="v">
-                  <p:oleObj spid="_x0000_s2875" name="Equation" r:id="rId9" imgW="304560" imgH="203040" progId="Equation.3">
+                  <p:oleObj spid="_x0000_s2951" name="Equation" r:id="rId9" imgW="304560" imgH="203040" progId="Equation.3">
                     <p:embed/>
                   </p:oleObj>
                 </mc:Choice>
@@ -22542,7 +21374,7 @@
             <a:graphicData uri="http://schemas.openxmlformats.org/presentationml/2006/ole">
               <mc:AlternateContent xmlns:mc="http://schemas.openxmlformats.org/markup-compatibility/2006">
                 <mc:Choice xmlns:v="urn:schemas-microsoft-com:vml" Requires="v">
-                  <p:oleObj spid="_x0000_s2876" name="Equation" r:id="rId11" imgW="126720" imgH="190440" progId="Equation.3">
+                  <p:oleObj spid="_x0000_s2952" name="Equation" r:id="rId11" imgW="126720" imgH="190440" progId="Equation.3">
                     <p:embed/>
                   </p:oleObj>
                 </mc:Choice>
@@ -22635,7 +21467,7 @@
             <a:graphicData uri="http://schemas.openxmlformats.org/presentationml/2006/ole">
               <mc:AlternateContent xmlns:mc="http://schemas.openxmlformats.org/markup-compatibility/2006">
                 <mc:Choice xmlns:v="urn:schemas-microsoft-com:vml" Requires="v">
-                  <p:oleObj spid="_x0000_s2877" name="Equation" r:id="rId13" imgW="304560" imgH="203040" progId="Equation.3">
+                  <p:oleObj spid="_x0000_s2953" name="Equation" r:id="rId13" imgW="304560" imgH="203040" progId="Equation.3">
                     <p:embed/>
                   </p:oleObj>
                 </mc:Choice>
@@ -22877,7 +21709,7 @@
             <a:graphicData uri="http://schemas.openxmlformats.org/presentationml/2006/ole">
               <mc:AlternateContent xmlns:mc="http://schemas.openxmlformats.org/markup-compatibility/2006">
                 <mc:Choice xmlns:v="urn:schemas-microsoft-com:vml" Requires="v">
-                  <p:oleObj spid="_x0000_s2878" name="Equation" r:id="rId15" imgW="393480" imgH="241200" progId="Equation.3">
+                  <p:oleObj spid="_x0000_s2954" name="Equation" r:id="rId15" imgW="393480" imgH="241200" progId="Equation.3">
                     <p:embed/>
                   </p:oleObj>
                 </mc:Choice>
@@ -22970,7 +21802,7 @@
             <a:graphicData uri="http://schemas.openxmlformats.org/presentationml/2006/ole">
               <mc:AlternateContent xmlns:mc="http://schemas.openxmlformats.org/markup-compatibility/2006">
                 <mc:Choice xmlns:v="urn:schemas-microsoft-com:vml" Requires="v">
-                  <p:oleObj spid="_x0000_s2879" name="Equation" r:id="rId17" imgW="304560" imgH="241200" progId="Equation.3">
+                  <p:oleObj spid="_x0000_s2955" name="Equation" r:id="rId17" imgW="304560" imgH="241200" progId="Equation.3">
                     <p:embed/>
                   </p:oleObj>
                 </mc:Choice>
@@ -23063,7 +21895,7 @@
             <a:graphicData uri="http://schemas.openxmlformats.org/presentationml/2006/ole">
               <mc:AlternateContent xmlns:mc="http://schemas.openxmlformats.org/markup-compatibility/2006">
                 <mc:Choice xmlns:v="urn:schemas-microsoft-com:vml" Requires="v">
-                  <p:oleObj spid="_x0000_s2880" name="Equation" r:id="rId19" imgW="393480" imgH="241200" progId="Equation.3">
+                  <p:oleObj spid="_x0000_s2956" name="Equation" r:id="rId19" imgW="393480" imgH="241200" progId="Equation.3">
                     <p:embed/>
                   </p:oleObj>
                 </mc:Choice>
@@ -23156,7 +21988,7 @@
             <a:graphicData uri="http://schemas.openxmlformats.org/presentationml/2006/ole">
               <mc:AlternateContent xmlns:mc="http://schemas.openxmlformats.org/markup-compatibility/2006">
                 <mc:Choice xmlns:v="urn:schemas-microsoft-com:vml" Requires="v">
-                  <p:oleObj spid="_x0000_s2881" name="Equation" r:id="rId21" imgW="304560" imgH="241200" progId="Equation.3">
+                  <p:oleObj spid="_x0000_s2957" name="Equation" r:id="rId21" imgW="304560" imgH="241200" progId="Equation.3">
                     <p:embed/>
                   </p:oleObj>
                 </mc:Choice>
@@ -23249,7 +22081,7 @@
             <a:graphicData uri="http://schemas.openxmlformats.org/presentationml/2006/ole">
               <mc:AlternateContent xmlns:mc="http://schemas.openxmlformats.org/markup-compatibility/2006">
                 <mc:Choice xmlns:v="urn:schemas-microsoft-com:vml" Requires="v">
-                  <p:oleObj spid="_x0000_s2882" name="Equation" r:id="rId23" imgW="215640" imgH="241200" progId="Equation.3">
+                  <p:oleObj spid="_x0000_s2958" name="Equation" r:id="rId23" imgW="215640" imgH="241200" progId="Equation.3">
                     <p:embed/>
                   </p:oleObj>
                 </mc:Choice>
@@ -23342,7 +22174,7 @@
             <a:graphicData uri="http://schemas.openxmlformats.org/presentationml/2006/ole">
               <mc:AlternateContent xmlns:mc="http://schemas.openxmlformats.org/markup-compatibility/2006">
                 <mc:Choice xmlns:v="urn:schemas-microsoft-com:vml" Requires="v">
-                  <p:oleObj spid="_x0000_s2883" name="Equation" r:id="rId25" imgW="304560" imgH="241200" progId="Equation.3">
+                  <p:oleObj spid="_x0000_s2959" name="Equation" r:id="rId25" imgW="304560" imgH="241200" progId="Equation.3">
                     <p:embed/>
                   </p:oleObj>
                 </mc:Choice>
@@ -23435,7 +22267,7 @@
             <a:graphicData uri="http://schemas.openxmlformats.org/presentationml/2006/ole">
               <mc:AlternateContent xmlns:mc="http://schemas.openxmlformats.org/markup-compatibility/2006">
                 <mc:Choice xmlns:v="urn:schemas-microsoft-com:vml" Requires="v">
-                  <p:oleObj spid="_x0000_s2884" name="Equation" r:id="rId27" imgW="393480" imgH="241200" progId="Equation.3">
+                  <p:oleObj spid="_x0000_s2960" name="Equation" r:id="rId27" imgW="393480" imgH="241200" progId="Equation.3">
                     <p:embed/>
                   </p:oleObj>
                 </mc:Choice>
@@ -23528,7 +22360,7 @@
             <a:graphicData uri="http://schemas.openxmlformats.org/presentationml/2006/ole">
               <mc:AlternateContent xmlns:mc="http://schemas.openxmlformats.org/markup-compatibility/2006">
                 <mc:Choice xmlns:v="urn:schemas-microsoft-com:vml" Requires="v">
-                  <p:oleObj spid="_x0000_s2885" name="Equation" r:id="rId29" imgW="304560" imgH="241200" progId="Equation.3">
+                  <p:oleObj spid="_x0000_s2961" name="Equation" r:id="rId29" imgW="304560" imgH="241200" progId="Equation.3">
                     <p:embed/>
                   </p:oleObj>
                 </mc:Choice>
@@ -23621,7 +22453,7 @@
             <a:graphicData uri="http://schemas.openxmlformats.org/presentationml/2006/ole">
               <mc:AlternateContent xmlns:mc="http://schemas.openxmlformats.org/markup-compatibility/2006">
                 <mc:Choice xmlns:v="urn:schemas-microsoft-com:vml" Requires="v">
-                  <p:oleObj spid="_x0000_s2886" name="Equation" r:id="rId31" imgW="393480" imgH="241200" progId="Equation.3">
+                  <p:oleObj spid="_x0000_s2962" name="Equation" r:id="rId31" imgW="393480" imgH="241200" progId="Equation.3">
                     <p:embed/>
                   </p:oleObj>
                 </mc:Choice>
@@ -23790,7 +22622,7 @@
             <a:graphicData uri="http://schemas.openxmlformats.org/presentationml/2006/ole">
               <mc:AlternateContent xmlns:mc="http://schemas.openxmlformats.org/markup-compatibility/2006">
                 <mc:Choice xmlns:v="urn:schemas-microsoft-com:vml" Requires="v">
-                  <p:oleObj spid="_x0000_s2887" name="Equation" r:id="rId33" imgW="177480" imgH="164880" progId="Equation.3">
+                  <p:oleObj spid="_x0000_s2963" name="Equation" r:id="rId33" imgW="177480" imgH="164880" progId="Equation.3">
                     <p:embed/>
                   </p:oleObj>
                 </mc:Choice>
@@ -23883,7 +22715,7 @@
             <a:graphicData uri="http://schemas.openxmlformats.org/presentationml/2006/ole">
               <mc:AlternateContent xmlns:mc="http://schemas.openxmlformats.org/markup-compatibility/2006">
                 <mc:Choice xmlns:v="urn:schemas-microsoft-com:vml" Requires="v">
-                  <p:oleObj spid="_x0000_s2888" name="Equation" r:id="rId35" imgW="152280" imgH="164880" progId="Equation.3">
+                  <p:oleObj spid="_x0000_s2964" name="Equation" r:id="rId35" imgW="152280" imgH="164880" progId="Equation.3">
                     <p:embed/>
                   </p:oleObj>
                 </mc:Choice>
@@ -23982,7 +22814,7 @@
             <a:graphicData uri="http://schemas.openxmlformats.org/presentationml/2006/ole">
               <mc:AlternateContent xmlns:mc="http://schemas.openxmlformats.org/markup-compatibility/2006">
                 <mc:Choice xmlns:v="urn:schemas-microsoft-com:vml" Requires="v">
-                  <p:oleObj spid="_x0000_s2889" name="Equation" r:id="rId37" imgW="215640" imgH="177480" progId="Equation.3">
+                  <p:oleObj spid="_x0000_s2965" name="Equation" r:id="rId37" imgW="215640" imgH="177480" progId="Equation.3">
                     <p:embed/>
                   </p:oleObj>
                 </mc:Choice>
@@ -24215,7 +23047,7 @@
             <a:graphicData uri="http://schemas.openxmlformats.org/presentationml/2006/ole">
               <mc:AlternateContent xmlns:mc="http://schemas.openxmlformats.org/markup-compatibility/2006">
                 <mc:Choice xmlns:v="urn:schemas-microsoft-com:vml" Requires="v">
-                  <p:oleObj spid="_x0000_s2890" name="Equation" r:id="rId39" imgW="203040" imgH="164880" progId="Equation.3">
+                  <p:oleObj spid="_x0000_s2966" name="Equation" r:id="rId39" imgW="203040" imgH="164880" progId="Equation.3">
                     <p:embed/>
                   </p:oleObj>
                 </mc:Choice>
@@ -25051,13 +23883,6 @@
   <p:clrMapOvr>
     <a:masterClrMapping/>
   </p:clrMapOvr>
-  <p:timing>
-    <p:tnLst>
-      <p:par>
-        <p:cTn id="1" dur="indefinite" restart="never" nodeType="tmRoot"/>
-      </p:par>
-    </p:tnLst>
-  </p:timing>
 </p:sld>
 </file>
 
@@ -25129,21 +23954,8 @@
                 <a:ea typeface="Open Sans" panose="020B0606030504020204" pitchFamily="34" charset="0"/>
                 <a:cs typeface="Open Sans" panose="020B0606030504020204" pitchFamily="34" charset="0"/>
               </a:rPr>
-              <a:t>Excel </a:t>
+              <a:t>Excel Solution</a:t>
             </a:r>
-            <a:r>
-              <a:rPr lang="en-GB" b="1" dirty="0" smtClean="0">
-                <a:latin typeface="Open Sans" panose="020B0606030504020204" pitchFamily="34" charset="0"/>
-                <a:ea typeface="Open Sans" panose="020B0606030504020204" pitchFamily="34" charset="0"/>
-                <a:cs typeface="Open Sans" panose="020B0606030504020204" pitchFamily="34" charset="0"/>
-              </a:rPr>
-              <a:t>Solution</a:t>
-            </a:r>
-            <a:endParaRPr lang="en-GB" b="1" dirty="0">
-              <a:latin typeface="Open Sans" panose="020B0606030504020204" pitchFamily="34" charset="0"/>
-              <a:ea typeface="Open Sans" panose="020B0606030504020204" pitchFamily="34" charset="0"/>
-              <a:cs typeface="Open Sans" panose="020B0606030504020204" pitchFamily="34" charset="0"/>
-            </a:endParaRPr>
           </a:p>
         </p:txBody>
       </p:sp>
@@ -25185,21 +23997,7 @@
                 <a:ea typeface="Open Sans" panose="020B0606030504020204" pitchFamily="34" charset="0"/>
                 <a:cs typeface="Open Sans" panose="020B0606030504020204" pitchFamily="34" charset="0"/>
               </a:rPr>
-              <a:t>Step </a:t>
-            </a:r>
-            <a:r>
-              <a:rPr lang="en-US" sz="2400" b="1" dirty="0" smtClean="0">
-                <a:solidFill>
-                  <a:schemeClr val="tx2">
-                    <a:lumMod val="60000"/>
-                    <a:lumOff val="40000"/>
-                  </a:schemeClr>
-                </a:solidFill>
-                <a:latin typeface="Open Sans" panose="020B0606030504020204" pitchFamily="34" charset="0"/>
-                <a:ea typeface="Open Sans" panose="020B0606030504020204" pitchFamily="34" charset="0"/>
-                <a:cs typeface="Open Sans" panose="020B0606030504020204" pitchFamily="34" charset="0"/>
-              </a:rPr>
-              <a:t>9:</a:t>
+              <a:t>Step 9:</a:t>
             </a:r>
           </a:p>
           <a:p>
@@ -25215,11 +24013,6 @@
               </a:rPr>
               <a:t>Calculate the pore water pressure.</a:t>
             </a:r>
-            <a:endParaRPr lang="en-US" sz="2400" dirty="0" smtClean="0">
-              <a:latin typeface="Open Sans" panose="020B0606030504020204" pitchFamily="34" charset="0"/>
-              <a:ea typeface="Open Sans" panose="020B0606030504020204" pitchFamily="34" charset="0"/>
-              <a:cs typeface="Open Sans" panose="020B0606030504020204" pitchFamily="34" charset="0"/>
-            </a:endParaRPr>
           </a:p>
           <a:p>
             <a:pPr lvl="1" algn="just">
@@ -25232,37 +24025,8 @@
                 <a:ea typeface="Open Sans" panose="020B0606030504020204" pitchFamily="34" charset="0"/>
                 <a:cs typeface="Open Sans" panose="020B0606030504020204" pitchFamily="34" charset="0"/>
               </a:rPr>
-              <a:t>From the potential heads, you can calculate the pore water pressure using eqn. </a:t>
+              <a:t>From the potential heads, you can calculate the pore water pressure using eqn. (5.5). A plot of the pore water pressure distribution is shown in the figure below.</a:t>
             </a:r>
-            <a:r>
-              <a:rPr lang="en-US" sz="2000" dirty="0" smtClean="0">
-                <a:latin typeface="Open Sans" panose="020B0606030504020204" pitchFamily="34" charset="0"/>
-                <a:ea typeface="Open Sans" panose="020B0606030504020204" pitchFamily="34" charset="0"/>
-                <a:cs typeface="Open Sans" panose="020B0606030504020204" pitchFamily="34" charset="0"/>
-              </a:rPr>
-              <a:t>(5.5). </a:t>
-            </a:r>
-            <a:r>
-              <a:rPr lang="en-US" sz="2000" dirty="0">
-                <a:latin typeface="Open Sans" panose="020B0606030504020204" pitchFamily="34" charset="0"/>
-                <a:ea typeface="Open Sans" panose="020B0606030504020204" pitchFamily="34" charset="0"/>
-                <a:cs typeface="Open Sans" panose="020B0606030504020204" pitchFamily="34" charset="0"/>
-              </a:rPr>
-              <a:t>A plot of the pore water pressure distribution is shown in </a:t>
-            </a:r>
-            <a:r>
-              <a:rPr lang="en-US" sz="2000" dirty="0" smtClean="0">
-                <a:latin typeface="Open Sans" panose="020B0606030504020204" pitchFamily="34" charset="0"/>
-                <a:ea typeface="Open Sans" panose="020B0606030504020204" pitchFamily="34" charset="0"/>
-                <a:cs typeface="Open Sans" panose="020B0606030504020204" pitchFamily="34" charset="0"/>
-              </a:rPr>
-              <a:t>the figure below.</a:t>
-            </a:r>
-            <a:endParaRPr lang="en-US" sz="2000" dirty="0">
-              <a:latin typeface="Open Sans" panose="020B0606030504020204" pitchFamily="34" charset="0"/>
-              <a:ea typeface="Open Sans" panose="020B0606030504020204" pitchFamily="34" charset="0"/>
-              <a:cs typeface="Open Sans" panose="020B0606030504020204" pitchFamily="34" charset="0"/>
-            </a:endParaRPr>
           </a:p>
         </p:txBody>
       </p:sp>
@@ -25422,13 +24186,6 @@
   <p:clrMapOvr>
     <a:masterClrMapping/>
   </p:clrMapOvr>
-  <p:timing>
-    <p:tnLst>
-      <p:par>
-        <p:cTn id="1" dur="indefinite" restart="never" nodeType="tmRoot"/>
-      </p:par>
-    </p:tnLst>
-  </p:timing>
 </p:sld>
 </file>
 
@@ -25500,21 +24257,8 @@
                 <a:ea typeface="Open Sans" panose="020B0606030504020204" pitchFamily="34" charset="0"/>
                 <a:cs typeface="Open Sans" panose="020B0606030504020204" pitchFamily="34" charset="0"/>
               </a:rPr>
-              <a:t>Excel </a:t>
+              <a:t>Excel Solution</a:t>
             </a:r>
-            <a:r>
-              <a:rPr lang="en-GB" b="1" dirty="0" smtClean="0">
-                <a:latin typeface="Open Sans" panose="020B0606030504020204" pitchFamily="34" charset="0"/>
-                <a:ea typeface="Open Sans" panose="020B0606030504020204" pitchFamily="34" charset="0"/>
-                <a:cs typeface="Open Sans" panose="020B0606030504020204" pitchFamily="34" charset="0"/>
-              </a:rPr>
-              <a:t>Solution</a:t>
-            </a:r>
-            <a:endParaRPr lang="en-GB" b="1" dirty="0">
-              <a:latin typeface="Open Sans" panose="020B0606030504020204" pitchFamily="34" charset="0"/>
-              <a:ea typeface="Open Sans" panose="020B0606030504020204" pitchFamily="34" charset="0"/>
-              <a:cs typeface="Open Sans" panose="020B0606030504020204" pitchFamily="34" charset="0"/>
-            </a:endParaRPr>
           </a:p>
         </p:txBody>
       </p:sp>
@@ -25698,13 +24442,6 @@
   <p:clrMapOvr>
     <a:masterClrMapping/>
   </p:clrMapOvr>
-  <p:timing>
-    <p:tnLst>
-      <p:par>
-        <p:cTn id="1" dur="indefinite" restart="never" nodeType="tmRoot"/>
-      </p:par>
-    </p:tnLst>
-  </p:timing>
 </p:sld>
 </file>
 
@@ -25814,7 +24551,7 @@
                 <a:ea typeface="Open Sans" panose="020B0606030504020204" pitchFamily="34" charset="0"/>
                 <a:cs typeface="Open Sans" panose="020B0606030504020204" pitchFamily="34" charset="0"/>
               </a:rPr>
-              <a:t>Determine the flow under the sheet pile wall (Fig. A3) and the pore water pressure distribution using the Finite Difference Method. </a:t>
+              <a:t>Determine the flow under the sheet pile wall and the pore water pressure distribution using the Finite Difference Method. </a:t>
             </a:r>
           </a:p>
           <a:p>
@@ -27959,7 +26696,7 @@
           <a:graphicData uri="http://schemas.openxmlformats.org/presentationml/2006/ole">
             <mc:AlternateContent xmlns:mc="http://schemas.openxmlformats.org/markup-compatibility/2006">
               <mc:Choice xmlns:v="urn:schemas-microsoft-com:vml" Requires="v">
-                <p:oleObj spid="_x0000_s41999" name="Equation" r:id="rId3" imgW="1091880" imgH="215640" progId="Equation.3">
+                <p:oleObj spid="_x0000_s42003" name="Equation" r:id="rId3" imgW="1091880" imgH="215640" progId="Equation.3">
                   <p:embed/>
                 </p:oleObj>
               </mc:Choice>
@@ -28336,7 +27073,7 @@
           <a:graphicData uri="http://schemas.openxmlformats.org/presentationml/2006/ole">
             <mc:AlternateContent xmlns:mc="http://schemas.openxmlformats.org/markup-compatibility/2006">
               <mc:Choice xmlns:v="urn:schemas-microsoft-com:vml" Requires="v">
-                <p:oleObj spid="_x0000_s28769" name="Equation" r:id="rId3" imgW="3238200" imgH="927000" progId="Equation.3">
+                <p:oleObj spid="_x0000_s28773" name="Equation" r:id="rId3" imgW="3238200" imgH="927000" progId="Equation.3">
                   <p:embed/>
                 </p:oleObj>
               </mc:Choice>
@@ -28615,39 +27352,7 @@
                 <a:ea typeface="Open Sans" panose="020B0606030504020204" pitchFamily="34" charset="0"/>
                 <a:cs typeface="Open Sans" panose="020B0606030504020204" pitchFamily="34" charset="0"/>
               </a:rPr>
-              <a:t>FD Equation</a:t>
-            </a:r>
-            <a:r>
-              <a:rPr lang="en-US" b="1" dirty="0" smtClean="0">
-                <a:latin typeface="Open Sans" panose="020B0606030504020204" pitchFamily="34" charset="0"/>
-                <a:ea typeface="Open Sans" panose="020B0606030504020204" pitchFamily="34" charset="0"/>
-                <a:cs typeface="Open Sans" panose="020B0606030504020204" pitchFamily="34" charset="0"/>
-              </a:rPr>
-              <a:t> </a:t>
-            </a:r>
-            <a:r>
-              <a:rPr lang="en-US" b="1" dirty="0">
-                <a:latin typeface="Open Sans" panose="020B0606030504020204" pitchFamily="34" charset="0"/>
-                <a:ea typeface="Open Sans" panose="020B0606030504020204" pitchFamily="34" charset="0"/>
-                <a:cs typeface="Open Sans" panose="020B0606030504020204" pitchFamily="34" charset="0"/>
-              </a:rPr>
-              <a:t>for </a:t>
-            </a:r>
-            <a:r>
-              <a:rPr lang="en-US" b="1" dirty="0" smtClean="0">
-                <a:latin typeface="Open Sans" panose="020B0606030504020204" pitchFamily="34" charset="0"/>
-                <a:ea typeface="Open Sans" panose="020B0606030504020204" pitchFamily="34" charset="0"/>
-                <a:cs typeface="Open Sans" panose="020B0606030504020204" pitchFamily="34" charset="0"/>
-              </a:rPr>
-              <a:t>2D </a:t>
-            </a:r>
-            <a:r>
-              <a:rPr lang="en-US" b="1" dirty="0">
-                <a:latin typeface="Open Sans" panose="020B0606030504020204" pitchFamily="34" charset="0"/>
-                <a:ea typeface="Open Sans" panose="020B0606030504020204" pitchFamily="34" charset="0"/>
-                <a:cs typeface="Open Sans" panose="020B0606030504020204" pitchFamily="34" charset="0"/>
-              </a:rPr>
-              <a:t>Flow</a:t>
+              <a:t>FD Equation for 2D Flow</a:t>
             </a:r>
             <a:endParaRPr lang="en-GB" b="1" dirty="0">
               <a:latin typeface="Open Sans" panose="020B0606030504020204" pitchFamily="34" charset="0"/>
@@ -28693,7 +27398,7 @@
               <a:t>Let </a:t>
             </a:r>
             <a:r>
-              <a:rPr lang="el-GR" sz="2400" dirty="0" smtClean="0">
+              <a:rPr lang="el-GR" sz="2400" dirty="0">
                 <a:latin typeface="Open Sans" panose="020B0606030504020204" pitchFamily="34" charset="0"/>
                 <a:ea typeface="Open Sans" panose="020B0606030504020204" pitchFamily="34" charset="0"/>
                 <a:cs typeface="Open Sans" panose="020B0606030504020204" pitchFamily="34" charset="0"/>
@@ -28701,20 +27406,12 @@
               <a:t>α</a:t>
             </a:r>
             <a:r>
-              <a:rPr lang="en-US" sz="2400" dirty="0" smtClean="0">
-                <a:latin typeface="Open Sans" panose="020B0606030504020204" pitchFamily="34" charset="0"/>
-                <a:ea typeface="Open Sans" panose="020B0606030504020204" pitchFamily="34" charset="0"/>
-                <a:cs typeface="Open Sans" panose="020B0606030504020204" pitchFamily="34" charset="0"/>
-              </a:rPr>
-              <a:t> </a:t>
-            </a:r>
-            <a:r>
               <a:rPr lang="en-US" sz="2400" dirty="0">
                 <a:latin typeface="Open Sans" panose="020B0606030504020204" pitchFamily="34" charset="0"/>
                 <a:ea typeface="Open Sans" panose="020B0606030504020204" pitchFamily="34" charset="0"/>
                 <a:cs typeface="Open Sans" panose="020B0606030504020204" pitchFamily="34" charset="0"/>
               </a:rPr>
-              <a:t>= </a:t>
+              <a:t> = </a:t>
             </a:r>
             <a:r>
               <a:rPr lang="en-US" sz="2400" dirty="0" err="1">
@@ -28765,7 +27462,7 @@
               <a:t> and </a:t>
             </a:r>
             <a:r>
-              <a:rPr lang="el-GR" sz="2400" dirty="0" smtClean="0">
+              <a:rPr lang="el-GR" sz="2400" dirty="0">
                 <a:latin typeface="Open Sans" panose="020B0606030504020204" pitchFamily="34" charset="0"/>
                 <a:ea typeface="Open Sans" panose="020B0606030504020204" pitchFamily="34" charset="0"/>
                 <a:cs typeface="Open Sans" panose="020B0606030504020204" pitchFamily="34" charset="0"/>
@@ -28773,12 +27470,20 @@
               <a:t>Δ</a:t>
             </a:r>
             <a:r>
-              <a:rPr lang="en-US" sz="2400" dirty="0" smtClean="0">
+              <a:rPr lang="en-US" sz="2400" dirty="0">
                 <a:latin typeface="Open Sans" panose="020B0606030504020204" pitchFamily="34" charset="0"/>
                 <a:ea typeface="Open Sans" panose="020B0606030504020204" pitchFamily="34" charset="0"/>
                 <a:cs typeface="Open Sans" panose="020B0606030504020204" pitchFamily="34" charset="0"/>
               </a:rPr>
-              <a:t>x </a:t>
+              <a:t>x = </a:t>
+            </a:r>
+            <a:r>
+              <a:rPr lang="el-GR" sz="2400" dirty="0">
+                <a:latin typeface="Open Sans" panose="020B0606030504020204" pitchFamily="34" charset="0"/>
+                <a:ea typeface="Open Sans" panose="020B0606030504020204" pitchFamily="34" charset="0"/>
+                <a:cs typeface="Open Sans" panose="020B0606030504020204" pitchFamily="34" charset="0"/>
+              </a:rPr>
+              <a:t>Δ</a:t>
             </a:r>
             <a:r>
               <a:rPr lang="en-US" sz="2400" dirty="0">
@@ -28786,31 +27491,7 @@
                 <a:ea typeface="Open Sans" panose="020B0606030504020204" pitchFamily="34" charset="0"/>
                 <a:cs typeface="Open Sans" panose="020B0606030504020204" pitchFamily="34" charset="0"/>
               </a:rPr>
-              <a:t>= </a:t>
-            </a:r>
-            <a:r>
-              <a:rPr lang="el-GR" sz="2400" dirty="0" smtClean="0">
-                <a:latin typeface="Open Sans" panose="020B0606030504020204" pitchFamily="34" charset="0"/>
-                <a:ea typeface="Open Sans" panose="020B0606030504020204" pitchFamily="34" charset="0"/>
-                <a:cs typeface="Open Sans" panose="020B0606030504020204" pitchFamily="34" charset="0"/>
-              </a:rPr>
-              <a:t>Δ</a:t>
-            </a:r>
-            <a:r>
-              <a:rPr lang="en-US" sz="2400" dirty="0" smtClean="0">
-                <a:latin typeface="Open Sans" panose="020B0606030504020204" pitchFamily="34" charset="0"/>
-                <a:ea typeface="Open Sans" panose="020B0606030504020204" pitchFamily="34" charset="0"/>
-                <a:cs typeface="Open Sans" panose="020B0606030504020204" pitchFamily="34" charset="0"/>
-              </a:rPr>
-              <a:t>z </a:t>
-            </a:r>
-            <a:r>
-              <a:rPr lang="en-US" sz="2400" dirty="0">
-                <a:latin typeface="Open Sans" panose="020B0606030504020204" pitchFamily="34" charset="0"/>
-                <a:ea typeface="Open Sans" panose="020B0606030504020204" pitchFamily="34" charset="0"/>
-                <a:cs typeface="Open Sans" panose="020B0606030504020204" pitchFamily="34" charset="0"/>
-              </a:rPr>
-              <a:t>(square grid), then:</a:t>
+              <a:t>z (square grid), then:</a:t>
             </a:r>
           </a:p>
           <a:p>
@@ -28829,7 +27510,7 @@
               <a:buFont typeface="Wingdings" panose="05000000000000000000" pitchFamily="2" charset="2"/>
               <a:buChar char="§"/>
             </a:pPr>
-            <a:endParaRPr lang="en-US" sz="2400" dirty="0" smtClean="0">
+            <a:endParaRPr lang="en-US" sz="2400" dirty="0">
               <a:latin typeface="Open Sans" panose="020B0606030504020204" pitchFamily="34" charset="0"/>
               <a:ea typeface="Open Sans" panose="020B0606030504020204" pitchFamily="34" charset="0"/>
               <a:cs typeface="Open Sans" panose="020B0606030504020204" pitchFamily="34" charset="0"/>
@@ -28840,7 +27521,7 @@
               <a:buFont typeface="Wingdings" panose="05000000000000000000" pitchFamily="2" charset="2"/>
               <a:buChar char="§"/>
             </a:pPr>
-            <a:endParaRPr lang="en-US" sz="1050" dirty="0" smtClean="0">
+            <a:endParaRPr lang="en-US" sz="1050" dirty="0">
               <a:latin typeface="Open Sans" panose="020B0606030504020204" pitchFamily="34" charset="0"/>
               <a:ea typeface="Open Sans" panose="020B0606030504020204" pitchFamily="34" charset="0"/>
               <a:cs typeface="Open Sans" panose="020B0606030504020204" pitchFamily="34" charset="0"/>
@@ -28851,7 +27532,7 @@
               <a:buFont typeface="Wingdings" panose="05000000000000000000" pitchFamily="2" charset="2"/>
               <a:buChar char="§"/>
             </a:pPr>
-            <a:endParaRPr lang="en-US" sz="2400" dirty="0" smtClean="0">
+            <a:endParaRPr lang="en-US" sz="2400" dirty="0">
               <a:latin typeface="Open Sans" panose="020B0606030504020204" pitchFamily="34" charset="0"/>
               <a:ea typeface="Open Sans" panose="020B0606030504020204" pitchFamily="34" charset="0"/>
               <a:cs typeface="Open Sans" panose="020B0606030504020204" pitchFamily="34" charset="0"/>
@@ -28863,20 +27544,12 @@
               <a:buChar char="§"/>
             </a:pPr>
             <a:r>
-              <a:rPr lang="en-US" sz="2400" dirty="0" smtClean="0">
-                <a:latin typeface="Open Sans" panose="020B0606030504020204" pitchFamily="34" charset="0"/>
-                <a:ea typeface="Open Sans" panose="020B0606030504020204" pitchFamily="34" charset="0"/>
-                <a:cs typeface="Open Sans" panose="020B0606030504020204" pitchFamily="34" charset="0"/>
-              </a:rPr>
-              <a:t>For </a:t>
-            </a:r>
-            <a:r>
               <a:rPr lang="en-US" sz="2400" dirty="0">
                 <a:latin typeface="Open Sans" panose="020B0606030504020204" pitchFamily="34" charset="0"/>
                 <a:ea typeface="Open Sans" panose="020B0606030504020204" pitchFamily="34" charset="0"/>
                 <a:cs typeface="Open Sans" panose="020B0606030504020204" pitchFamily="34" charset="0"/>
               </a:rPr>
-              <a:t>isotropic condition </a:t>
+              <a:t>For isotropic condition </a:t>
             </a:r>
             <a:r>
               <a:rPr lang="el-GR" sz="2400" dirty="0">
@@ -28887,20 +27560,12 @@
               <a:t>α</a:t>
             </a:r>
             <a:r>
-              <a:rPr lang="en-US" sz="2400" dirty="0" smtClean="0">
-                <a:latin typeface="Open Sans" panose="020B0606030504020204" pitchFamily="34" charset="0"/>
-                <a:ea typeface="Open Sans" panose="020B0606030504020204" pitchFamily="34" charset="0"/>
-                <a:cs typeface="Open Sans" panose="020B0606030504020204" pitchFamily="34" charset="0"/>
-              </a:rPr>
-              <a:t> </a:t>
-            </a:r>
-            <a:r>
               <a:rPr lang="en-US" sz="2400" dirty="0">
                 <a:latin typeface="Open Sans" panose="020B0606030504020204" pitchFamily="34" charset="0"/>
                 <a:ea typeface="Open Sans" panose="020B0606030504020204" pitchFamily="34" charset="0"/>
                 <a:cs typeface="Open Sans" panose="020B0606030504020204" pitchFamily="34" charset="0"/>
               </a:rPr>
-              <a:t>= 1 (</a:t>
+              <a:t> = 1 (</a:t>
             </a:r>
             <a:r>
               <a:rPr lang="en-US" sz="2400" dirty="0" err="1">
@@ -28948,15 +27613,7 @@
                 <a:ea typeface="Open Sans" panose="020B0606030504020204" pitchFamily="34" charset="0"/>
                 <a:cs typeface="Open Sans" panose="020B0606030504020204" pitchFamily="34" charset="0"/>
               </a:rPr>
-              <a:t>), hence</a:t>
-            </a:r>
-            <a:r>
-              <a:rPr lang="en-US" sz="2400" dirty="0" smtClean="0">
-                <a:latin typeface="Open Sans" panose="020B0606030504020204" pitchFamily="34" charset="0"/>
-                <a:ea typeface="Open Sans" panose="020B0606030504020204" pitchFamily="34" charset="0"/>
-                <a:cs typeface="Open Sans" panose="020B0606030504020204" pitchFamily="34" charset="0"/>
-              </a:rPr>
-              <a:t>:</a:t>
+              <a:t>), hence:</a:t>
             </a:r>
           </a:p>
         </p:txBody>
@@ -29129,7 +27786,7 @@
           <a:graphicData uri="http://schemas.openxmlformats.org/presentationml/2006/ole">
             <mc:AlternateContent xmlns:mc="http://schemas.openxmlformats.org/markup-compatibility/2006">
               <mc:Choice xmlns:v="urn:schemas-microsoft-com:vml" Requires="v">
-                <p:oleObj spid="_x0000_s29768" name="Equation" r:id="rId3" imgW="2171520" imgH="444240" progId="Equation.3">
+                <p:oleObj spid="_x0000_s29776" name="Equation" r:id="rId3" imgW="2171520" imgH="444240" progId="Equation.3">
                   <p:embed/>
                 </p:oleObj>
               </mc:Choice>
@@ -29217,7 +27874,7 @@
           <a:graphicData uri="http://schemas.openxmlformats.org/presentationml/2006/ole">
             <mc:AlternateContent xmlns:mc="http://schemas.openxmlformats.org/markup-compatibility/2006">
               <mc:Choice xmlns:v="urn:schemas-microsoft-com:vml" Requires="v">
-                <p:oleObj spid="_x0000_s29769" name="Equation" r:id="rId5" imgW="1993680" imgH="419040" progId="Equation.3">
+                <p:oleObj spid="_x0000_s29777" name="Equation" r:id="rId5" imgW="1993680" imgH="419040" progId="Equation.3">
                   <p:embed/>
                 </p:oleObj>
               </mc:Choice>
@@ -29318,19 +27975,6 @@
               <a:defRPr/>
             </a:pPr>
             <a:r>
-              <a:rPr lang="en-US" altLang="ja-JP" sz="2000" dirty="0" smtClean="0">
-                <a:effectLst>
-                  <a:outerShdw blurRad="38100" dist="38100" dir="2700000" algn="tl">
-                    <a:srgbClr val="C0C0C0"/>
-                  </a:outerShdw>
-                </a:effectLst>
-                <a:latin typeface="Open Sans" pitchFamily="2" charset="0"/>
-                <a:ea typeface="Open Sans" pitchFamily="2" charset="0"/>
-                <a:cs typeface="Open Sans" pitchFamily="2" charset="0"/>
-              </a:rPr>
-              <a:t>(5.1</a:t>
-            </a:r>
-            <a:r>
               <a:rPr lang="en-US" altLang="ja-JP" sz="2000" dirty="0">
                 <a:effectLst>
                   <a:outerShdw blurRad="38100" dist="38100" dir="2700000" algn="tl">
@@ -29341,7 +27985,7 @@
                 <a:ea typeface="Open Sans" pitchFamily="2" charset="0"/>
                 <a:cs typeface="Open Sans" pitchFamily="2" charset="0"/>
               </a:rPr>
-              <a:t>)</a:t>
+              <a:t>(5.1)</a:t>
             </a:r>
           </a:p>
         </p:txBody>
@@ -29548,39 +28192,7 @@
                 <a:ea typeface="Open Sans" panose="020B0606030504020204" pitchFamily="34" charset="0"/>
                 <a:cs typeface="Open Sans" panose="020B0606030504020204" pitchFamily="34" charset="0"/>
               </a:rPr>
-              <a:t>FD Equation</a:t>
-            </a:r>
-            <a:r>
-              <a:rPr lang="en-US" b="1" dirty="0" smtClean="0">
-                <a:latin typeface="Open Sans" panose="020B0606030504020204" pitchFamily="34" charset="0"/>
-                <a:ea typeface="Open Sans" panose="020B0606030504020204" pitchFamily="34" charset="0"/>
-                <a:cs typeface="Open Sans" panose="020B0606030504020204" pitchFamily="34" charset="0"/>
-              </a:rPr>
-              <a:t> </a:t>
-            </a:r>
-            <a:r>
-              <a:rPr lang="en-US" b="1" dirty="0">
-                <a:latin typeface="Open Sans" panose="020B0606030504020204" pitchFamily="34" charset="0"/>
-                <a:ea typeface="Open Sans" panose="020B0606030504020204" pitchFamily="34" charset="0"/>
-                <a:cs typeface="Open Sans" panose="020B0606030504020204" pitchFamily="34" charset="0"/>
-              </a:rPr>
-              <a:t>for </a:t>
-            </a:r>
-            <a:r>
-              <a:rPr lang="en-US" b="1" dirty="0" smtClean="0">
-                <a:latin typeface="Open Sans" panose="020B0606030504020204" pitchFamily="34" charset="0"/>
-                <a:ea typeface="Open Sans" panose="020B0606030504020204" pitchFamily="34" charset="0"/>
-                <a:cs typeface="Open Sans" panose="020B0606030504020204" pitchFamily="34" charset="0"/>
-              </a:rPr>
-              <a:t>2D </a:t>
-            </a:r>
-            <a:r>
-              <a:rPr lang="en-US" b="1" dirty="0">
-                <a:latin typeface="Open Sans" panose="020B0606030504020204" pitchFamily="34" charset="0"/>
-                <a:ea typeface="Open Sans" panose="020B0606030504020204" pitchFamily="34" charset="0"/>
-                <a:cs typeface="Open Sans" panose="020B0606030504020204" pitchFamily="34" charset="0"/>
-              </a:rPr>
-              <a:t>Flow</a:t>
+              <a:t>FD Equation for 2D Flow</a:t>
             </a:r>
             <a:endParaRPr lang="en-GB" b="1" dirty="0">
               <a:latin typeface="Open Sans" panose="020B0606030504020204" pitchFamily="34" charset="0"/>
@@ -29631,7 +28243,7 @@
               <a:buFont typeface="Wingdings" panose="05000000000000000000" pitchFamily="2" charset="2"/>
               <a:buChar char="§"/>
             </a:pPr>
-            <a:endParaRPr lang="en-US" sz="2400" dirty="0" smtClean="0">
+            <a:endParaRPr lang="en-US" sz="2400" dirty="0">
               <a:latin typeface="Open Sans" panose="020B0606030504020204" pitchFamily="34" charset="0"/>
               <a:ea typeface="Open Sans" panose="020B0606030504020204" pitchFamily="34" charset="0"/>
               <a:cs typeface="Open Sans" panose="020B0606030504020204" pitchFamily="34" charset="0"/>
@@ -29642,7 +28254,7 @@
               <a:buFont typeface="Wingdings" panose="05000000000000000000" pitchFamily="2" charset="2"/>
               <a:buChar char="§"/>
             </a:pPr>
-            <a:endParaRPr lang="en-US" sz="1050" dirty="0" smtClean="0">
+            <a:endParaRPr lang="en-US" sz="1050" dirty="0">
               <a:latin typeface="Open Sans" panose="020B0606030504020204" pitchFamily="34" charset="0"/>
               <a:ea typeface="Open Sans" panose="020B0606030504020204" pitchFamily="34" charset="0"/>
               <a:cs typeface="Open Sans" panose="020B0606030504020204" pitchFamily="34" charset="0"/>
@@ -29834,7 +28446,7 @@
             <a:graphicData uri="http://schemas.openxmlformats.org/presentationml/2006/ole">
               <mc:AlternateContent xmlns:mc="http://schemas.openxmlformats.org/markup-compatibility/2006">
                 <mc:Choice xmlns:v="urn:schemas-microsoft-com:vml" Requires="v">
-                  <p:oleObj spid="_x0000_s30887" name="Equation" r:id="rId3" imgW="304560" imgH="241200" progId="Equation.3">
+                  <p:oleObj spid="_x0000_s30907" name="Equation" r:id="rId3" imgW="304560" imgH="241200" progId="Equation.3">
                     <p:embed/>
                   </p:oleObj>
                 </mc:Choice>
@@ -30723,7 +29335,7 @@
             <a:graphicData uri="http://schemas.openxmlformats.org/presentationml/2006/ole">
               <mc:AlternateContent xmlns:mc="http://schemas.openxmlformats.org/markup-compatibility/2006">
                 <mc:Choice xmlns:v="urn:schemas-microsoft-com:vml" Requires="v">
-                  <p:oleObj spid="_x0000_s30888" name="Equation" r:id="rId5" imgW="215640" imgH="241200" progId="Equation.3">
+                  <p:oleObj spid="_x0000_s30908" name="Equation" r:id="rId5" imgW="215640" imgH="241200" progId="Equation.3">
                     <p:embed/>
                   </p:oleObj>
                 </mc:Choice>
@@ -30816,7 +29428,7 @@
             <a:graphicData uri="http://schemas.openxmlformats.org/presentationml/2006/ole">
               <mc:AlternateContent xmlns:mc="http://schemas.openxmlformats.org/markup-compatibility/2006">
                 <mc:Choice xmlns:v="urn:schemas-microsoft-com:vml" Requires="v">
-                  <p:oleObj spid="_x0000_s30889" name="Equation" r:id="rId7" imgW="304560" imgH="241200" progId="Equation.3">
+                  <p:oleObj spid="_x0000_s30909" name="Equation" r:id="rId7" imgW="304560" imgH="241200" progId="Equation.3">
                     <p:embed/>
                   </p:oleObj>
                 </mc:Choice>
@@ -30909,7 +29521,7 @@
             <a:graphicData uri="http://schemas.openxmlformats.org/presentationml/2006/ole">
               <mc:AlternateContent xmlns:mc="http://schemas.openxmlformats.org/markup-compatibility/2006">
                 <mc:Choice xmlns:v="urn:schemas-microsoft-com:vml" Requires="v">
-                  <p:oleObj spid="_x0000_s30890" name="Equation" r:id="rId9" imgW="304560" imgH="241200" progId="Equation.3">
+                  <p:oleObj spid="_x0000_s30910" name="Equation" r:id="rId9" imgW="304560" imgH="241200" progId="Equation.3">
                     <p:embed/>
                   </p:oleObj>
                 </mc:Choice>
@@ -31002,7 +29614,7 @@
             <a:graphicData uri="http://schemas.openxmlformats.org/presentationml/2006/ole">
               <mc:AlternateContent xmlns:mc="http://schemas.openxmlformats.org/markup-compatibility/2006">
                 <mc:Choice xmlns:v="urn:schemas-microsoft-com:vml" Requires="v">
-                  <p:oleObj spid="_x0000_s30891" name="Equation" r:id="rId11" imgW="304560" imgH="241200" progId="Equation.3">
+                  <p:oleObj spid="_x0000_s30911" name="Equation" r:id="rId11" imgW="304560" imgH="241200" progId="Equation.3">
                     <p:embed/>
                   </p:oleObj>
                 </mc:Choice>
@@ -31084,13 +29696,6 @@
   <p:clrMapOvr>
     <a:masterClrMapping/>
   </p:clrMapOvr>
-  <p:timing>
-    <p:tnLst>
-      <p:par>
-        <p:cTn id="1" dur="indefinite" restart="never" nodeType="tmRoot"/>
-      </p:par>
-    </p:tnLst>
-  </p:timing>
 </p:sld>
 </file>
 
@@ -31200,15 +29805,7 @@
                 <a:ea typeface="Open Sans" panose="020B0606030504020204" pitchFamily="34" charset="0"/>
                 <a:cs typeface="Open Sans" panose="020B0606030504020204" pitchFamily="34" charset="0"/>
               </a:rPr>
-              <a:t>Flow can not cross impermeable boundaries, therefore, for a horizontal impermeable </a:t>
-            </a:r>
-            <a:r>
-              <a:rPr lang="en-US" sz="2400" dirty="0" smtClean="0">
-                <a:latin typeface="Open Sans" panose="020B0606030504020204" pitchFamily="34" charset="0"/>
-                <a:ea typeface="Open Sans" panose="020B0606030504020204" pitchFamily="34" charset="0"/>
-                <a:cs typeface="Open Sans" panose="020B0606030504020204" pitchFamily="34" charset="0"/>
-              </a:rPr>
-              <a:t>surface:</a:t>
+              <a:t>Flow can not cross impermeable boundaries, therefore, for a horizontal impermeable surface:</a:t>
             </a:r>
           </a:p>
           <a:p>
@@ -31217,17 +29814,6 @@
               <a:buChar char="§"/>
             </a:pPr>
             <a:endParaRPr lang="en-US" sz="2400" dirty="0">
-              <a:latin typeface="Open Sans" panose="020B0606030504020204" pitchFamily="34" charset="0"/>
-              <a:ea typeface="Open Sans" panose="020B0606030504020204" pitchFamily="34" charset="0"/>
-              <a:cs typeface="Open Sans" panose="020B0606030504020204" pitchFamily="34" charset="0"/>
-            </a:endParaRPr>
-          </a:p>
-          <a:p>
-            <a:pPr algn="just">
-              <a:buFont typeface="Wingdings" panose="05000000000000000000" pitchFamily="2" charset="2"/>
-              <a:buChar char="§"/>
-            </a:pPr>
-            <a:endParaRPr lang="en-US" sz="2400" dirty="0" smtClean="0">
               <a:latin typeface="Open Sans" panose="020B0606030504020204" pitchFamily="34" charset="0"/>
               <a:ea typeface="Open Sans" panose="020B0606030504020204" pitchFamily="34" charset="0"/>
               <a:cs typeface="Open Sans" panose="020B0606030504020204" pitchFamily="34" charset="0"/>
@@ -31249,7 +29835,18 @@
               <a:buFont typeface="Wingdings" panose="05000000000000000000" pitchFamily="2" charset="2"/>
               <a:buChar char="§"/>
             </a:pPr>
-            <a:endParaRPr lang="en-US" sz="2400" dirty="0" smtClean="0">
+            <a:endParaRPr lang="en-US" sz="2400" dirty="0">
+              <a:latin typeface="Open Sans" panose="020B0606030504020204" pitchFamily="34" charset="0"/>
+              <a:ea typeface="Open Sans" panose="020B0606030504020204" pitchFamily="34" charset="0"/>
+              <a:cs typeface="Open Sans" panose="020B0606030504020204" pitchFamily="34" charset="0"/>
+            </a:endParaRPr>
+          </a:p>
+          <a:p>
+            <a:pPr algn="just">
+              <a:buFont typeface="Wingdings" panose="05000000000000000000" pitchFamily="2" charset="2"/>
+              <a:buChar char="§"/>
+            </a:pPr>
+            <a:endParaRPr lang="en-US" sz="2400" dirty="0">
               <a:latin typeface="Open Sans" panose="020B0606030504020204" pitchFamily="34" charset="0"/>
               <a:ea typeface="Open Sans" panose="020B0606030504020204" pitchFamily="34" charset="0"/>
               <a:cs typeface="Open Sans" panose="020B0606030504020204" pitchFamily="34" charset="0"/>
@@ -31268,11 +29865,6 @@
               </a:rPr>
               <a:t>FDE for the boundary conditions is:</a:t>
             </a:r>
-            <a:endParaRPr lang="en-US" sz="2400" dirty="0" smtClean="0">
-              <a:latin typeface="Open Sans" panose="020B0606030504020204" pitchFamily="34" charset="0"/>
-              <a:ea typeface="Open Sans" panose="020B0606030504020204" pitchFamily="34" charset="0"/>
-              <a:cs typeface="Open Sans" panose="020B0606030504020204" pitchFamily="34" charset="0"/>
-            </a:endParaRPr>
           </a:p>
           <a:p>
             <a:pPr algn="just">
@@ -31471,7 +30063,7 @@
             <a:graphicData uri="http://schemas.openxmlformats.org/presentationml/2006/ole">
               <mc:AlternateContent xmlns:mc="http://schemas.openxmlformats.org/markup-compatibility/2006">
                 <mc:Choice xmlns:v="urn:schemas-microsoft-com:vml" Requires="v">
-                  <p:oleObj spid="_x0000_s31932" name="Equation" r:id="rId3" imgW="444240" imgH="393480" progId="Equation.3">
+                  <p:oleObj spid="_x0000_s31956" name="Equation" r:id="rId3" imgW="444240" imgH="393480" progId="Equation.3">
                     <p:embed/>
                   </p:oleObj>
                 </mc:Choice>
@@ -32234,7 +30826,7 @@
               <a:graphicData uri="http://schemas.openxmlformats.org/presentationml/2006/ole">
                 <mc:AlternateContent xmlns:mc="http://schemas.openxmlformats.org/markup-compatibility/2006">
                   <mc:Choice xmlns:v="urn:schemas-microsoft-com:vml" Requires="v">
-                    <p:oleObj spid="_x0000_s31933" name="Equation" r:id="rId5" imgW="215640" imgH="241200" progId="Equation.3">
+                    <p:oleObj spid="_x0000_s31957" name="Equation" r:id="rId5" imgW="215640" imgH="241200" progId="Equation.3">
                       <p:embed/>
                     </p:oleObj>
                   </mc:Choice>
@@ -32327,7 +30919,7 @@
               <a:graphicData uri="http://schemas.openxmlformats.org/presentationml/2006/ole">
                 <mc:AlternateContent xmlns:mc="http://schemas.openxmlformats.org/markup-compatibility/2006">
                   <mc:Choice xmlns:v="urn:schemas-microsoft-com:vml" Requires="v">
-                    <p:oleObj spid="_x0000_s31934" name="Equation" r:id="rId7" imgW="304560" imgH="241200" progId="Equation.3">
+                    <p:oleObj spid="_x0000_s31958" name="Equation" r:id="rId7" imgW="304560" imgH="241200" progId="Equation.3">
                       <p:embed/>
                     </p:oleObj>
                   </mc:Choice>
@@ -32420,7 +31012,7 @@
               <a:graphicData uri="http://schemas.openxmlformats.org/presentationml/2006/ole">
                 <mc:AlternateContent xmlns:mc="http://schemas.openxmlformats.org/markup-compatibility/2006">
                   <mc:Choice xmlns:v="urn:schemas-microsoft-com:vml" Requires="v">
-                    <p:oleObj spid="_x0000_s31935" name="Equation" r:id="rId9" imgW="304560" imgH="241200" progId="Equation.3">
+                    <p:oleObj spid="_x0000_s31959" name="Equation" r:id="rId9" imgW="304560" imgH="241200" progId="Equation.3">
                       <p:embed/>
                     </p:oleObj>
                   </mc:Choice>
@@ -32513,7 +31105,7 @@
               <a:graphicData uri="http://schemas.openxmlformats.org/presentationml/2006/ole">
                 <mc:AlternateContent xmlns:mc="http://schemas.openxmlformats.org/markup-compatibility/2006">
                   <mc:Choice xmlns:v="urn:schemas-microsoft-com:vml" Requires="v">
-                    <p:oleObj spid="_x0000_s31936" name="Equation" r:id="rId11" imgW="304560" imgH="241200" progId="Equation.3">
+                    <p:oleObj spid="_x0000_s31960" name="Equation" r:id="rId11" imgW="304560" imgH="241200" progId="Equation.3">
                       <p:embed/>
                     </p:oleObj>
                   </mc:Choice>
@@ -32637,20 +31229,12 @@
                 <a:defRPr/>
               </a:pPr>
               <a:r>
-                <a:rPr lang="en-US" altLang="ja-JP" sz="2400" dirty="0" smtClean="0">
-                  <a:latin typeface="Open Sans" panose="020B0606030504020204" pitchFamily="34" charset="0"/>
-                  <a:ea typeface="Open Sans" panose="020B0606030504020204" pitchFamily="34" charset="0"/>
-                  <a:cs typeface="Open Sans" panose="020B0606030504020204" pitchFamily="34" charset="0"/>
-                </a:rPr>
-                <a:t>Neumann Boundary </a:t>
-              </a:r>
-              <a:r>
                 <a:rPr lang="en-US" altLang="ja-JP" sz="2400" dirty="0">
                   <a:latin typeface="Open Sans" panose="020B0606030504020204" pitchFamily="34" charset="0"/>
                   <a:ea typeface="Open Sans" panose="020B0606030504020204" pitchFamily="34" charset="0"/>
                   <a:cs typeface="Open Sans" panose="020B0606030504020204" pitchFamily="34" charset="0"/>
                 </a:rPr>
-                <a:t>Condition</a:t>
+                <a:t>Neumann Boundary Condition</a:t>
               </a:r>
             </a:p>
           </p:txBody>
@@ -32821,7 +31405,7 @@
           <a:graphicData uri="http://schemas.openxmlformats.org/presentationml/2006/ole">
             <mc:AlternateContent xmlns:mc="http://schemas.openxmlformats.org/markup-compatibility/2006">
               <mc:Choice xmlns:v="urn:schemas-microsoft-com:vml" Requires="v">
-                <p:oleObj spid="_x0000_s31937" name="Equation" r:id="rId13" imgW="1409400" imgH="419040" progId="Equation.3">
+                <p:oleObj spid="_x0000_s31961" name="Equation" r:id="rId13" imgW="1409400" imgH="419040" progId="Equation.3">
                   <p:embed/>
                 </p:oleObj>
               </mc:Choice>
@@ -33225,7 +31809,13 @@
               </a:rPr>
               <a:t>Therefore:</a:t>
             </a:r>
-            <a:endParaRPr lang="en-US" sz="2400" dirty="0" smtClean="0">
+          </a:p>
+          <a:p>
+            <a:pPr algn="just">
+              <a:buFont typeface="Wingdings" panose="05000000000000000000" pitchFamily="2" charset="2"/>
+              <a:buChar char="§"/>
+            </a:pPr>
+            <a:endParaRPr lang="en-US" sz="2400" dirty="0">
               <a:latin typeface="Open Sans" panose="020B0606030504020204" pitchFamily="34" charset="0"/>
               <a:ea typeface="Open Sans" panose="020B0606030504020204" pitchFamily="34" charset="0"/>
               <a:cs typeface="Open Sans" panose="020B0606030504020204" pitchFamily="34" charset="0"/>
@@ -33247,48 +31837,13 @@
               <a:buFont typeface="Wingdings" panose="05000000000000000000" pitchFamily="2" charset="2"/>
               <a:buChar char="§"/>
             </a:pPr>
-            <a:endParaRPr lang="en-US" sz="2400" dirty="0" smtClean="0">
-              <a:latin typeface="Open Sans" panose="020B0606030504020204" pitchFamily="34" charset="0"/>
-              <a:ea typeface="Open Sans" panose="020B0606030504020204" pitchFamily="34" charset="0"/>
-              <a:cs typeface="Open Sans" panose="020B0606030504020204" pitchFamily="34" charset="0"/>
-            </a:endParaRPr>
-          </a:p>
-          <a:p>
-            <a:pPr algn="just">
-              <a:buFont typeface="Wingdings" panose="05000000000000000000" pitchFamily="2" charset="2"/>
-              <a:buChar char="§"/>
-            </a:pPr>
             <a:r>
               <a:rPr lang="en-US" sz="2400" dirty="0">
                 <a:latin typeface="Open Sans" panose="020B0606030504020204" pitchFamily="34" charset="0"/>
                 <a:ea typeface="Open Sans" panose="020B0606030504020204" pitchFamily="34" charset="0"/>
                 <a:cs typeface="Open Sans" panose="020B0606030504020204" pitchFamily="34" charset="0"/>
               </a:rPr>
-              <a:t>Substituting into eqn. </a:t>
-            </a:r>
-            <a:r>
-              <a:rPr lang="en-US" sz="2400" dirty="0" smtClean="0">
-                <a:latin typeface="Open Sans" panose="020B0606030504020204" pitchFamily="34" charset="0"/>
-                <a:ea typeface="Open Sans" panose="020B0606030504020204" pitchFamily="34" charset="0"/>
-                <a:cs typeface="Open Sans" panose="020B0606030504020204" pitchFamily="34" charset="0"/>
-              </a:rPr>
-              <a:t>(5.1</a:t>
-            </a:r>
-            <a:r>
-              <a:rPr lang="en-US" sz="2400" dirty="0">
-                <a:latin typeface="Open Sans" panose="020B0606030504020204" pitchFamily="34" charset="0"/>
-                <a:ea typeface="Open Sans" panose="020B0606030504020204" pitchFamily="34" charset="0"/>
-                <a:cs typeface="Open Sans" panose="020B0606030504020204" pitchFamily="34" charset="0"/>
-              </a:rPr>
-              <a:t>), we </a:t>
-            </a:r>
-            <a:r>
-              <a:rPr lang="en-US" sz="2400" dirty="0" smtClean="0">
-                <a:latin typeface="Open Sans" panose="020B0606030504020204" pitchFamily="34" charset="0"/>
-                <a:ea typeface="Open Sans" panose="020B0606030504020204" pitchFamily="34" charset="0"/>
-                <a:cs typeface="Open Sans" panose="020B0606030504020204" pitchFamily="34" charset="0"/>
-              </a:rPr>
-              <a:t>get:</a:t>
+              <a:t>Substituting into eqn. (5.1), we get:</a:t>
             </a:r>
           </a:p>
           <a:p>
@@ -33472,7 +32027,7 @@
           <a:graphicData uri="http://schemas.openxmlformats.org/presentationml/2006/ole">
             <mc:AlternateContent xmlns:mc="http://schemas.openxmlformats.org/markup-compatibility/2006">
               <mc:Choice xmlns:v="urn:schemas-microsoft-com:vml" Requires="v">
-                <p:oleObj spid="_x0000_s32830" name="Equation" r:id="rId3" imgW="736560" imgH="241200" progId="Equation.3">
+                <p:oleObj spid="_x0000_s32838" name="Equation" r:id="rId3" imgW="736560" imgH="241200" progId="Equation.3">
                   <p:embed/>
                 </p:oleObj>
               </mc:Choice>
@@ -33565,7 +32120,7 @@
           <a:graphicData uri="http://schemas.openxmlformats.org/presentationml/2006/ole">
             <mc:AlternateContent xmlns:mc="http://schemas.openxmlformats.org/markup-compatibility/2006">
               <mc:Choice xmlns:v="urn:schemas-microsoft-com:vml" Requires="v">
-                <p:oleObj spid="_x0000_s32831" name="Equation" r:id="rId5" imgW="1663560" imgH="419040" progId="Equation.3">
+                <p:oleObj spid="_x0000_s32839" name="Equation" r:id="rId5" imgW="1663560" imgH="419040" progId="Equation.3">
                   <p:embed/>
                 </p:oleObj>
               </mc:Choice>
@@ -33771,20 +32326,12 @@
               </a:spcBef>
             </a:pPr>
             <a:r>
-              <a:rPr kumimoji="1" lang="en-US" altLang="ja-JP" sz="2000" dirty="0" smtClean="0">
-                <a:latin typeface="Open Sans" pitchFamily="2" charset="0"/>
-                <a:ea typeface="Open Sans" pitchFamily="2" charset="0"/>
-                <a:cs typeface="Open Sans" pitchFamily="2" charset="0"/>
-              </a:rPr>
-              <a:t>(5.2</a:t>
-            </a:r>
-            <a:r>
               <a:rPr kumimoji="1" lang="en-US" altLang="ja-JP" sz="2000" dirty="0">
                 <a:latin typeface="Open Sans" pitchFamily="2" charset="0"/>
                 <a:ea typeface="Open Sans" pitchFamily="2" charset="0"/>
                 <a:cs typeface="Open Sans" pitchFamily="2" charset="0"/>
               </a:rPr>
-              <a:t>)</a:t>
+              <a:t>(5.2)</a:t>
             </a:r>
           </a:p>
         </p:txBody>
@@ -33799,13 +32346,6 @@
   <p:clrMapOvr>
     <a:masterClrMapping/>
   </p:clrMapOvr>
-  <p:timing>
-    <p:tnLst>
-      <p:par>
-        <p:cTn id="1" dur="indefinite" restart="never" nodeType="tmRoot"/>
-      </p:par>
-    </p:tnLst>
-  </p:timing>
 </p:sld>
 </file>
 
@@ -33910,7 +32450,7 @@
               <a:buChar char="§"/>
             </a:pPr>
             <a:r>
-              <a:rPr lang="en-US" sz="2400" dirty="0" smtClean="0">
+              <a:rPr lang="en-US" sz="2400" dirty="0">
                 <a:latin typeface="Open Sans" panose="020B0606030504020204" pitchFamily="34" charset="0"/>
                 <a:ea typeface="Open Sans" panose="020B0606030504020204" pitchFamily="34" charset="0"/>
                 <a:cs typeface="Open Sans" panose="020B0606030504020204" pitchFamily="34" charset="0"/>
@@ -34943,7 +33483,7 @@
               <a:graphicData uri="http://schemas.openxmlformats.org/presentationml/2006/ole">
                 <mc:AlternateContent xmlns:mc="http://schemas.openxmlformats.org/markup-compatibility/2006">
                   <mc:Choice xmlns:v="urn:schemas-microsoft-com:vml" Requires="v">
-                    <p:oleObj spid="_x0000_s34184" name="Equation" r:id="rId3" imgW="406080" imgH="203040" progId="Equation.3">
+                    <p:oleObj spid="_x0000_s34236" name="Equation" r:id="rId3" imgW="406080" imgH="203040" progId="Equation.3">
                       <p:embed/>
                     </p:oleObj>
                   </mc:Choice>
@@ -35036,7 +33576,7 @@
               <a:graphicData uri="http://schemas.openxmlformats.org/presentationml/2006/ole">
                 <mc:AlternateContent xmlns:mc="http://schemas.openxmlformats.org/markup-compatibility/2006">
                   <mc:Choice xmlns:v="urn:schemas-microsoft-com:vml" Requires="v">
-                    <p:oleObj spid="_x0000_s34185" name="Equation" r:id="rId5" imgW="228600" imgH="190440" progId="Equation.3">
+                    <p:oleObj spid="_x0000_s34237" name="Equation" r:id="rId5" imgW="228600" imgH="190440" progId="Equation.3">
                       <p:embed/>
                     </p:oleObj>
                   </mc:Choice>
@@ -35129,7 +33669,7 @@
               <a:graphicData uri="http://schemas.openxmlformats.org/presentationml/2006/ole">
                 <mc:AlternateContent xmlns:mc="http://schemas.openxmlformats.org/markup-compatibility/2006">
                   <mc:Choice xmlns:v="urn:schemas-microsoft-com:vml" Requires="v">
-                    <p:oleObj spid="_x0000_s34186" name="Equation" r:id="rId7" imgW="406080" imgH="203040" progId="Equation.3">
+                    <p:oleObj spid="_x0000_s34238" name="Equation" r:id="rId7" imgW="406080" imgH="203040" progId="Equation.3">
                       <p:embed/>
                     </p:oleObj>
                   </mc:Choice>
@@ -36124,7 +34664,7 @@
               <a:graphicData uri="http://schemas.openxmlformats.org/presentationml/2006/ole">
                 <mc:AlternateContent xmlns:mc="http://schemas.openxmlformats.org/markup-compatibility/2006">
                   <mc:Choice xmlns:v="urn:schemas-microsoft-com:vml" Requires="v">
-                    <p:oleObj spid="_x0000_s34187" name="Equation" r:id="rId9" imgW="406080" imgH="203040" progId="Equation.3">
+                    <p:oleObj spid="_x0000_s34239" name="Equation" r:id="rId9" imgW="406080" imgH="203040" progId="Equation.3">
                       <p:embed/>
                     </p:oleObj>
                   </mc:Choice>
@@ -36259,7 +34799,7 @@
               <a:graphicData uri="http://schemas.openxmlformats.org/presentationml/2006/ole">
                 <mc:AlternateContent xmlns:mc="http://schemas.openxmlformats.org/markup-compatibility/2006">
                   <mc:Choice xmlns:v="urn:schemas-microsoft-com:vml" Requires="v">
-                    <p:oleObj spid="_x0000_s34188" name="Equation" r:id="rId11" imgW="406080" imgH="203040" progId="Equation.3">
+                    <p:oleObj spid="_x0000_s34240" name="Equation" r:id="rId11" imgW="406080" imgH="203040" progId="Equation.3">
                       <p:embed/>
                     </p:oleObj>
                   </mc:Choice>
@@ -36820,7 +35360,7 @@
               <a:graphicData uri="http://schemas.openxmlformats.org/presentationml/2006/ole">
                 <mc:AlternateContent xmlns:mc="http://schemas.openxmlformats.org/markup-compatibility/2006">
                   <mc:Choice xmlns:v="urn:schemas-microsoft-com:vml" Requires="v">
-                    <p:oleObj spid="_x0000_s34189" name="Equation" r:id="rId13" imgW="406080" imgH="203040" progId="Equation.3">
+                    <p:oleObj spid="_x0000_s34241" name="Equation" r:id="rId13" imgW="406080" imgH="203040" progId="Equation.3">
                       <p:embed/>
                     </p:oleObj>
                   </mc:Choice>
@@ -37197,7 +35737,7 @@
               <a:graphicData uri="http://schemas.openxmlformats.org/presentationml/2006/ole">
                 <mc:AlternateContent xmlns:mc="http://schemas.openxmlformats.org/markup-compatibility/2006">
                   <mc:Choice xmlns:v="urn:schemas-microsoft-com:vml" Requires="v">
-                    <p:oleObj spid="_x0000_s34190" name="Equation" r:id="rId15" imgW="406080" imgH="203040" progId="Equation.3">
+                    <p:oleObj spid="_x0000_s34242" name="Equation" r:id="rId15" imgW="406080" imgH="203040" progId="Equation.3">
                       <p:embed/>
                     </p:oleObj>
                   </mc:Choice>
@@ -37290,7 +35830,7 @@
               <a:graphicData uri="http://schemas.openxmlformats.org/presentationml/2006/ole">
                 <mc:AlternateContent xmlns:mc="http://schemas.openxmlformats.org/markup-compatibility/2006">
                   <mc:Choice xmlns:v="urn:schemas-microsoft-com:vml" Requires="v">
-                    <p:oleObj spid="_x0000_s34191" name="Equation" r:id="rId17" imgW="228600" imgH="190440" progId="Equation.3">
+                    <p:oleObj spid="_x0000_s34243" name="Equation" r:id="rId17" imgW="228600" imgH="190440" progId="Equation.3">
                       <p:embed/>
                     </p:oleObj>
                   </mc:Choice>
@@ -38606,7 +37146,7 @@
               <a:graphicData uri="http://schemas.openxmlformats.org/presentationml/2006/ole">
                 <mc:AlternateContent xmlns:mc="http://schemas.openxmlformats.org/markup-compatibility/2006">
                   <mc:Choice xmlns:v="urn:schemas-microsoft-com:vml" Requires="v">
-                    <p:oleObj spid="_x0000_s34192" name="Equation" r:id="rId19" imgW="406080" imgH="203040" progId="Equation.3">
+                    <p:oleObj spid="_x0000_s34244" name="Equation" r:id="rId19" imgW="406080" imgH="203040" progId="Equation.3">
                       <p:embed/>
                     </p:oleObj>
                   </mc:Choice>
@@ -38699,7 +37239,7 @@
               <a:graphicData uri="http://schemas.openxmlformats.org/presentationml/2006/ole">
                 <mc:AlternateContent xmlns:mc="http://schemas.openxmlformats.org/markup-compatibility/2006">
                   <mc:Choice xmlns:v="urn:schemas-microsoft-com:vml" Requires="v">
-                    <p:oleObj spid="_x0000_s34193" name="Equation" r:id="rId21" imgW="406080" imgH="203040" progId="Equation.3">
+                    <p:oleObj spid="_x0000_s34245" name="Equation" r:id="rId21" imgW="406080" imgH="203040" progId="Equation.3">
                       <p:embed/>
                     </p:oleObj>
                   </mc:Choice>
@@ -38792,7 +37332,7 @@
               <a:graphicData uri="http://schemas.openxmlformats.org/presentationml/2006/ole">
                 <mc:AlternateContent xmlns:mc="http://schemas.openxmlformats.org/markup-compatibility/2006">
                   <mc:Choice xmlns:v="urn:schemas-microsoft-com:vml" Requires="v">
-                    <p:oleObj spid="_x0000_s34194" name="Equation" r:id="rId23" imgW="406080" imgH="203040" progId="Equation.3">
+                    <p:oleObj spid="_x0000_s34246" name="Equation" r:id="rId23" imgW="406080" imgH="203040" progId="Equation.3">
                       <p:embed/>
                     </p:oleObj>
                   </mc:Choice>
@@ -38885,7 +37425,7 @@
               <a:graphicData uri="http://schemas.openxmlformats.org/presentationml/2006/ole">
                 <mc:AlternateContent xmlns:mc="http://schemas.openxmlformats.org/markup-compatibility/2006">
                   <mc:Choice xmlns:v="urn:schemas-microsoft-com:vml" Requires="v">
-                    <p:oleObj spid="_x0000_s34195" name="Equation" r:id="rId25" imgW="406080" imgH="203040" progId="Equation.3">
+                    <p:oleObj spid="_x0000_s34247" name="Equation" r:id="rId25" imgW="406080" imgH="203040" progId="Equation.3">
                       <p:embed/>
                     </p:oleObj>
                   </mc:Choice>
@@ -39151,7 +37691,7 @@
               <a:graphicData uri="http://schemas.openxmlformats.org/presentationml/2006/ole">
                 <mc:AlternateContent xmlns:mc="http://schemas.openxmlformats.org/markup-compatibility/2006">
                   <mc:Choice xmlns:v="urn:schemas-microsoft-com:vml" Requires="v">
-                    <p:oleObj spid="_x0000_s34196" name="Equation" r:id="rId27" imgW="228600" imgH="190440" progId="Equation.3">
+                    <p:oleObj spid="_x0000_s34248" name="Equation" r:id="rId27" imgW="228600" imgH="190440" progId="Equation.3">
                       <p:embed/>
                     </p:oleObj>
                   </mc:Choice>

</xml_diff>